<commit_message>
printing off first draft
</commit_message>
<xml_diff>
--- a/figures/gpu_convolution/gpuConv.pptx
+++ b/figures/gpu_convolution/gpuConv.pptx
@@ -8,6 +8,7 @@
     <p:sldId id="257" r:id="rId2"/>
     <p:sldId id="256" r:id="rId3"/>
     <p:sldId id="258" r:id="rId4"/>
+    <p:sldId id="259" r:id="rId5"/>
   </p:sldIdLst>
   <p:sldSz cx="12192000" cy="6858000"/>
   <p:notesSz cx="6858000" cy="9144000"/>
@@ -5668,1089 +5669,2215 @@
           <a:chExt cx="0" cy="0"/>
         </a:xfrm>
       </p:grpSpPr>
-      <p:sp>
-        <p:nvSpPr>
-          <p:cNvPr id="47" name="Rectangle 46"/>
-          <p:cNvSpPr/>
-          <p:nvPr/>
-        </p:nvSpPr>
-        <p:spPr>
-          <a:xfrm>
-            <a:off x="2949517" y="76200"/>
-            <a:ext cx="1143000" cy="1143000"/>
-          </a:xfrm>
-          <a:prstGeom prst="rect">
-            <a:avLst/>
-          </a:prstGeom>
-          <a:solidFill>
-            <a:schemeClr val="bg1">
-              <a:lumMod val="95000"/>
-            </a:schemeClr>
-          </a:solidFill>
-          <a:ln w="12700">
-            <a:solidFill>
-              <a:schemeClr val="tx1"/>
-            </a:solidFill>
-          </a:ln>
-        </p:spPr>
-        <p:style>
-          <a:lnRef idx="2">
-            <a:schemeClr val="accent1">
-              <a:shade val="50000"/>
-            </a:schemeClr>
-          </a:lnRef>
-          <a:fillRef idx="1">
-            <a:schemeClr val="accent1"/>
-          </a:fillRef>
-          <a:effectRef idx="0">
-            <a:schemeClr val="accent1"/>
-          </a:effectRef>
-          <a:fontRef idx="minor">
-            <a:schemeClr val="lt1"/>
-          </a:fontRef>
-        </p:style>
-        <p:txBody>
-          <a:bodyPr rtlCol="0" anchor="ctr"/>
-          <a:lstStyle/>
-          <a:p>
-            <a:pPr algn="ctr"/>
-            <a:r>
-              <a:rPr lang="en-US" dirty="0" smtClean="0">
-                <a:ln w="0"/>
-                <a:solidFill>
-                  <a:schemeClr val="tx1"/>
-                </a:solidFill>
-                <a:effectLst>
-                  <a:outerShdw blurRad="38100" dist="19050" dir="2700000" algn="tl" rotWithShape="0">
-                    <a:schemeClr val="dk1">
-                      <a:alpha val="40000"/>
-                    </a:schemeClr>
-                  </a:outerShdw>
-                </a:effectLst>
-                <a:latin typeface="Times New Roman" panose="02020603050405020304" pitchFamily="18" charset="0"/>
-                <a:cs typeface="Times New Roman" panose="02020603050405020304" pitchFamily="18" charset="0"/>
-              </a:rPr>
-              <a:t>FFT</a:t>
-            </a:r>
-            <a:endParaRPr lang="en-US" dirty="0">
-              <a:latin typeface="Times New Roman" panose="02020603050405020304" pitchFamily="18" charset="0"/>
-              <a:cs typeface="Times New Roman" panose="02020603050405020304" pitchFamily="18" charset="0"/>
-            </a:endParaRPr>
-          </a:p>
-        </p:txBody>
-      </p:sp>
-      <p:sp>
-        <p:nvSpPr>
-          <p:cNvPr id="48" name="Rectangle 47"/>
-          <p:cNvSpPr/>
-          <p:nvPr/>
-        </p:nvSpPr>
-        <p:spPr>
-          <a:xfrm>
-            <a:off x="2949517" y="2514600"/>
-            <a:ext cx="1143000" cy="1143000"/>
-          </a:xfrm>
-          <a:prstGeom prst="rect">
-            <a:avLst/>
-          </a:prstGeom>
-          <a:solidFill>
-            <a:schemeClr val="bg1">
-              <a:lumMod val="95000"/>
-            </a:schemeClr>
-          </a:solidFill>
-          <a:ln w="12700">
-            <a:solidFill>
-              <a:schemeClr val="tx1"/>
-            </a:solidFill>
-          </a:ln>
-        </p:spPr>
-        <p:style>
-          <a:lnRef idx="2">
-            <a:schemeClr val="accent1">
-              <a:shade val="50000"/>
-            </a:schemeClr>
-          </a:lnRef>
-          <a:fillRef idx="1">
-            <a:schemeClr val="accent1"/>
-          </a:fillRef>
-          <a:effectRef idx="0">
-            <a:schemeClr val="accent1"/>
-          </a:effectRef>
-          <a:fontRef idx="minor">
-            <a:schemeClr val="lt1"/>
-          </a:fontRef>
-        </p:style>
-        <p:txBody>
-          <a:bodyPr rtlCol="0" anchor="ctr"/>
-          <a:lstStyle/>
-          <a:p>
-            <a:pPr algn="ctr"/>
-            <a:r>
-              <a:rPr lang="en-US" dirty="0" smtClean="0">
-                <a:ln w="0"/>
-                <a:solidFill>
-                  <a:schemeClr val="tx1"/>
-                </a:solidFill>
-                <a:effectLst>
-                  <a:outerShdw blurRad="38100" dist="19050" dir="2700000" algn="tl" rotWithShape="0">
-                    <a:schemeClr val="dk1">
-                      <a:alpha val="40000"/>
-                    </a:schemeClr>
-                  </a:outerShdw>
-                </a:effectLst>
-                <a:latin typeface="Times New Roman" panose="02020603050405020304" pitchFamily="18" charset="0"/>
-                <a:cs typeface="Times New Roman" panose="02020603050405020304" pitchFamily="18" charset="0"/>
-              </a:rPr>
-              <a:t>FFT</a:t>
-            </a:r>
-            <a:endParaRPr lang="en-US" dirty="0">
-              <a:latin typeface="Times New Roman" panose="02020603050405020304" pitchFamily="18" charset="0"/>
-              <a:cs typeface="Times New Roman" panose="02020603050405020304" pitchFamily="18" charset="0"/>
-            </a:endParaRPr>
-          </a:p>
-        </p:txBody>
-      </p:sp>
-      <p:pic>
-        <p:nvPicPr>
-          <p:cNvPr id="30" name="Picture 29"/>
-          <p:cNvPicPr>
-            <a:picLocks noChangeAspect="1"/>
-          </p:cNvPicPr>
-          <p:nvPr>
-            <p:custDataLst>
-              <p:tags r:id="rId1"/>
-            </p:custDataLst>
-          </p:nvPr>
-        </p:nvPicPr>
-        <p:blipFill>
-          <a:blip r:embed="rId10" cstate="print">
-            <a:extLst>
-              <a:ext uri="{28A0092B-C50C-407E-A947-70E740481C1C}">
-                <a14:useLocalDpi xmlns:a14="http://schemas.microsoft.com/office/drawing/2010/main" val="0"/>
-              </a:ext>
-            </a:extLst>
-          </a:blip>
-          <a:stretch>
-            <a:fillRect/>
-          </a:stretch>
-        </p:blipFill>
-        <p:spPr>
-          <a:xfrm>
-            <a:off x="2092211" y="2746415"/>
-            <a:ext cx="103619" cy="114286"/>
-          </a:xfrm>
-          <a:prstGeom prst="rect">
-            <a:avLst/>
-          </a:prstGeom>
-        </p:spPr>
-      </p:pic>
-      <p:pic>
-        <p:nvPicPr>
-          <p:cNvPr id="64" name="Picture 63"/>
-          <p:cNvPicPr>
-            <a:picLocks noChangeAspect="1"/>
-          </p:cNvPicPr>
-          <p:nvPr>
-            <p:custDataLst>
-              <p:tags r:id="rId2"/>
-            </p:custDataLst>
-          </p:nvPr>
-        </p:nvPicPr>
-        <p:blipFill>
-          <a:blip r:embed="rId11" cstate="print">
-            <a:extLst>
-              <a:ext uri="{28A0092B-C50C-407E-A947-70E740481C1C}">
-                <a14:useLocalDpi xmlns:a14="http://schemas.microsoft.com/office/drawing/2010/main" val="0"/>
-              </a:ext>
-            </a:extLst>
-          </a:blip>
-          <a:stretch>
-            <a:fillRect/>
-          </a:stretch>
-        </p:blipFill>
-        <p:spPr>
-          <a:xfrm>
-            <a:off x="2110973" y="871039"/>
-            <a:ext cx="112762" cy="115810"/>
-          </a:xfrm>
-          <a:prstGeom prst="rect">
-            <a:avLst/>
-          </a:prstGeom>
-        </p:spPr>
-      </p:pic>
-      <p:pic>
-        <p:nvPicPr>
-          <p:cNvPr id="32" name="Picture 31"/>
-          <p:cNvPicPr>
-            <a:picLocks noChangeAspect="1"/>
-          </p:cNvPicPr>
-          <p:nvPr>
-            <p:custDataLst>
-              <p:tags r:id="rId3"/>
-            </p:custDataLst>
-          </p:nvPr>
-        </p:nvPicPr>
-        <p:blipFill>
-          <a:blip r:embed="rId12" cstate="print">
-            <a:extLst>
-              <a:ext uri="{28A0092B-C50C-407E-A947-70E740481C1C}">
-                <a14:useLocalDpi xmlns:a14="http://schemas.microsoft.com/office/drawing/2010/main" val="0"/>
-              </a:ext>
-            </a:extLst>
-          </a:blip>
-          <a:stretch>
-            <a:fillRect/>
-          </a:stretch>
-        </p:blipFill>
-        <p:spPr>
-          <a:xfrm>
-            <a:off x="1685354" y="1762073"/>
-            <a:ext cx="510476" cy="214857"/>
-          </a:xfrm>
-          <a:prstGeom prst="rect">
-            <a:avLst/>
-          </a:prstGeom>
-        </p:spPr>
-      </p:pic>
-      <p:cxnSp>
-        <p:nvCxnSpPr>
-          <p:cNvPr id="33" name="Straight Arrow Connector 32"/>
-          <p:cNvCxnSpPr/>
-          <p:nvPr/>
-        </p:nvCxnSpPr>
-        <p:spPr>
-          <a:xfrm>
-            <a:off x="2263717" y="952500"/>
-            <a:ext cx="684323" cy="0"/>
-          </a:xfrm>
-          <a:prstGeom prst="straightConnector1">
-            <a:avLst/>
-          </a:prstGeom>
-          <a:ln w="12700">
-            <a:solidFill>
-              <a:schemeClr val="tx1"/>
-            </a:solidFill>
-            <a:tailEnd type="triangle"/>
-          </a:ln>
-        </p:spPr>
-        <p:style>
-          <a:lnRef idx="1">
-            <a:schemeClr val="accent1"/>
-          </a:lnRef>
-          <a:fillRef idx="0">
-            <a:schemeClr val="accent1"/>
-          </a:fillRef>
-          <a:effectRef idx="0">
-            <a:schemeClr val="accent1"/>
-          </a:effectRef>
-          <a:fontRef idx="minor">
-            <a:schemeClr val="tx1"/>
-          </a:fontRef>
-        </p:style>
-      </p:cxnSp>
-      <p:cxnSp>
-        <p:nvCxnSpPr>
-          <p:cNvPr id="34" name="Straight Arrow Connector 33"/>
-          <p:cNvCxnSpPr/>
-          <p:nvPr/>
-        </p:nvCxnSpPr>
-        <p:spPr>
-          <a:xfrm>
-            <a:off x="2263717" y="2781300"/>
-            <a:ext cx="684323" cy="0"/>
-          </a:xfrm>
-          <a:prstGeom prst="straightConnector1">
-            <a:avLst/>
-          </a:prstGeom>
-          <a:ln w="12700">
-            <a:solidFill>
-              <a:schemeClr val="tx1"/>
-            </a:solidFill>
-            <a:tailEnd type="triangle"/>
-          </a:ln>
-        </p:spPr>
-        <p:style>
-          <a:lnRef idx="1">
-            <a:schemeClr val="accent1"/>
-          </a:lnRef>
-          <a:fillRef idx="0">
-            <a:schemeClr val="accent1"/>
-          </a:fillRef>
-          <a:effectRef idx="0">
-            <a:schemeClr val="accent1"/>
-          </a:effectRef>
-          <a:fontRef idx="minor">
-            <a:schemeClr val="tx1"/>
-          </a:fontRef>
-        </p:style>
-      </p:cxnSp>
-      <p:cxnSp>
-        <p:nvCxnSpPr>
-          <p:cNvPr id="35" name="Elbow Connector 34"/>
-          <p:cNvCxnSpPr>
-            <a:stCxn id="47" idx="3"/>
-            <a:endCxn id="37" idx="0"/>
-          </p:cNvCxnSpPr>
-          <p:nvPr/>
-        </p:nvCxnSpPr>
-        <p:spPr>
-          <a:xfrm>
-            <a:off x="4092517" y="647700"/>
-            <a:ext cx="1485898" cy="650301"/>
-          </a:xfrm>
-          <a:prstGeom prst="bentConnector2">
-            <a:avLst/>
-          </a:prstGeom>
-          <a:ln w="12700">
-            <a:solidFill>
-              <a:schemeClr val="tx1"/>
-            </a:solidFill>
-            <a:tailEnd type="triangle"/>
-          </a:ln>
-        </p:spPr>
-        <p:style>
-          <a:lnRef idx="1">
-            <a:schemeClr val="accent1"/>
-          </a:lnRef>
-          <a:fillRef idx="0">
-            <a:schemeClr val="accent1"/>
-          </a:fillRef>
-          <a:effectRef idx="0">
-            <a:schemeClr val="accent1"/>
-          </a:effectRef>
-          <a:fontRef idx="minor">
-            <a:schemeClr val="tx1"/>
-          </a:fontRef>
-        </p:style>
-      </p:cxnSp>
-      <p:cxnSp>
-        <p:nvCxnSpPr>
-          <p:cNvPr id="36" name="Elbow Connector 35"/>
-          <p:cNvCxnSpPr>
-            <a:stCxn id="48" idx="3"/>
-            <a:endCxn id="37" idx="2"/>
-          </p:cNvCxnSpPr>
-          <p:nvPr/>
-        </p:nvCxnSpPr>
-        <p:spPr>
-          <a:xfrm flipV="1">
-            <a:off x="4092517" y="2441001"/>
-            <a:ext cx="1485898" cy="645099"/>
-          </a:xfrm>
-          <a:prstGeom prst="bentConnector2">
-            <a:avLst/>
-          </a:prstGeom>
-          <a:ln w="12700">
-            <a:solidFill>
-              <a:schemeClr val="tx1"/>
-            </a:solidFill>
-            <a:tailEnd type="triangle"/>
-          </a:ln>
-        </p:spPr>
-        <p:style>
-          <a:lnRef idx="1">
-            <a:schemeClr val="accent1"/>
-          </a:lnRef>
-          <a:fillRef idx="0">
-            <a:schemeClr val="accent1"/>
-          </a:fillRef>
-          <a:effectRef idx="0">
-            <a:schemeClr val="accent1"/>
-          </a:effectRef>
-          <a:fontRef idx="minor">
-            <a:schemeClr val="tx1"/>
-          </a:fontRef>
-        </p:style>
-      </p:cxnSp>
-      <p:sp>
-        <p:nvSpPr>
-          <p:cNvPr id="37" name="Rectangle 36"/>
-          <p:cNvSpPr/>
-          <p:nvPr/>
-        </p:nvSpPr>
-        <p:spPr>
-          <a:xfrm>
-            <a:off x="4778315" y="1298001"/>
-            <a:ext cx="1600200" cy="1143000"/>
-          </a:xfrm>
-          <a:prstGeom prst="rect">
-            <a:avLst/>
-          </a:prstGeom>
-          <a:solidFill>
-            <a:schemeClr val="bg1">
-              <a:lumMod val="95000"/>
-            </a:schemeClr>
-          </a:solidFill>
-          <a:ln w="12700">
-            <a:solidFill>
-              <a:schemeClr val="tx1"/>
-            </a:solidFill>
-          </a:ln>
-        </p:spPr>
-        <p:style>
-          <a:lnRef idx="2">
-            <a:schemeClr val="accent1">
-              <a:shade val="50000"/>
-            </a:schemeClr>
-          </a:lnRef>
-          <a:fillRef idx="1">
-            <a:schemeClr val="accent1"/>
-          </a:fillRef>
-          <a:effectRef idx="0">
-            <a:schemeClr val="accent1"/>
-          </a:effectRef>
-          <a:fontRef idx="minor">
-            <a:schemeClr val="lt1"/>
-          </a:fontRef>
-        </p:style>
-        <p:txBody>
-          <a:bodyPr rtlCol="0" anchor="ctr"/>
-          <a:lstStyle/>
-          <a:p>
-            <a:pPr algn="ctr"/>
-            <a:r>
-              <a:rPr lang="en-US" dirty="0" smtClean="0">
-                <a:ln w="0"/>
-                <a:solidFill>
-                  <a:schemeClr val="tx1"/>
-                </a:solidFill>
-                <a:effectLst>
-                  <a:outerShdw blurRad="38100" dist="19050" dir="2700000" algn="tl" rotWithShape="0">
-                    <a:schemeClr val="dk1">
-                      <a:alpha val="40000"/>
-                    </a:schemeClr>
-                  </a:outerShdw>
-                </a:effectLst>
-                <a:latin typeface="Times New Roman" panose="02020603050405020304" pitchFamily="18" charset="0"/>
-                <a:cs typeface="Times New Roman" panose="02020603050405020304" pitchFamily="18" charset="0"/>
-              </a:rPr>
-              <a:t>Complex Multiplication</a:t>
-            </a:r>
-            <a:endParaRPr lang="en-US" dirty="0">
-              <a:latin typeface="Times New Roman" panose="02020603050405020304" pitchFamily="18" charset="0"/>
-              <a:cs typeface="Times New Roman" panose="02020603050405020304" pitchFamily="18" charset="0"/>
-            </a:endParaRPr>
-          </a:p>
-        </p:txBody>
-      </p:sp>
-      <p:sp>
-        <p:nvSpPr>
-          <p:cNvPr id="38" name="Rectangle 37"/>
-          <p:cNvSpPr/>
-          <p:nvPr/>
-        </p:nvSpPr>
-        <p:spPr>
-          <a:xfrm>
-            <a:off x="8458200" y="3886200"/>
-            <a:ext cx="1143000" cy="1143000"/>
-          </a:xfrm>
-          <a:prstGeom prst="rect">
-            <a:avLst/>
-          </a:prstGeom>
-          <a:solidFill>
-            <a:schemeClr val="bg1">
-              <a:lumMod val="95000"/>
-            </a:schemeClr>
-          </a:solidFill>
-          <a:ln w="12700">
-            <a:solidFill>
-              <a:schemeClr val="tx1"/>
-            </a:solidFill>
-          </a:ln>
-        </p:spPr>
-        <p:style>
-          <a:lnRef idx="2">
-            <a:schemeClr val="accent1">
-              <a:shade val="50000"/>
-            </a:schemeClr>
-          </a:lnRef>
-          <a:fillRef idx="1">
-            <a:schemeClr val="accent1"/>
-          </a:fillRef>
-          <a:effectRef idx="0">
-            <a:schemeClr val="accent1"/>
-          </a:effectRef>
-          <a:fontRef idx="minor">
-            <a:schemeClr val="lt1"/>
-          </a:fontRef>
-        </p:style>
-        <p:txBody>
-          <a:bodyPr rtlCol="0" anchor="ctr"/>
-          <a:lstStyle/>
-          <a:p>
-            <a:pPr algn="ctr"/>
-            <a:r>
-              <a:rPr lang="en-US" dirty="0" smtClean="0">
-                <a:ln w="0"/>
-                <a:solidFill>
-                  <a:schemeClr val="tx1"/>
-                </a:solidFill>
-                <a:effectLst>
-                  <a:outerShdw blurRad="38100" dist="19050" dir="2700000" algn="tl" rotWithShape="0">
-                    <a:schemeClr val="dk1">
-                      <a:alpha val="40000"/>
-                    </a:schemeClr>
-                  </a:outerShdw>
-                </a:effectLst>
-                <a:latin typeface="Times New Roman" panose="02020603050405020304" pitchFamily="18" charset="0"/>
-                <a:cs typeface="Times New Roman" panose="02020603050405020304" pitchFamily="18" charset="0"/>
-              </a:rPr>
-              <a:t>IFFT</a:t>
-            </a:r>
-            <a:endParaRPr lang="en-US" dirty="0">
-              <a:latin typeface="Times New Roman" panose="02020603050405020304" pitchFamily="18" charset="0"/>
-              <a:cs typeface="Times New Roman" panose="02020603050405020304" pitchFamily="18" charset="0"/>
-            </a:endParaRPr>
-          </a:p>
-        </p:txBody>
-      </p:sp>
-      <p:sp>
-        <p:nvSpPr>
-          <p:cNvPr id="39" name="Rectangle 38"/>
-          <p:cNvSpPr/>
-          <p:nvPr/>
-        </p:nvSpPr>
-        <p:spPr>
-          <a:xfrm>
-            <a:off x="10287000" y="3886200"/>
-            <a:ext cx="1143000" cy="1143000"/>
-          </a:xfrm>
-          <a:prstGeom prst="rect">
-            <a:avLst/>
-          </a:prstGeom>
-          <a:solidFill>
-            <a:schemeClr val="bg1">
-              <a:lumMod val="95000"/>
-            </a:schemeClr>
-          </a:solidFill>
-          <a:ln w="12700">
-            <a:solidFill>
-              <a:schemeClr val="tx1"/>
-            </a:solidFill>
-          </a:ln>
-        </p:spPr>
-        <p:style>
-          <a:lnRef idx="2">
-            <a:schemeClr val="accent1">
-              <a:shade val="50000"/>
-            </a:schemeClr>
-          </a:lnRef>
-          <a:fillRef idx="1">
-            <a:schemeClr val="accent1"/>
-          </a:fillRef>
-          <a:effectRef idx="0">
-            <a:schemeClr val="accent1"/>
-          </a:effectRef>
-          <a:fontRef idx="minor">
-            <a:schemeClr val="lt1"/>
-          </a:fontRef>
-        </p:style>
-        <p:txBody>
-          <a:bodyPr rtlCol="0" anchor="ctr"/>
-          <a:lstStyle/>
-          <a:p>
-            <a:pPr algn="ctr"/>
-            <a:r>
-              <a:rPr lang="en-US" dirty="0" smtClean="0">
-                <a:ln w="0"/>
-                <a:solidFill>
-                  <a:schemeClr val="tx1"/>
-                </a:solidFill>
-                <a:effectLst>
-                  <a:outerShdw blurRad="38100" dist="19050" dir="2700000" algn="tl" rotWithShape="0">
-                    <a:schemeClr val="dk1">
-                      <a:alpha val="40000"/>
-                    </a:schemeClr>
-                  </a:outerShdw>
-                </a:effectLst>
-                <a:latin typeface="Times New Roman" panose="02020603050405020304" pitchFamily="18" charset="0"/>
-                <a:cs typeface="Times New Roman" panose="02020603050405020304" pitchFamily="18" charset="0"/>
-              </a:rPr>
-              <a:t>Trim and Scale</a:t>
-            </a:r>
-            <a:endParaRPr lang="en-US" dirty="0">
-              <a:latin typeface="Times New Roman" panose="02020603050405020304" pitchFamily="18" charset="0"/>
-              <a:cs typeface="Times New Roman" panose="02020603050405020304" pitchFamily="18" charset="0"/>
-            </a:endParaRPr>
-          </a:p>
-        </p:txBody>
-      </p:sp>
-      <p:cxnSp>
-        <p:nvCxnSpPr>
-          <p:cNvPr id="42" name="Straight Arrow Connector 41"/>
-          <p:cNvCxnSpPr/>
-          <p:nvPr/>
-        </p:nvCxnSpPr>
-        <p:spPr>
-          <a:xfrm>
-            <a:off x="7772400" y="4457700"/>
-            <a:ext cx="685800" cy="0"/>
-          </a:xfrm>
-          <a:prstGeom prst="straightConnector1">
-            <a:avLst/>
-          </a:prstGeom>
-          <a:ln w="12700">
-            <a:solidFill>
-              <a:schemeClr val="tx1"/>
-            </a:solidFill>
-            <a:tailEnd type="triangle"/>
-          </a:ln>
-        </p:spPr>
-        <p:style>
-          <a:lnRef idx="1">
-            <a:schemeClr val="accent1"/>
-          </a:lnRef>
-          <a:fillRef idx="0">
-            <a:schemeClr val="accent1"/>
-          </a:fillRef>
-          <a:effectRef idx="0">
-            <a:schemeClr val="accent1"/>
-          </a:effectRef>
-          <a:fontRef idx="minor">
-            <a:schemeClr val="tx1"/>
-          </a:fontRef>
-        </p:style>
-      </p:cxnSp>
-      <p:cxnSp>
-        <p:nvCxnSpPr>
-          <p:cNvPr id="43" name="Straight Arrow Connector 42"/>
-          <p:cNvCxnSpPr/>
-          <p:nvPr/>
-        </p:nvCxnSpPr>
-        <p:spPr>
-          <a:xfrm>
-            <a:off x="9601200" y="4457700"/>
-            <a:ext cx="685800" cy="0"/>
-          </a:xfrm>
-          <a:prstGeom prst="straightConnector1">
-            <a:avLst/>
-          </a:prstGeom>
-          <a:ln w="12700">
-            <a:solidFill>
-              <a:schemeClr val="tx1"/>
-            </a:solidFill>
-            <a:tailEnd type="triangle"/>
-          </a:ln>
-        </p:spPr>
-        <p:style>
-          <a:lnRef idx="1">
-            <a:schemeClr val="accent1"/>
-          </a:lnRef>
-          <a:fillRef idx="0">
-            <a:schemeClr val="accent1"/>
-          </a:fillRef>
-          <a:effectRef idx="0">
-            <a:schemeClr val="accent1"/>
-          </a:effectRef>
-          <a:fontRef idx="minor">
-            <a:schemeClr val="tx1"/>
-          </a:fontRef>
-        </p:style>
-      </p:cxnSp>
-      <p:pic>
-        <p:nvPicPr>
-          <p:cNvPr id="45" name="Picture 44"/>
-          <p:cNvPicPr>
-            <a:picLocks noChangeAspect="1"/>
-          </p:cNvPicPr>
-          <p:nvPr>
-            <p:custDataLst>
-              <p:tags r:id="rId4"/>
-            </p:custDataLst>
-          </p:nvPr>
-        </p:nvPicPr>
-        <p:blipFill>
-          <a:blip r:embed="rId13" cstate="print">
-            <a:extLst>
-              <a:ext uri="{28A0092B-C50C-407E-A947-70E740481C1C}">
-                <a14:useLocalDpi xmlns:a14="http://schemas.microsoft.com/office/drawing/2010/main" val="0"/>
-              </a:ext>
-            </a:extLst>
-          </a:blip>
-          <a:stretch>
-            <a:fillRect/>
-          </a:stretch>
-        </p:blipFill>
-        <p:spPr>
-          <a:xfrm>
-            <a:off x="12205743" y="4381510"/>
-            <a:ext cx="214857" cy="152381"/>
-          </a:xfrm>
-          <a:prstGeom prst="rect">
-            <a:avLst/>
-          </a:prstGeom>
-        </p:spPr>
-      </p:pic>
-      <p:cxnSp>
-        <p:nvCxnSpPr>
-          <p:cNvPr id="46" name="Straight Arrow Connector 45"/>
-          <p:cNvCxnSpPr/>
-          <p:nvPr/>
-        </p:nvCxnSpPr>
-        <p:spPr>
-          <a:xfrm>
-            <a:off x="11425781" y="4457700"/>
-            <a:ext cx="684323" cy="0"/>
-          </a:xfrm>
-          <a:prstGeom prst="straightConnector1">
-            <a:avLst/>
-          </a:prstGeom>
-          <a:ln w="12700">
-            <a:solidFill>
-              <a:schemeClr val="tx1"/>
-            </a:solidFill>
-            <a:tailEnd type="triangle"/>
-          </a:ln>
-        </p:spPr>
-        <p:style>
-          <a:lnRef idx="1">
-            <a:schemeClr val="accent1"/>
-          </a:lnRef>
-          <a:fillRef idx="0">
-            <a:schemeClr val="accent1"/>
-          </a:fillRef>
-          <a:effectRef idx="0">
-            <a:schemeClr val="accent1"/>
-          </a:effectRef>
-          <a:fontRef idx="minor">
-            <a:schemeClr val="tx1"/>
-          </a:fontRef>
-        </p:style>
-      </p:cxnSp>
       <p:grpSp>
         <p:nvGrpSpPr>
-          <p:cNvPr id="73" name="Group 72"/>
+          <p:cNvPr id="109" name="Group 108"/>
           <p:cNvGrpSpPr/>
           <p:nvPr/>
         </p:nvGrpSpPr>
         <p:grpSpPr>
           <a:xfrm>
-            <a:off x="3655734" y="5562600"/>
-            <a:ext cx="3388166" cy="1144955"/>
-            <a:chOff x="3527970" y="4489156"/>
-            <a:chExt cx="3388166" cy="1144955"/>
+            <a:off x="1397077" y="-533400"/>
+            <a:ext cx="9397846" cy="7696200"/>
+            <a:chOff x="1397077" y="-533400"/>
+            <a:chExt cx="9397846" cy="7696200"/>
           </a:xfrm>
         </p:grpSpPr>
         <p:grpSp>
           <p:nvGrpSpPr>
-            <p:cNvPr id="72" name="Group 71"/>
+            <p:cNvPr id="108" name="Group 107"/>
             <p:cNvGrpSpPr/>
             <p:nvPr/>
           </p:nvGrpSpPr>
           <p:grpSpPr>
             <a:xfrm>
-              <a:off x="3527970" y="4489156"/>
-              <a:ext cx="2393347" cy="1144955"/>
-              <a:chOff x="3527970" y="4489156"/>
-              <a:chExt cx="2393347" cy="1144955"/>
+              <a:off x="1397077" y="3581400"/>
+              <a:ext cx="9397846" cy="3581400"/>
+              <a:chOff x="1397077" y="-304800"/>
+              <a:chExt cx="9397846" cy="3581400"/>
             </a:xfrm>
           </p:grpSpPr>
-          <p:grpSp>
-            <p:nvGrpSpPr>
-              <p:cNvPr id="69" name="Group 68"/>
-              <p:cNvGrpSpPr/>
+          <p:sp>
+            <p:nvSpPr>
+              <p:cNvPr id="47" name="Rectangle 46"/>
+              <p:cNvSpPr/>
               <p:nvPr/>
-            </p:nvGrpSpPr>
-            <p:grpSpPr>
+            </p:nvSpPr>
+            <p:spPr>
               <a:xfrm>
-                <a:off x="4778317" y="4489156"/>
-                <a:ext cx="1143000" cy="1144955"/>
-                <a:chOff x="4778317" y="4489156"/>
-                <a:chExt cx="1143000" cy="1144955"/>
+                <a:off x="2325007" y="-304800"/>
+                <a:ext cx="1143000" cy="1143000"/>
               </a:xfrm>
-            </p:grpSpPr>
-            <p:sp>
-              <p:nvSpPr>
-                <p:cNvPr id="59" name="Rectangle 58"/>
-                <p:cNvSpPr/>
-                <p:nvPr/>
-              </p:nvSpPr>
-              <p:spPr>
-                <a:xfrm>
-                  <a:off x="4778317" y="4491111"/>
-                  <a:ext cx="1143000" cy="1143000"/>
-                </a:xfrm>
-                <a:prstGeom prst="rect">
-                  <a:avLst/>
-                </a:prstGeom>
+              <a:prstGeom prst="rect">
+                <a:avLst/>
+              </a:prstGeom>
+              <a:solidFill>
+                <a:schemeClr val="bg1">
+                  <a:lumMod val="95000"/>
+                </a:schemeClr>
+              </a:solidFill>
+              <a:ln w="12700">
                 <a:solidFill>
-                  <a:schemeClr val="bg1">
-                    <a:lumMod val="95000"/>
-                  </a:schemeClr>
+                  <a:schemeClr val="tx1"/>
                 </a:solidFill>
-                <a:ln w="12700">
-                  <a:solidFill>
-                    <a:schemeClr val="tx1"/>
-                  </a:solidFill>
-                </a:ln>
-              </p:spPr>
-              <p:style>
-                <a:lnRef idx="2">
-                  <a:schemeClr val="accent1">
-                    <a:shade val="50000"/>
-                  </a:schemeClr>
-                </a:lnRef>
-                <a:fillRef idx="1">
-                  <a:schemeClr val="accent1"/>
-                </a:fillRef>
-                <a:effectRef idx="0">
-                  <a:schemeClr val="accent1"/>
-                </a:effectRef>
-                <a:fontRef idx="minor">
-                  <a:schemeClr val="lt1"/>
-                </a:fontRef>
-              </p:style>
-              <p:txBody>
-                <a:bodyPr rtlCol="0" anchor="ctr"/>
-                <a:lstStyle/>
-                <a:p>
-                  <a:pPr algn="ctr"/>
-                  <a:r>
-                    <a:rPr lang="en-US" dirty="0" err="1" smtClean="0">
-                      <a:ln w="0"/>
-                      <a:solidFill>
-                        <a:schemeClr val="tx1"/>
-                      </a:solidFill>
-                      <a:effectLst>
-                        <a:outerShdw blurRad="38100" dist="19050" dir="2700000" algn="tl" rotWithShape="0">
-                          <a:schemeClr val="dk1">
-                            <a:alpha val="40000"/>
-                          </a:schemeClr>
-                        </a:outerShdw>
-                      </a:effectLst>
-                      <a:latin typeface="Times New Roman" panose="02020603050405020304" pitchFamily="18" charset="0"/>
-                      <a:cs typeface="Times New Roman" panose="02020603050405020304" pitchFamily="18" charset="0"/>
-                    </a:rPr>
-                    <a:t>Conv</a:t>
-                  </a:r>
-                  <a:endParaRPr lang="en-US" dirty="0">
+              </a:ln>
+            </p:spPr>
+            <p:style>
+              <a:lnRef idx="2">
+                <a:schemeClr val="accent1">
+                  <a:shade val="50000"/>
+                </a:schemeClr>
+              </a:lnRef>
+              <a:fillRef idx="1">
+                <a:schemeClr val="accent1"/>
+              </a:fillRef>
+              <a:effectRef idx="0">
+                <a:schemeClr val="accent1"/>
+              </a:effectRef>
+              <a:fontRef idx="minor">
+                <a:schemeClr val="lt1"/>
+              </a:fontRef>
+            </p:style>
+            <p:txBody>
+              <a:bodyPr rtlCol="0" anchor="ctr"/>
+              <a:lstStyle/>
+              <a:p>
+                <a:pPr algn="ctr"/>
+                <a:r>
+                  <a:rPr lang="en-US" dirty="0" smtClean="0">
+                    <a:ln w="0"/>
+                    <a:solidFill>
+                      <a:schemeClr val="tx1"/>
+                    </a:solidFill>
+                    <a:effectLst>
+                      <a:outerShdw blurRad="38100" dist="19050" dir="2700000" algn="tl" rotWithShape="0">
+                        <a:schemeClr val="dk1">
+                          <a:alpha val="40000"/>
+                        </a:schemeClr>
+                      </a:outerShdw>
+                    </a:effectLst>
                     <a:latin typeface="Times New Roman" panose="02020603050405020304" pitchFamily="18" charset="0"/>
                     <a:cs typeface="Times New Roman" panose="02020603050405020304" pitchFamily="18" charset="0"/>
-                  </a:endParaRPr>
-                </a:p>
-              </p:txBody>
-            </p:sp>
-            <p:sp>
-              <p:nvSpPr>
-                <p:cNvPr id="60" name="Rectangle 59"/>
-                <p:cNvSpPr/>
-                <p:nvPr/>
-              </p:nvSpPr>
-              <p:spPr>
-                <a:xfrm>
-                  <a:off x="4781175" y="4489156"/>
-                  <a:ext cx="576072" cy="576072"/>
-                </a:xfrm>
-                <a:prstGeom prst="rect">
-                  <a:avLst/>
-                </a:prstGeom>
-                <a:noFill/>
-                <a:ln w="12700">
-                  <a:noFill/>
-                </a:ln>
-              </p:spPr>
-              <p:style>
-                <a:lnRef idx="2">
-                  <a:schemeClr val="accent1">
-                    <a:shade val="50000"/>
-                  </a:schemeClr>
-                </a:lnRef>
-                <a:fillRef idx="1">
-                  <a:schemeClr val="accent1"/>
-                </a:fillRef>
-                <a:effectRef idx="0">
-                  <a:schemeClr val="accent1"/>
-                </a:effectRef>
-                <a:fontRef idx="minor">
-                  <a:schemeClr val="lt1"/>
-                </a:fontRef>
-              </p:style>
-              <p:txBody>
-                <a:bodyPr rtlCol="0" anchor="ctr"/>
-                <a:lstStyle/>
-                <a:p>
-                  <a:pPr algn="ctr"/>
-                  <a:endParaRPr lang="en-US" dirty="0">
+                  </a:rPr>
+                  <a:t>FFT</a:t>
+                </a:r>
+                <a:endParaRPr lang="en-US" dirty="0">
+                  <a:latin typeface="Times New Roman" panose="02020603050405020304" pitchFamily="18" charset="0"/>
+                  <a:cs typeface="Times New Roman" panose="02020603050405020304" pitchFamily="18" charset="0"/>
+                </a:endParaRPr>
+              </a:p>
+            </p:txBody>
+          </p:sp>
+          <p:sp>
+            <p:nvSpPr>
+              <p:cNvPr id="48" name="Rectangle 47"/>
+              <p:cNvSpPr/>
+              <p:nvPr/>
+            </p:nvSpPr>
+            <p:spPr>
+              <a:xfrm>
+                <a:off x="2325007" y="2133600"/>
+                <a:ext cx="1143000" cy="1143000"/>
+              </a:xfrm>
+              <a:prstGeom prst="rect">
+                <a:avLst/>
+              </a:prstGeom>
+              <a:solidFill>
+                <a:schemeClr val="bg1">
+                  <a:lumMod val="95000"/>
+                </a:schemeClr>
+              </a:solidFill>
+              <a:ln w="12700">
+                <a:solidFill>
+                  <a:schemeClr val="tx1"/>
+                </a:solidFill>
+              </a:ln>
+            </p:spPr>
+            <p:style>
+              <a:lnRef idx="2">
+                <a:schemeClr val="accent1">
+                  <a:shade val="50000"/>
+                </a:schemeClr>
+              </a:lnRef>
+              <a:fillRef idx="1">
+                <a:schemeClr val="accent1"/>
+              </a:fillRef>
+              <a:effectRef idx="0">
+                <a:schemeClr val="accent1"/>
+              </a:effectRef>
+              <a:fontRef idx="minor">
+                <a:schemeClr val="lt1"/>
+              </a:fontRef>
+            </p:style>
+            <p:txBody>
+              <a:bodyPr rtlCol="0" anchor="ctr"/>
+              <a:lstStyle/>
+              <a:p>
+                <a:pPr algn="ctr"/>
+                <a:r>
+                  <a:rPr lang="en-US" dirty="0" smtClean="0">
+                    <a:ln w="0"/>
+                    <a:solidFill>
+                      <a:schemeClr val="tx1"/>
+                    </a:solidFill>
+                    <a:effectLst>
+                      <a:outerShdw blurRad="38100" dist="19050" dir="2700000" algn="tl" rotWithShape="0">
+                        <a:schemeClr val="dk1">
+                          <a:alpha val="40000"/>
+                        </a:schemeClr>
+                      </a:outerShdw>
+                    </a:effectLst>
                     <a:latin typeface="Times New Roman" panose="02020603050405020304" pitchFamily="18" charset="0"/>
                     <a:cs typeface="Times New Roman" panose="02020603050405020304" pitchFamily="18" charset="0"/>
-                  </a:endParaRPr>
-                </a:p>
-              </p:txBody>
-            </p:sp>
-            <p:sp>
-              <p:nvSpPr>
-                <p:cNvPr id="61" name="Rectangle 60"/>
-                <p:cNvSpPr/>
-                <p:nvPr/>
-              </p:nvSpPr>
-              <p:spPr>
-                <a:xfrm>
-                  <a:off x="4780698" y="5053703"/>
-                  <a:ext cx="576072" cy="576072"/>
-                </a:xfrm>
-                <a:prstGeom prst="rect">
-                  <a:avLst/>
-                </a:prstGeom>
-                <a:noFill/>
-                <a:ln w="12700">
-                  <a:noFill/>
-                </a:ln>
-              </p:spPr>
-              <p:style>
-                <a:lnRef idx="2">
-                  <a:schemeClr val="accent1">
-                    <a:shade val="50000"/>
-                  </a:schemeClr>
-                </a:lnRef>
-                <a:fillRef idx="1">
-                  <a:schemeClr val="accent1"/>
-                </a:fillRef>
-                <a:effectRef idx="0">
-                  <a:schemeClr val="accent1"/>
-                </a:effectRef>
-                <a:fontRef idx="minor">
-                  <a:schemeClr val="lt1"/>
-                </a:fontRef>
-              </p:style>
-              <p:txBody>
-                <a:bodyPr rtlCol="0" anchor="ctr"/>
-                <a:lstStyle/>
-                <a:p>
-                  <a:pPr algn="ctr"/>
-                  <a:endParaRPr lang="en-US" dirty="0">
+                  </a:rPr>
+                  <a:t>FFT</a:t>
+                </a:r>
+                <a:endParaRPr lang="en-US" dirty="0">
+                  <a:latin typeface="Times New Roman" panose="02020603050405020304" pitchFamily="18" charset="0"/>
+                  <a:cs typeface="Times New Roman" panose="02020603050405020304" pitchFamily="18" charset="0"/>
+                </a:endParaRPr>
+              </a:p>
+            </p:txBody>
+          </p:sp>
+          <p:pic>
+            <p:nvPicPr>
+              <p:cNvPr id="24" name="Picture 23"/>
+              <p:cNvPicPr>
+                <a:picLocks noChangeAspect="1"/>
+              </p:cNvPicPr>
+              <p:nvPr>
+                <p:custDataLst>
+                  <p:tags r:id="rId5"/>
+                </p:custDataLst>
+              </p:nvPr>
+            </p:nvPicPr>
+            <p:blipFill>
+              <a:blip r:embed="rId10" cstate="print">
+                <a:extLst>
+                  <a:ext uri="{28A0092B-C50C-407E-A947-70E740481C1C}">
+                    <a14:useLocalDpi xmlns:a14="http://schemas.microsoft.com/office/drawing/2010/main" val="0"/>
+                  </a:ext>
+                </a:extLst>
+              </a:blip>
+              <a:stretch>
+                <a:fillRect/>
+              </a:stretch>
+            </p:blipFill>
+            <p:spPr>
+              <a:xfrm>
+                <a:off x="1430601" y="2652398"/>
+                <a:ext cx="112762" cy="115810"/>
+              </a:xfrm>
+              <a:prstGeom prst="rect">
+                <a:avLst/>
+              </a:prstGeom>
+            </p:spPr>
+          </p:pic>
+          <p:pic>
+            <p:nvPicPr>
+              <p:cNvPr id="22" name="Picture 21"/>
+              <p:cNvPicPr>
+                <a:picLocks noChangeAspect="1"/>
+              </p:cNvPicPr>
+              <p:nvPr>
+                <p:custDataLst>
+                  <p:tags r:id="rId6"/>
+                </p:custDataLst>
+              </p:nvPr>
+            </p:nvPicPr>
+            <p:blipFill>
+              <a:blip r:embed="rId11" cstate="print">
+                <a:extLst>
+                  <a:ext uri="{28A0092B-C50C-407E-A947-70E740481C1C}">
+                    <a14:useLocalDpi xmlns:a14="http://schemas.microsoft.com/office/drawing/2010/main" val="0"/>
+                  </a:ext>
+                </a:extLst>
+              </a:blip>
+              <a:stretch>
+                <a:fillRect/>
+              </a:stretch>
+            </p:blipFill>
+            <p:spPr>
+              <a:xfrm>
+                <a:off x="1398601" y="208795"/>
+                <a:ext cx="144762" cy="111238"/>
+              </a:xfrm>
+              <a:prstGeom prst="rect">
+                <a:avLst/>
+              </a:prstGeom>
+            </p:spPr>
+          </p:pic>
+          <p:pic>
+            <p:nvPicPr>
+              <p:cNvPr id="23" name="Picture 22"/>
+              <p:cNvPicPr>
+                <a:picLocks noChangeAspect="1"/>
+              </p:cNvPicPr>
+              <p:nvPr>
+                <p:custDataLst>
+                  <p:tags r:id="rId7"/>
+                </p:custDataLst>
+              </p:nvPr>
+            </p:nvPicPr>
+            <p:blipFill>
+              <a:blip r:embed="rId12" cstate="print">
+                <a:extLst>
+                  <a:ext uri="{28A0092B-C50C-407E-A947-70E740481C1C}">
+                    <a14:useLocalDpi xmlns:a14="http://schemas.microsoft.com/office/drawing/2010/main" val="0"/>
+                  </a:ext>
+                </a:extLst>
+              </a:blip>
+              <a:stretch>
+                <a:fillRect/>
+              </a:stretch>
+            </p:blipFill>
+            <p:spPr>
+              <a:xfrm>
+                <a:off x="1397077" y="1381073"/>
+                <a:ext cx="146286" cy="173714"/>
+              </a:xfrm>
+              <a:prstGeom prst="rect">
+                <a:avLst/>
+              </a:prstGeom>
+            </p:spPr>
+          </p:pic>
+          <p:cxnSp>
+            <p:nvCxnSpPr>
+              <p:cNvPr id="33" name="Straight Arrow Connector 32"/>
+              <p:cNvCxnSpPr/>
+              <p:nvPr/>
+            </p:nvCxnSpPr>
+            <p:spPr>
+              <a:xfrm>
+                <a:off x="1639207" y="266700"/>
+                <a:ext cx="684323" cy="0"/>
+              </a:xfrm>
+              <a:prstGeom prst="straightConnector1">
+                <a:avLst/>
+              </a:prstGeom>
+              <a:ln w="12700">
+                <a:solidFill>
+                  <a:schemeClr val="tx1"/>
+                </a:solidFill>
+                <a:tailEnd type="triangle"/>
+              </a:ln>
+            </p:spPr>
+            <p:style>
+              <a:lnRef idx="1">
+                <a:schemeClr val="accent1"/>
+              </a:lnRef>
+              <a:fillRef idx="0">
+                <a:schemeClr val="accent1"/>
+              </a:fillRef>
+              <a:effectRef idx="0">
+                <a:schemeClr val="accent1"/>
+              </a:effectRef>
+              <a:fontRef idx="minor">
+                <a:schemeClr val="tx1"/>
+              </a:fontRef>
+            </p:style>
+          </p:cxnSp>
+          <p:cxnSp>
+            <p:nvCxnSpPr>
+              <p:cNvPr id="34" name="Straight Arrow Connector 33"/>
+              <p:cNvCxnSpPr/>
+              <p:nvPr/>
+            </p:nvCxnSpPr>
+            <p:spPr>
+              <a:xfrm>
+                <a:off x="1639207" y="2705100"/>
+                <a:ext cx="684323" cy="0"/>
+              </a:xfrm>
+              <a:prstGeom prst="straightConnector1">
+                <a:avLst/>
+              </a:prstGeom>
+              <a:ln w="12700">
+                <a:solidFill>
+                  <a:schemeClr val="tx1"/>
+                </a:solidFill>
+                <a:tailEnd type="triangle"/>
+              </a:ln>
+            </p:spPr>
+            <p:style>
+              <a:lnRef idx="1">
+                <a:schemeClr val="accent1"/>
+              </a:lnRef>
+              <a:fillRef idx="0">
+                <a:schemeClr val="accent1"/>
+              </a:fillRef>
+              <a:effectRef idx="0">
+                <a:schemeClr val="accent1"/>
+              </a:effectRef>
+              <a:fontRef idx="minor">
+                <a:schemeClr val="tx1"/>
+              </a:fontRef>
+            </p:style>
+          </p:cxnSp>
+          <p:cxnSp>
+            <p:nvCxnSpPr>
+              <p:cNvPr id="35" name="Elbow Connector 34"/>
+              <p:cNvCxnSpPr>
+                <a:stCxn id="47" idx="3"/>
+                <a:endCxn id="37" idx="0"/>
+              </p:cNvCxnSpPr>
+              <p:nvPr/>
+            </p:nvCxnSpPr>
+            <p:spPr>
+              <a:xfrm>
+                <a:off x="3468007" y="266700"/>
+                <a:ext cx="1485898" cy="650301"/>
+              </a:xfrm>
+              <a:prstGeom prst="bentConnector2">
+                <a:avLst/>
+              </a:prstGeom>
+              <a:ln w="12700">
+                <a:solidFill>
+                  <a:schemeClr val="tx1"/>
+                </a:solidFill>
+                <a:tailEnd type="triangle"/>
+              </a:ln>
+            </p:spPr>
+            <p:style>
+              <a:lnRef idx="1">
+                <a:schemeClr val="accent1"/>
+              </a:lnRef>
+              <a:fillRef idx="0">
+                <a:schemeClr val="accent1"/>
+              </a:fillRef>
+              <a:effectRef idx="0">
+                <a:schemeClr val="accent1"/>
+              </a:effectRef>
+              <a:fontRef idx="minor">
+                <a:schemeClr val="tx1"/>
+              </a:fontRef>
+            </p:style>
+          </p:cxnSp>
+          <p:cxnSp>
+            <p:nvCxnSpPr>
+              <p:cNvPr id="36" name="Elbow Connector 35"/>
+              <p:cNvCxnSpPr>
+                <a:stCxn id="48" idx="3"/>
+                <a:endCxn id="37" idx="2"/>
+              </p:cNvCxnSpPr>
+              <p:nvPr/>
+            </p:nvCxnSpPr>
+            <p:spPr>
+              <a:xfrm flipV="1">
+                <a:off x="3468007" y="2060001"/>
+                <a:ext cx="1485898" cy="645099"/>
+              </a:xfrm>
+              <a:prstGeom prst="bentConnector2">
+                <a:avLst/>
+              </a:prstGeom>
+              <a:ln w="12700">
+                <a:solidFill>
+                  <a:schemeClr val="tx1"/>
+                </a:solidFill>
+                <a:tailEnd type="triangle"/>
+              </a:ln>
+            </p:spPr>
+            <p:style>
+              <a:lnRef idx="1">
+                <a:schemeClr val="accent1"/>
+              </a:lnRef>
+              <a:fillRef idx="0">
+                <a:schemeClr val="accent1"/>
+              </a:fillRef>
+              <a:effectRef idx="0">
+                <a:schemeClr val="accent1"/>
+              </a:effectRef>
+              <a:fontRef idx="minor">
+                <a:schemeClr val="tx1"/>
+              </a:fontRef>
+            </p:style>
+          </p:cxnSp>
+          <p:sp>
+            <p:nvSpPr>
+              <p:cNvPr id="37" name="Rectangle 36"/>
+              <p:cNvSpPr/>
+              <p:nvPr/>
+            </p:nvSpPr>
+            <p:spPr>
+              <a:xfrm>
+                <a:off x="4153805" y="917001"/>
+                <a:ext cx="1600200" cy="1143000"/>
+              </a:xfrm>
+              <a:prstGeom prst="rect">
+                <a:avLst/>
+              </a:prstGeom>
+              <a:solidFill>
+                <a:schemeClr val="bg1">
+                  <a:lumMod val="95000"/>
+                </a:schemeClr>
+              </a:solidFill>
+              <a:ln w="12700">
+                <a:solidFill>
+                  <a:schemeClr val="tx1"/>
+                </a:solidFill>
+              </a:ln>
+            </p:spPr>
+            <p:style>
+              <a:lnRef idx="2">
+                <a:schemeClr val="accent1">
+                  <a:shade val="50000"/>
+                </a:schemeClr>
+              </a:lnRef>
+              <a:fillRef idx="1">
+                <a:schemeClr val="accent1"/>
+              </a:fillRef>
+              <a:effectRef idx="0">
+                <a:schemeClr val="accent1"/>
+              </a:effectRef>
+              <a:fontRef idx="minor">
+                <a:schemeClr val="lt1"/>
+              </a:fontRef>
+            </p:style>
+            <p:txBody>
+              <a:bodyPr rtlCol="0" anchor="ctr"/>
+              <a:lstStyle/>
+              <a:p>
+                <a:pPr algn="ctr"/>
+                <a:r>
+                  <a:rPr lang="en-US" dirty="0" smtClean="0">
+                    <a:ln w="0"/>
+                    <a:solidFill>
+                      <a:schemeClr val="tx1"/>
+                    </a:solidFill>
+                    <a:effectLst>
+                      <a:outerShdw blurRad="38100" dist="19050" dir="2700000" algn="tl" rotWithShape="0">
+                        <a:schemeClr val="dk1">
+                          <a:alpha val="40000"/>
+                        </a:schemeClr>
+                      </a:outerShdw>
+                    </a:effectLst>
                     <a:latin typeface="Times New Roman" panose="02020603050405020304" pitchFamily="18" charset="0"/>
                     <a:cs typeface="Times New Roman" panose="02020603050405020304" pitchFamily="18" charset="0"/>
-                  </a:endParaRPr>
-                </a:p>
-              </p:txBody>
-            </p:sp>
-          </p:grpSp>
-          <p:grpSp>
-            <p:nvGrpSpPr>
-              <p:cNvPr id="68" name="Group 67"/>
-              <p:cNvGrpSpPr/>
+                  </a:rPr>
+                  <a:t>Complex</a:t>
+                </a:r>
+              </a:p>
+              <a:p>
+                <a:pPr algn="ctr"/>
+                <a:r>
+                  <a:rPr lang="en-US" dirty="0" smtClean="0">
+                    <a:ln w="0"/>
+                    <a:solidFill>
+                      <a:schemeClr val="tx1"/>
+                    </a:solidFill>
+                    <a:effectLst>
+                      <a:outerShdw blurRad="38100" dist="19050" dir="2700000" algn="tl" rotWithShape="0">
+                        <a:schemeClr val="dk1">
+                          <a:alpha val="40000"/>
+                        </a:schemeClr>
+                      </a:outerShdw>
+                    </a:effectLst>
+                    <a:latin typeface="Times New Roman" panose="02020603050405020304" pitchFamily="18" charset="0"/>
+                    <a:cs typeface="Times New Roman" panose="02020603050405020304" pitchFamily="18" charset="0"/>
+                  </a:rPr>
+                  <a:t>Multiplication</a:t>
+                </a:r>
+                <a:endParaRPr lang="en-US" dirty="0">
+                  <a:latin typeface="Times New Roman" panose="02020603050405020304" pitchFamily="18" charset="0"/>
+                  <a:cs typeface="Times New Roman" panose="02020603050405020304" pitchFamily="18" charset="0"/>
+                </a:endParaRPr>
+              </a:p>
+            </p:txBody>
+          </p:sp>
+          <p:sp>
+            <p:nvSpPr>
+              <p:cNvPr id="49" name="Rectangle 48"/>
+              <p:cNvSpPr/>
               <p:nvPr/>
-            </p:nvGrpSpPr>
-            <p:grpSpPr>
+            </p:nvSpPr>
+            <p:spPr>
               <a:xfrm>
-                <a:off x="4092517" y="4778572"/>
-                <a:ext cx="685800" cy="566123"/>
-                <a:chOff x="4092517" y="4775616"/>
-                <a:chExt cx="685800" cy="566123"/>
+                <a:off x="2325007" y="917001"/>
+                <a:ext cx="1143000" cy="1143000"/>
               </a:xfrm>
-            </p:grpSpPr>
-            <p:cxnSp>
-              <p:nvCxnSpPr>
-                <p:cNvPr id="55" name="Straight Arrow Connector 54"/>
-                <p:cNvCxnSpPr/>
-                <p:nvPr/>
-              </p:nvCxnSpPr>
-              <p:spPr>
-                <a:xfrm>
-                  <a:off x="4093994" y="4775616"/>
-                  <a:ext cx="684323" cy="0"/>
-                </a:xfrm>
-                <a:prstGeom prst="straightConnector1">
-                  <a:avLst/>
-                </a:prstGeom>
-                <a:ln w="12700">
-                  <a:solidFill>
-                    <a:schemeClr val="tx1"/>
-                  </a:solidFill>
-                  <a:tailEnd type="triangle"/>
-                </a:ln>
-              </p:spPr>
-              <p:style>
-                <a:lnRef idx="1">
-                  <a:schemeClr val="accent1"/>
-                </a:lnRef>
-                <a:fillRef idx="0">
-                  <a:schemeClr val="accent1"/>
-                </a:fillRef>
-                <a:effectRef idx="0">
-                  <a:schemeClr val="accent1"/>
-                </a:effectRef>
-                <a:fontRef idx="minor">
+              <a:prstGeom prst="rect">
+                <a:avLst/>
+              </a:prstGeom>
+              <a:solidFill>
+                <a:schemeClr val="bg1">
+                  <a:lumMod val="95000"/>
+                </a:schemeClr>
+              </a:solidFill>
+              <a:ln w="12700">
+                <a:solidFill>
                   <a:schemeClr val="tx1"/>
-                </a:fontRef>
-              </p:style>
-            </p:cxnSp>
-            <p:cxnSp>
-              <p:nvCxnSpPr>
-                <p:cNvPr id="63" name="Straight Arrow Connector 62"/>
-                <p:cNvCxnSpPr/>
-                <p:nvPr/>
-              </p:nvCxnSpPr>
-              <p:spPr>
-                <a:xfrm>
-                  <a:off x="4093994" y="5341739"/>
-                  <a:ext cx="684323" cy="0"/>
-                </a:xfrm>
-                <a:prstGeom prst="straightConnector1">
-                  <a:avLst/>
-                </a:prstGeom>
-                <a:ln w="12700">
-                  <a:solidFill>
-                    <a:schemeClr val="tx1"/>
-                  </a:solidFill>
-                  <a:tailEnd type="triangle"/>
-                </a:ln>
-              </p:spPr>
-              <p:style>
-                <a:lnRef idx="1">
-                  <a:schemeClr val="accent1"/>
-                </a:lnRef>
-                <a:fillRef idx="0">
-                  <a:schemeClr val="accent1"/>
-                </a:fillRef>
-                <a:effectRef idx="0">
-                  <a:schemeClr val="accent1"/>
-                </a:effectRef>
-                <a:fontRef idx="minor">
+                </a:solidFill>
+              </a:ln>
+            </p:spPr>
+            <p:style>
+              <a:lnRef idx="2">
+                <a:schemeClr val="accent1">
+                  <a:shade val="50000"/>
+                </a:schemeClr>
+              </a:lnRef>
+              <a:fillRef idx="1">
+                <a:schemeClr val="accent1"/>
+              </a:fillRef>
+              <a:effectRef idx="0">
+                <a:schemeClr val="accent1"/>
+              </a:effectRef>
+              <a:fontRef idx="minor">
+                <a:schemeClr val="lt1"/>
+              </a:fontRef>
+            </p:style>
+            <p:txBody>
+              <a:bodyPr rtlCol="0" anchor="ctr"/>
+              <a:lstStyle/>
+              <a:p>
+                <a:pPr algn="ctr"/>
+                <a:r>
+                  <a:rPr lang="en-US" dirty="0" smtClean="0">
+                    <a:ln w="0"/>
+                    <a:solidFill>
+                      <a:schemeClr val="tx1"/>
+                    </a:solidFill>
+                    <a:effectLst>
+                      <a:outerShdw blurRad="38100" dist="19050" dir="2700000" algn="tl" rotWithShape="0">
+                        <a:schemeClr val="dk1">
+                          <a:alpha val="40000"/>
+                        </a:schemeClr>
+                      </a:outerShdw>
+                    </a:effectLst>
+                    <a:latin typeface="Times New Roman" panose="02020603050405020304" pitchFamily="18" charset="0"/>
+                    <a:cs typeface="Times New Roman" panose="02020603050405020304" pitchFamily="18" charset="0"/>
+                  </a:rPr>
+                  <a:t>FFT</a:t>
+                </a:r>
+                <a:endParaRPr lang="en-US" dirty="0">
+                  <a:latin typeface="Times New Roman" panose="02020603050405020304" pitchFamily="18" charset="0"/>
+                  <a:cs typeface="Times New Roman" panose="02020603050405020304" pitchFamily="18" charset="0"/>
+                </a:endParaRPr>
+              </a:p>
+            </p:txBody>
+          </p:sp>
+          <p:cxnSp>
+            <p:nvCxnSpPr>
+              <p:cNvPr id="50" name="Straight Arrow Connector 49"/>
+              <p:cNvCxnSpPr/>
+              <p:nvPr/>
+            </p:nvCxnSpPr>
+            <p:spPr>
+              <a:xfrm>
+                <a:off x="1639207" y="1487634"/>
+                <a:ext cx="684323" cy="0"/>
+              </a:xfrm>
+              <a:prstGeom prst="straightConnector1">
+                <a:avLst/>
+              </a:prstGeom>
+              <a:ln w="12700">
+                <a:solidFill>
                   <a:schemeClr val="tx1"/>
-                </a:fontRef>
-              </p:style>
-            </p:cxnSp>
-            <p:cxnSp>
-              <p:nvCxnSpPr>
-                <p:cNvPr id="65" name="Straight Arrow Connector 64"/>
-                <p:cNvCxnSpPr/>
-                <p:nvPr/>
-              </p:nvCxnSpPr>
-              <p:spPr>
-                <a:xfrm>
-                  <a:off x="4092517" y="5060876"/>
-                  <a:ext cx="684323" cy="0"/>
-                </a:xfrm>
-                <a:prstGeom prst="straightConnector1">
-                  <a:avLst/>
-                </a:prstGeom>
-                <a:ln w="12700">
-                  <a:solidFill>
-                    <a:schemeClr val="tx1"/>
-                  </a:solidFill>
-                  <a:tailEnd type="triangle"/>
-                </a:ln>
-              </p:spPr>
-              <p:style>
-                <a:lnRef idx="1">
-                  <a:schemeClr val="accent1"/>
-                </a:lnRef>
-                <a:fillRef idx="0">
-                  <a:schemeClr val="accent1"/>
-                </a:fillRef>
-                <a:effectRef idx="0">
-                  <a:schemeClr val="accent1"/>
-                </a:effectRef>
-                <a:fontRef idx="minor">
+                </a:solidFill>
+                <a:tailEnd type="triangle"/>
+              </a:ln>
+            </p:spPr>
+            <p:style>
+              <a:lnRef idx="1">
+                <a:schemeClr val="accent1"/>
+              </a:lnRef>
+              <a:fillRef idx="0">
+                <a:schemeClr val="accent1"/>
+              </a:fillRef>
+              <a:effectRef idx="0">
+                <a:schemeClr val="accent1"/>
+              </a:effectRef>
+              <a:fontRef idx="minor">
+                <a:schemeClr val="tx1"/>
+              </a:fontRef>
+            </p:style>
+          </p:cxnSp>
+          <p:cxnSp>
+            <p:nvCxnSpPr>
+              <p:cNvPr id="51" name="Straight Arrow Connector 50"/>
+              <p:cNvCxnSpPr>
+                <a:stCxn id="49" idx="3"/>
+                <a:endCxn id="37" idx="1"/>
+              </p:cNvCxnSpPr>
+              <p:nvPr/>
+            </p:nvCxnSpPr>
+            <p:spPr>
+              <a:xfrm>
+                <a:off x="3468007" y="1488501"/>
+                <a:ext cx="685798" cy="0"/>
+              </a:xfrm>
+              <a:prstGeom prst="straightConnector1">
+                <a:avLst/>
+              </a:prstGeom>
+              <a:ln w="12700">
+                <a:solidFill>
                   <a:schemeClr val="tx1"/>
-                </a:fontRef>
-              </p:style>
-            </p:cxnSp>
-          </p:grpSp>
+                </a:solidFill>
+                <a:tailEnd type="triangle"/>
+              </a:ln>
+            </p:spPr>
+            <p:style>
+              <a:lnRef idx="1">
+                <a:schemeClr val="accent1"/>
+              </a:lnRef>
+              <a:fillRef idx="0">
+                <a:schemeClr val="accent1"/>
+              </a:fillRef>
+              <a:effectRef idx="0">
+                <a:schemeClr val="accent1"/>
+              </a:effectRef>
+              <a:fontRef idx="minor">
+                <a:schemeClr val="tx1"/>
+              </a:fontRef>
+            </p:style>
+          </p:cxnSp>
+          <p:sp>
+            <p:nvSpPr>
+              <p:cNvPr id="53" name="Rectangle 52"/>
+              <p:cNvSpPr/>
+              <p:nvPr/>
+            </p:nvSpPr>
+            <p:spPr>
+              <a:xfrm>
+                <a:off x="6442184" y="917001"/>
+                <a:ext cx="1143000" cy="1143000"/>
+              </a:xfrm>
+              <a:prstGeom prst="rect">
+                <a:avLst/>
+              </a:prstGeom>
+              <a:solidFill>
+                <a:schemeClr val="bg1">
+                  <a:lumMod val="95000"/>
+                </a:schemeClr>
+              </a:solidFill>
+              <a:ln w="12700">
+                <a:solidFill>
+                  <a:schemeClr val="tx1"/>
+                </a:solidFill>
+              </a:ln>
+            </p:spPr>
+            <p:style>
+              <a:lnRef idx="2">
+                <a:schemeClr val="accent1">
+                  <a:shade val="50000"/>
+                </a:schemeClr>
+              </a:lnRef>
+              <a:fillRef idx="1">
+                <a:schemeClr val="accent1"/>
+              </a:fillRef>
+              <a:effectRef idx="0">
+                <a:schemeClr val="accent1"/>
+              </a:effectRef>
+              <a:fontRef idx="minor">
+                <a:schemeClr val="lt1"/>
+              </a:fontRef>
+            </p:style>
+            <p:txBody>
+              <a:bodyPr rtlCol="0" anchor="ctr"/>
+              <a:lstStyle/>
+              <a:p>
+                <a:pPr algn="ctr"/>
+                <a:r>
+                  <a:rPr lang="en-US" dirty="0" smtClean="0">
+                    <a:ln w="0"/>
+                    <a:solidFill>
+                      <a:schemeClr val="tx1"/>
+                    </a:solidFill>
+                    <a:effectLst>
+                      <a:outerShdw blurRad="38100" dist="19050" dir="2700000" algn="tl" rotWithShape="0">
+                        <a:schemeClr val="dk1">
+                          <a:alpha val="40000"/>
+                        </a:schemeClr>
+                      </a:outerShdw>
+                    </a:effectLst>
+                    <a:latin typeface="Times New Roman" panose="02020603050405020304" pitchFamily="18" charset="0"/>
+                    <a:cs typeface="Times New Roman" panose="02020603050405020304" pitchFamily="18" charset="0"/>
+                  </a:rPr>
+                  <a:t>IFFT</a:t>
+                </a:r>
+                <a:endParaRPr lang="en-US" dirty="0">
+                  <a:latin typeface="Times New Roman" panose="02020603050405020304" pitchFamily="18" charset="0"/>
+                  <a:cs typeface="Times New Roman" panose="02020603050405020304" pitchFamily="18" charset="0"/>
+                </a:endParaRPr>
+              </a:p>
+            </p:txBody>
+          </p:sp>
+          <p:cxnSp>
+            <p:nvCxnSpPr>
+              <p:cNvPr id="56" name="Straight Arrow Connector 55"/>
+              <p:cNvCxnSpPr>
+                <a:stCxn id="37" idx="3"/>
+                <a:endCxn id="53" idx="1"/>
+              </p:cNvCxnSpPr>
+              <p:nvPr/>
+            </p:nvCxnSpPr>
+            <p:spPr>
+              <a:xfrm>
+                <a:off x="5754005" y="1488501"/>
+                <a:ext cx="688179" cy="0"/>
+              </a:xfrm>
+              <a:prstGeom prst="straightConnector1">
+                <a:avLst/>
+              </a:prstGeom>
+              <a:ln w="12700">
+                <a:solidFill>
+                  <a:schemeClr val="tx1"/>
+                </a:solidFill>
+                <a:tailEnd type="triangle"/>
+              </a:ln>
+            </p:spPr>
+            <p:style>
+              <a:lnRef idx="1">
+                <a:schemeClr val="accent1"/>
+              </a:lnRef>
+              <a:fillRef idx="0">
+                <a:schemeClr val="accent1"/>
+              </a:fillRef>
+              <a:effectRef idx="0">
+                <a:schemeClr val="accent1"/>
+              </a:effectRef>
+              <a:fontRef idx="minor">
+                <a:schemeClr val="tx1"/>
+              </a:fontRef>
+            </p:style>
+          </p:cxnSp>
+          <p:sp>
+            <p:nvSpPr>
+              <p:cNvPr id="58" name="Rectangle 57"/>
+              <p:cNvSpPr/>
+              <p:nvPr/>
+            </p:nvSpPr>
+            <p:spPr>
+              <a:xfrm>
+                <a:off x="8273363" y="916134"/>
+                <a:ext cx="1600200" cy="1143000"/>
+              </a:xfrm>
+              <a:prstGeom prst="rect">
+                <a:avLst/>
+              </a:prstGeom>
+              <a:solidFill>
+                <a:schemeClr val="bg1">
+                  <a:lumMod val="95000"/>
+                </a:schemeClr>
+              </a:solidFill>
+              <a:ln w="12700">
+                <a:solidFill>
+                  <a:schemeClr val="tx1"/>
+                </a:solidFill>
+              </a:ln>
+            </p:spPr>
+            <p:style>
+              <a:lnRef idx="2">
+                <a:schemeClr val="accent1">
+                  <a:shade val="50000"/>
+                </a:schemeClr>
+              </a:lnRef>
+              <a:fillRef idx="1">
+                <a:schemeClr val="accent1"/>
+              </a:fillRef>
+              <a:effectRef idx="0">
+                <a:schemeClr val="accent1"/>
+              </a:effectRef>
+              <a:fontRef idx="minor">
+                <a:schemeClr val="lt1"/>
+              </a:fontRef>
+            </p:style>
+            <p:txBody>
+              <a:bodyPr rtlCol="0" anchor="ctr"/>
+              <a:lstStyle/>
+              <a:p>
+                <a:pPr algn="ctr"/>
+                <a:r>
+                  <a:rPr lang="en-US" dirty="0">
+                    <a:ln w="0"/>
+                    <a:solidFill>
+                      <a:schemeClr val="tx1"/>
+                    </a:solidFill>
+                    <a:effectLst>
+                      <a:outerShdw blurRad="38100" dist="19050" dir="2700000" algn="tl" rotWithShape="0">
+                        <a:schemeClr val="dk1">
+                          <a:alpha val="40000"/>
+                        </a:schemeClr>
+                      </a:outerShdw>
+                    </a:effectLst>
+                    <a:latin typeface="Times New Roman" panose="02020603050405020304" pitchFamily="18" charset="0"/>
+                    <a:cs typeface="Times New Roman" panose="02020603050405020304" pitchFamily="18" charset="0"/>
+                  </a:rPr>
+                  <a:t>Scalar Multiplication</a:t>
+                </a:r>
+                <a:endParaRPr lang="en-US" dirty="0">
+                  <a:latin typeface="Times New Roman" panose="02020603050405020304" pitchFamily="18" charset="0"/>
+                  <a:cs typeface="Times New Roman" panose="02020603050405020304" pitchFamily="18" charset="0"/>
+                </a:endParaRPr>
+              </a:p>
+            </p:txBody>
+          </p:sp>
+          <p:cxnSp>
+            <p:nvCxnSpPr>
+              <p:cNvPr id="62" name="Straight Arrow Connector 61"/>
+              <p:cNvCxnSpPr>
+                <a:stCxn id="53" idx="3"/>
+                <a:endCxn id="58" idx="1"/>
+              </p:cNvCxnSpPr>
+              <p:nvPr/>
+            </p:nvCxnSpPr>
+            <p:spPr>
+              <a:xfrm flipV="1">
+                <a:off x="7585184" y="1487634"/>
+                <a:ext cx="688179" cy="867"/>
+              </a:xfrm>
+              <a:prstGeom prst="straightConnector1">
+                <a:avLst/>
+              </a:prstGeom>
+              <a:ln w="12700">
+                <a:solidFill>
+                  <a:schemeClr val="tx1"/>
+                </a:solidFill>
+                <a:tailEnd type="triangle"/>
+              </a:ln>
+            </p:spPr>
+            <p:style>
+              <a:lnRef idx="1">
+                <a:schemeClr val="accent1"/>
+              </a:lnRef>
+              <a:fillRef idx="0">
+                <a:schemeClr val="accent1"/>
+              </a:fillRef>
+              <a:effectRef idx="0">
+                <a:schemeClr val="accent1"/>
+              </a:effectRef>
+              <a:fontRef idx="minor">
+                <a:schemeClr val="tx1"/>
+              </a:fontRef>
+            </p:style>
+          </p:cxnSp>
+          <p:cxnSp>
+            <p:nvCxnSpPr>
+              <p:cNvPr id="67" name="Straight Arrow Connector 66"/>
+              <p:cNvCxnSpPr/>
+              <p:nvPr/>
+            </p:nvCxnSpPr>
+            <p:spPr>
+              <a:xfrm flipV="1">
+                <a:off x="9873563" y="1487634"/>
+                <a:ext cx="688179" cy="867"/>
+              </a:xfrm>
+              <a:prstGeom prst="straightConnector1">
+                <a:avLst/>
+              </a:prstGeom>
+              <a:ln w="12700">
+                <a:solidFill>
+                  <a:schemeClr val="tx1"/>
+                </a:solidFill>
+                <a:tailEnd type="triangle"/>
+              </a:ln>
+            </p:spPr>
+            <p:style>
+              <a:lnRef idx="1">
+                <a:schemeClr val="accent1"/>
+              </a:lnRef>
+              <a:fillRef idx="0">
+                <a:schemeClr val="accent1"/>
+              </a:fillRef>
+              <a:effectRef idx="0">
+                <a:schemeClr val="accent1"/>
+              </a:effectRef>
+              <a:fontRef idx="minor">
+                <a:schemeClr val="tx1"/>
+              </a:fontRef>
+            </p:style>
+          </p:cxnSp>
           <p:pic>
             <p:nvPicPr>
-              <p:cNvPr id="52" name="Picture 51"/>
+              <p:cNvPr id="25" name="Picture 24"/>
+              <p:cNvPicPr>
+                <a:picLocks noChangeAspect="1"/>
+              </p:cNvPicPr>
+              <p:nvPr>
+                <p:custDataLst>
+                  <p:tags r:id="rId8"/>
+                </p:custDataLst>
+              </p:nvPr>
+            </p:nvPicPr>
+            <p:blipFill>
+              <a:blip r:embed="rId13" cstate="print">
+                <a:extLst>
+                  <a:ext uri="{28A0092B-C50C-407E-A947-70E740481C1C}">
+                    <a14:useLocalDpi xmlns:a14="http://schemas.microsoft.com/office/drawing/2010/main" val="0"/>
+                  </a:ext>
+                </a:extLst>
+              </a:blip>
+              <a:stretch>
+                <a:fillRect/>
+              </a:stretch>
+            </p:blipFill>
+            <p:spPr>
+              <a:xfrm>
+                <a:off x="10651685" y="1411425"/>
+                <a:ext cx="143238" cy="163048"/>
+              </a:xfrm>
+              <a:prstGeom prst="rect">
+                <a:avLst/>
+              </a:prstGeom>
+            </p:spPr>
+          </p:pic>
+        </p:grpSp>
+        <p:grpSp>
+          <p:nvGrpSpPr>
+            <p:cNvPr id="107" name="Group 106"/>
+            <p:cNvGrpSpPr/>
+            <p:nvPr/>
+          </p:nvGrpSpPr>
+          <p:grpSpPr>
+            <a:xfrm>
+              <a:off x="3258653" y="-533400"/>
+              <a:ext cx="5681462" cy="3774756"/>
+              <a:chOff x="3258653" y="3581400"/>
+              <a:chExt cx="5681462" cy="3774756"/>
+            </a:xfrm>
+          </p:grpSpPr>
+          <p:sp>
+            <p:nvSpPr>
+              <p:cNvPr id="76" name="Rectangle 75"/>
+              <p:cNvSpPr/>
+              <p:nvPr/>
+            </p:nvSpPr>
+            <p:spPr>
+              <a:xfrm>
+                <a:off x="4163309" y="5506499"/>
+                <a:ext cx="1600200" cy="1143000"/>
+              </a:xfrm>
+              <a:prstGeom prst="rect">
+                <a:avLst/>
+              </a:prstGeom>
+              <a:solidFill>
+                <a:schemeClr val="bg1">
+                  <a:lumMod val="95000"/>
+                </a:schemeClr>
+              </a:solidFill>
+              <a:ln w="12700">
+                <a:solidFill>
+                  <a:schemeClr val="tx1"/>
+                </a:solidFill>
+              </a:ln>
+            </p:spPr>
+            <p:style>
+              <a:lnRef idx="2">
+                <a:schemeClr val="accent1">
+                  <a:shade val="50000"/>
+                </a:schemeClr>
+              </a:lnRef>
+              <a:fillRef idx="1">
+                <a:schemeClr val="accent1"/>
+              </a:fillRef>
+              <a:effectRef idx="0">
+                <a:schemeClr val="accent1"/>
+              </a:effectRef>
+              <a:fontRef idx="minor">
+                <a:schemeClr val="lt1"/>
+              </a:fontRef>
+            </p:style>
+            <p:txBody>
+              <a:bodyPr rtlCol="0" anchor="ctr"/>
+              <a:lstStyle/>
+              <a:p>
+                <a:pPr algn="ctr"/>
+                <a:r>
+                  <a:rPr lang="en-US" dirty="0">
+                    <a:ln w="0"/>
+                    <a:solidFill>
+                      <a:schemeClr val="tx1"/>
+                    </a:solidFill>
+                    <a:effectLst>
+                      <a:outerShdw blurRad="38100" dist="19050" dir="2700000" algn="tl" rotWithShape="0">
+                        <a:schemeClr val="dk1">
+                          <a:alpha val="40000"/>
+                        </a:schemeClr>
+                      </a:outerShdw>
+                    </a:effectLst>
+                    <a:latin typeface="Times New Roman" panose="02020603050405020304" pitchFamily="18" charset="0"/>
+                    <a:cs typeface="Times New Roman" panose="02020603050405020304" pitchFamily="18" charset="0"/>
+                  </a:rPr>
+                  <a:t>Time-domain Convolution</a:t>
+                </a:r>
+                <a:endParaRPr lang="en-US" dirty="0">
+                  <a:latin typeface="Times New Roman" panose="02020603050405020304" pitchFamily="18" charset="0"/>
+                  <a:cs typeface="Times New Roman" panose="02020603050405020304" pitchFamily="18" charset="0"/>
+                </a:endParaRPr>
+              </a:p>
+            </p:txBody>
+          </p:sp>
+          <p:pic>
+            <p:nvPicPr>
+              <p:cNvPr id="31" name="Picture 30"/>
+              <p:cNvPicPr>
+                <a:picLocks noChangeAspect="1"/>
+              </p:cNvPicPr>
+              <p:nvPr>
+                <p:custDataLst>
+                  <p:tags r:id="rId1"/>
+                </p:custDataLst>
+              </p:nvPr>
+            </p:nvPicPr>
+            <p:blipFill>
+              <a:blip r:embed="rId11" cstate="print">
+                <a:extLst>
+                  <a:ext uri="{28A0092B-C50C-407E-A947-70E740481C1C}">
+                    <a14:useLocalDpi xmlns:a14="http://schemas.microsoft.com/office/drawing/2010/main" val="0"/>
+                  </a:ext>
+                </a:extLst>
+              </a:blip>
+              <a:stretch>
+                <a:fillRect/>
+              </a:stretch>
+            </p:blipFill>
+            <p:spPr>
+              <a:xfrm>
+                <a:off x="5537886" y="3581400"/>
+                <a:ext cx="144762" cy="111238"/>
+              </a:xfrm>
+              <a:prstGeom prst="rect">
+                <a:avLst/>
+              </a:prstGeom>
+            </p:spPr>
+          </p:pic>
+          <p:cxnSp>
+            <p:nvCxnSpPr>
+              <p:cNvPr id="83" name="Elbow Connector 82"/>
+              <p:cNvCxnSpPr>
+                <a:endCxn id="76" idx="0"/>
+              </p:cNvCxnSpPr>
+              <p:nvPr/>
+            </p:nvCxnSpPr>
+            <p:spPr>
+              <a:xfrm>
+                <a:off x="3477479" y="4861424"/>
+                <a:ext cx="1485930" cy="645075"/>
+              </a:xfrm>
+              <a:prstGeom prst="bentConnector2">
+                <a:avLst/>
+              </a:prstGeom>
+              <a:ln w="12700">
+                <a:solidFill>
+                  <a:schemeClr val="tx1"/>
+                </a:solidFill>
+                <a:tailEnd type="triangle"/>
+              </a:ln>
+            </p:spPr>
+            <p:style>
+              <a:lnRef idx="1">
+                <a:schemeClr val="accent1"/>
+              </a:lnRef>
+              <a:fillRef idx="0">
+                <a:schemeClr val="accent1"/>
+              </a:fillRef>
+              <a:effectRef idx="0">
+                <a:schemeClr val="accent1"/>
+              </a:effectRef>
+              <a:fontRef idx="minor">
+                <a:schemeClr val="tx1"/>
+              </a:fontRef>
+            </p:style>
+          </p:cxnSp>
+          <p:cxnSp>
+            <p:nvCxnSpPr>
+              <p:cNvPr id="84" name="Elbow Connector 83"/>
+              <p:cNvCxnSpPr>
+                <a:endCxn id="76" idx="2"/>
+              </p:cNvCxnSpPr>
+              <p:nvPr/>
+            </p:nvCxnSpPr>
+            <p:spPr>
+              <a:xfrm flipV="1">
+                <a:off x="3477479" y="6649499"/>
+                <a:ext cx="1485930" cy="648753"/>
+              </a:xfrm>
+              <a:prstGeom prst="bentConnector2">
+                <a:avLst/>
+              </a:prstGeom>
+              <a:ln w="12700">
+                <a:solidFill>
+                  <a:schemeClr val="tx1"/>
+                </a:solidFill>
+                <a:tailEnd type="triangle"/>
+              </a:ln>
+            </p:spPr>
+            <p:style>
+              <a:lnRef idx="1">
+                <a:schemeClr val="accent1"/>
+              </a:lnRef>
+              <a:fillRef idx="0">
+                <a:schemeClr val="accent1"/>
+              </a:fillRef>
+              <a:effectRef idx="0">
+                <a:schemeClr val="accent1"/>
+              </a:effectRef>
+              <a:fontRef idx="minor">
+                <a:schemeClr val="tx1"/>
+              </a:fontRef>
+            </p:style>
+          </p:cxnSp>
+          <p:pic>
+            <p:nvPicPr>
+              <p:cNvPr id="105" name="Picture 104"/>
+              <p:cNvPicPr>
+                <a:picLocks noChangeAspect="1"/>
+              </p:cNvPicPr>
+              <p:nvPr>
+                <p:custDataLst>
+                  <p:tags r:id="rId2"/>
+                </p:custDataLst>
+              </p:nvPr>
+            </p:nvPicPr>
+            <p:blipFill>
+              <a:blip r:embed="rId10" cstate="print">
+                <a:extLst>
+                  <a:ext uri="{28A0092B-C50C-407E-A947-70E740481C1C}">
+                    <a14:useLocalDpi xmlns:a14="http://schemas.microsoft.com/office/drawing/2010/main" val="0"/>
+                  </a:ext>
+                </a:extLst>
+              </a:blip>
+              <a:stretch>
+                <a:fillRect/>
+              </a:stretch>
+            </p:blipFill>
+            <p:spPr>
+              <a:xfrm>
+                <a:off x="3292177" y="7240347"/>
+                <a:ext cx="112762" cy="115809"/>
+              </a:xfrm>
+              <a:prstGeom prst="rect">
+                <a:avLst/>
+              </a:prstGeom>
+            </p:spPr>
+          </p:pic>
+          <p:sp>
+            <p:nvSpPr>
+              <p:cNvPr id="88" name="Rectangle 87"/>
+              <p:cNvSpPr/>
+              <p:nvPr/>
+            </p:nvSpPr>
+            <p:spPr>
+              <a:xfrm>
+                <a:off x="6449339" y="4281480"/>
+                <a:ext cx="1600200" cy="1143000"/>
+              </a:xfrm>
+              <a:prstGeom prst="rect">
+                <a:avLst/>
+              </a:prstGeom>
+              <a:solidFill>
+                <a:schemeClr val="bg1">
+                  <a:lumMod val="95000"/>
+                </a:schemeClr>
+              </a:solidFill>
+              <a:ln w="12700">
+                <a:solidFill>
+                  <a:schemeClr val="tx1"/>
+                </a:solidFill>
+              </a:ln>
+            </p:spPr>
+            <p:style>
+              <a:lnRef idx="2">
+                <a:schemeClr val="accent1">
+                  <a:shade val="50000"/>
+                </a:schemeClr>
+              </a:lnRef>
+              <a:fillRef idx="1">
+                <a:schemeClr val="accent1"/>
+              </a:fillRef>
+              <a:effectRef idx="0">
+                <a:schemeClr val="accent1"/>
+              </a:effectRef>
+              <a:fontRef idx="minor">
+                <a:schemeClr val="lt1"/>
+              </a:fontRef>
+            </p:style>
+            <p:txBody>
+              <a:bodyPr rtlCol="0" anchor="ctr"/>
+              <a:lstStyle/>
+              <a:p>
+                <a:pPr algn="ctr"/>
+                <a:r>
+                  <a:rPr lang="en-US" dirty="0">
+                    <a:ln w="0"/>
+                    <a:solidFill>
+                      <a:schemeClr val="tx1"/>
+                    </a:solidFill>
+                    <a:effectLst>
+                      <a:outerShdw blurRad="38100" dist="19050" dir="2700000" algn="tl" rotWithShape="0">
+                        <a:schemeClr val="dk1">
+                          <a:alpha val="40000"/>
+                        </a:schemeClr>
+                      </a:outerShdw>
+                    </a:effectLst>
+                    <a:latin typeface="Times New Roman" panose="02020603050405020304" pitchFamily="18" charset="0"/>
+                    <a:cs typeface="Times New Roman" panose="02020603050405020304" pitchFamily="18" charset="0"/>
+                  </a:rPr>
+                  <a:t>Time-domain Convolution</a:t>
+                </a:r>
+                <a:endParaRPr lang="en-US" dirty="0">
+                  <a:latin typeface="Times New Roman" panose="02020603050405020304" pitchFamily="18" charset="0"/>
+                  <a:cs typeface="Times New Roman" panose="02020603050405020304" pitchFamily="18" charset="0"/>
+                </a:endParaRPr>
+              </a:p>
+            </p:txBody>
+          </p:sp>
+          <p:cxnSp>
+            <p:nvCxnSpPr>
+              <p:cNvPr id="91" name="Elbow Connector 90"/>
+              <p:cNvCxnSpPr>
+                <a:endCxn id="88" idx="0"/>
+              </p:cNvCxnSpPr>
+              <p:nvPr/>
+            </p:nvCxnSpPr>
+            <p:spPr>
+              <a:xfrm>
+                <a:off x="5763509" y="3636405"/>
+                <a:ext cx="1485930" cy="645075"/>
+              </a:xfrm>
+              <a:prstGeom prst="bentConnector2">
+                <a:avLst/>
+              </a:prstGeom>
+              <a:ln w="12700">
+                <a:solidFill>
+                  <a:schemeClr val="tx1"/>
+                </a:solidFill>
+                <a:tailEnd type="triangle"/>
+              </a:ln>
+            </p:spPr>
+            <p:style>
+              <a:lnRef idx="1">
+                <a:schemeClr val="accent1"/>
+              </a:lnRef>
+              <a:fillRef idx="0">
+                <a:schemeClr val="accent1"/>
+              </a:fillRef>
+              <a:effectRef idx="0">
+                <a:schemeClr val="accent1"/>
+              </a:effectRef>
+              <a:fontRef idx="minor">
+                <a:schemeClr val="tx1"/>
+              </a:fontRef>
+            </p:style>
+          </p:cxnSp>
+          <p:cxnSp>
+            <p:nvCxnSpPr>
+              <p:cNvPr id="92" name="Elbow Connector 91"/>
+              <p:cNvCxnSpPr>
+                <a:endCxn id="88" idx="2"/>
+              </p:cNvCxnSpPr>
+              <p:nvPr/>
+            </p:nvCxnSpPr>
+            <p:spPr>
+              <a:xfrm flipV="1">
+                <a:off x="5763509" y="5424480"/>
+                <a:ext cx="1485930" cy="648753"/>
+              </a:xfrm>
+              <a:prstGeom prst="bentConnector2">
+                <a:avLst/>
+              </a:prstGeom>
+              <a:ln w="12700">
+                <a:solidFill>
+                  <a:schemeClr val="tx1"/>
+                </a:solidFill>
+                <a:tailEnd type="triangle"/>
+              </a:ln>
+            </p:spPr>
+            <p:style>
+              <a:lnRef idx="1">
+                <a:schemeClr val="accent1"/>
+              </a:lnRef>
+              <a:fillRef idx="0">
+                <a:schemeClr val="accent1"/>
+              </a:fillRef>
+              <a:effectRef idx="0">
+                <a:schemeClr val="accent1"/>
+              </a:effectRef>
+              <a:fontRef idx="minor">
+                <a:schemeClr val="tx1"/>
+              </a:fontRef>
+            </p:style>
+          </p:cxnSp>
+          <p:cxnSp>
+            <p:nvCxnSpPr>
+              <p:cNvPr id="93" name="Straight Arrow Connector 92"/>
+              <p:cNvCxnSpPr/>
+              <p:nvPr/>
+            </p:nvCxnSpPr>
+            <p:spPr>
+              <a:xfrm flipV="1">
+                <a:off x="8036158" y="4851247"/>
+                <a:ext cx="688179" cy="867"/>
+              </a:xfrm>
+              <a:prstGeom prst="straightConnector1">
+                <a:avLst/>
+              </a:prstGeom>
+              <a:ln w="12700">
+                <a:solidFill>
+                  <a:schemeClr val="tx1"/>
+                </a:solidFill>
+                <a:tailEnd type="triangle"/>
+              </a:ln>
+            </p:spPr>
+            <p:style>
+              <a:lnRef idx="1">
+                <a:schemeClr val="accent1"/>
+              </a:lnRef>
+              <a:fillRef idx="0">
+                <a:schemeClr val="accent1"/>
+              </a:fillRef>
+              <a:effectRef idx="0">
+                <a:schemeClr val="accent1"/>
+              </a:effectRef>
+              <a:fontRef idx="minor">
+                <a:schemeClr val="tx1"/>
+              </a:fontRef>
+            </p:style>
+          </p:cxnSp>
+          <p:pic>
+            <p:nvPicPr>
+              <p:cNvPr id="96" name="Picture 95"/>
+              <p:cNvPicPr>
+                <a:picLocks noChangeAspect="1"/>
+              </p:cNvPicPr>
+              <p:nvPr>
+                <p:custDataLst>
+                  <p:tags r:id="rId3"/>
+                </p:custDataLst>
+              </p:nvPr>
+            </p:nvPicPr>
+            <p:blipFill>
+              <a:blip r:embed="rId13" cstate="print">
+                <a:extLst>
+                  <a:ext uri="{28A0092B-C50C-407E-A947-70E740481C1C}">
+                    <a14:useLocalDpi xmlns:a14="http://schemas.microsoft.com/office/drawing/2010/main" val="0"/>
+                  </a:ext>
+                </a:extLst>
+              </a:blip>
+              <a:stretch>
+                <a:fillRect/>
+              </a:stretch>
+            </p:blipFill>
+            <p:spPr>
+              <a:xfrm>
+                <a:off x="8796877" y="4775056"/>
+                <a:ext cx="143238" cy="163048"/>
+              </a:xfrm>
+              <a:prstGeom prst="rect">
+                <a:avLst/>
+              </a:prstGeom>
+            </p:spPr>
+          </p:pic>
+          <p:pic>
+            <p:nvPicPr>
+              <p:cNvPr id="104" name="Picture 103"/>
+              <p:cNvPicPr>
+                <a:picLocks noChangeAspect="1"/>
+              </p:cNvPicPr>
+              <p:nvPr>
+                <p:custDataLst>
+                  <p:tags r:id="rId4"/>
+                </p:custDataLst>
+              </p:nvPr>
+            </p:nvPicPr>
+            <p:blipFill>
+              <a:blip r:embed="rId12" cstate="print">
+                <a:extLst>
+                  <a:ext uri="{28A0092B-C50C-407E-A947-70E740481C1C}">
+                    <a14:useLocalDpi xmlns:a14="http://schemas.microsoft.com/office/drawing/2010/main" val="0"/>
+                  </a:ext>
+                </a:extLst>
+              </a:blip>
+              <a:stretch>
+                <a:fillRect/>
+              </a:stretch>
+            </p:blipFill>
+            <p:spPr>
+              <a:xfrm>
+                <a:off x="3258653" y="4775056"/>
+                <a:ext cx="146286" cy="173715"/>
+              </a:xfrm>
+              <a:prstGeom prst="rect">
+                <a:avLst/>
+              </a:prstGeom>
+            </p:spPr>
+          </p:pic>
+        </p:grpSp>
+      </p:grpSp>
+    </p:spTree>
+    <p:extLst>
+      <p:ext uri="{BB962C8B-B14F-4D97-AF65-F5344CB8AC3E}">
+        <p14:creationId xmlns:p14="http://schemas.microsoft.com/office/powerpoint/2010/main" val="123942918"/>
+      </p:ext>
+    </p:extLst>
+  </p:cSld>
+  <p:clrMapOvr>
+    <a:masterClrMapping/>
+  </p:clrMapOvr>
+  <p:timing>
+    <p:tnLst>
+      <p:par>
+        <p:cTn id="1" dur="indefinite" restart="never" nodeType="tmRoot"/>
+      </p:par>
+    </p:tnLst>
+  </p:timing>
+</p:sld>
+</file>
+
+<file path=ppt/slides/slide4.xml><?xml version="1.0" encoding="utf-8"?>
+<p:sld xmlns:a="http://schemas.openxmlformats.org/drawingml/2006/main" xmlns:r="http://schemas.openxmlformats.org/officeDocument/2006/relationships" xmlns:p="http://schemas.openxmlformats.org/presentationml/2006/main">
+  <p:cSld>
+    <p:spTree>
+      <p:nvGrpSpPr>
+        <p:cNvPr id="1" name=""/>
+        <p:cNvGrpSpPr/>
+        <p:nvPr/>
+      </p:nvGrpSpPr>
+      <p:grpSpPr>
+        <a:xfrm>
+          <a:off x="0" y="0"/>
+          <a:ext cx="0" cy="0"/>
+          <a:chOff x="0" y="0"/>
+          <a:chExt cx="0" cy="0"/>
+        </a:xfrm>
+      </p:grpSpPr>
+      <p:grpSp>
+        <p:nvGrpSpPr>
+          <p:cNvPr id="60" name="Group 59"/>
+          <p:cNvGrpSpPr/>
+          <p:nvPr/>
+        </p:nvGrpSpPr>
+        <p:grpSpPr>
+          <a:xfrm>
+            <a:off x="1398601" y="685800"/>
+            <a:ext cx="9396322" cy="6477000"/>
+            <a:chOff x="1398601" y="685800"/>
+            <a:chExt cx="9396322" cy="6477000"/>
+          </a:xfrm>
+        </p:grpSpPr>
+        <p:grpSp>
+          <p:nvGrpSpPr>
+            <p:cNvPr id="57" name="Group 56"/>
+            <p:cNvGrpSpPr/>
+            <p:nvPr/>
+          </p:nvGrpSpPr>
+          <p:grpSpPr>
+            <a:xfrm>
+              <a:off x="1398601" y="3581400"/>
+              <a:ext cx="9396322" cy="3581400"/>
+              <a:chOff x="1398601" y="-304800"/>
+              <a:chExt cx="9396322" cy="3581400"/>
+            </a:xfrm>
+          </p:grpSpPr>
+          <p:sp>
+            <p:nvSpPr>
+              <p:cNvPr id="69" name="Rectangle 68"/>
+              <p:cNvSpPr/>
+              <p:nvPr/>
+            </p:nvSpPr>
+            <p:spPr>
+              <a:xfrm>
+                <a:off x="2325007" y="-304800"/>
+                <a:ext cx="1143000" cy="1143000"/>
+              </a:xfrm>
+              <a:prstGeom prst="rect">
+                <a:avLst/>
+              </a:prstGeom>
+              <a:solidFill>
+                <a:schemeClr val="bg1">
+                  <a:lumMod val="95000"/>
+                </a:schemeClr>
+              </a:solidFill>
+              <a:ln w="12700">
+                <a:solidFill>
+                  <a:schemeClr val="tx1"/>
+                </a:solidFill>
+              </a:ln>
+            </p:spPr>
+            <p:style>
+              <a:lnRef idx="2">
+                <a:schemeClr val="accent1">
+                  <a:shade val="50000"/>
+                </a:schemeClr>
+              </a:lnRef>
+              <a:fillRef idx="1">
+                <a:schemeClr val="accent1"/>
+              </a:fillRef>
+              <a:effectRef idx="0">
+                <a:schemeClr val="accent1"/>
+              </a:effectRef>
+              <a:fontRef idx="minor">
+                <a:schemeClr val="lt1"/>
+              </a:fontRef>
+            </p:style>
+            <p:txBody>
+              <a:bodyPr rtlCol="0" anchor="ctr"/>
+              <a:lstStyle/>
+              <a:p>
+                <a:pPr algn="ctr"/>
+                <a:r>
+                  <a:rPr lang="en-US" dirty="0" smtClean="0">
+                    <a:ln w="0"/>
+                    <a:solidFill>
+                      <a:schemeClr val="tx1"/>
+                    </a:solidFill>
+                    <a:effectLst>
+                      <a:outerShdw blurRad="38100" dist="19050" dir="2700000" algn="tl" rotWithShape="0">
+                        <a:schemeClr val="dk1">
+                          <a:alpha val="40000"/>
+                        </a:schemeClr>
+                      </a:outerShdw>
+                    </a:effectLst>
+                    <a:latin typeface="Times New Roman" panose="02020603050405020304" pitchFamily="18" charset="0"/>
+                    <a:cs typeface="Times New Roman" panose="02020603050405020304" pitchFamily="18" charset="0"/>
+                  </a:rPr>
+                  <a:t>FFT</a:t>
+                </a:r>
+                <a:endParaRPr lang="en-US" dirty="0">
+                  <a:latin typeface="Times New Roman" panose="02020603050405020304" pitchFamily="18" charset="0"/>
+                  <a:cs typeface="Times New Roman" panose="02020603050405020304" pitchFamily="18" charset="0"/>
+                </a:endParaRPr>
+              </a:p>
+            </p:txBody>
+          </p:sp>
+          <p:sp>
+            <p:nvSpPr>
+              <p:cNvPr id="70" name="Rectangle 69"/>
+              <p:cNvSpPr/>
+              <p:nvPr/>
+            </p:nvSpPr>
+            <p:spPr>
+              <a:xfrm>
+                <a:off x="2325007" y="2133600"/>
+                <a:ext cx="1143000" cy="1143000"/>
+              </a:xfrm>
+              <a:prstGeom prst="rect">
+                <a:avLst/>
+              </a:prstGeom>
+              <a:solidFill>
+                <a:schemeClr val="bg1">
+                  <a:lumMod val="95000"/>
+                </a:schemeClr>
+              </a:solidFill>
+              <a:ln w="12700">
+                <a:solidFill>
+                  <a:schemeClr val="tx1"/>
+                </a:solidFill>
+              </a:ln>
+            </p:spPr>
+            <p:style>
+              <a:lnRef idx="2">
+                <a:schemeClr val="accent1">
+                  <a:shade val="50000"/>
+                </a:schemeClr>
+              </a:lnRef>
+              <a:fillRef idx="1">
+                <a:schemeClr val="accent1"/>
+              </a:fillRef>
+              <a:effectRef idx="0">
+                <a:schemeClr val="accent1"/>
+              </a:effectRef>
+              <a:fontRef idx="minor">
+                <a:schemeClr val="lt1"/>
+              </a:fontRef>
+            </p:style>
+            <p:txBody>
+              <a:bodyPr rtlCol="0" anchor="ctr"/>
+              <a:lstStyle/>
+              <a:p>
+                <a:pPr algn="ctr"/>
+                <a:r>
+                  <a:rPr lang="en-US" dirty="0" smtClean="0">
+                    <a:ln w="0"/>
+                    <a:solidFill>
+                      <a:schemeClr val="tx1"/>
+                    </a:solidFill>
+                    <a:effectLst>
+                      <a:outerShdw blurRad="38100" dist="19050" dir="2700000" algn="tl" rotWithShape="0">
+                        <a:schemeClr val="dk1">
+                          <a:alpha val="40000"/>
+                        </a:schemeClr>
+                      </a:outerShdw>
+                    </a:effectLst>
+                    <a:latin typeface="Times New Roman" panose="02020603050405020304" pitchFamily="18" charset="0"/>
+                    <a:cs typeface="Times New Roman" panose="02020603050405020304" pitchFamily="18" charset="0"/>
+                  </a:rPr>
+                  <a:t>FFT</a:t>
+                </a:r>
+                <a:endParaRPr lang="en-US" dirty="0">
+                  <a:latin typeface="Times New Roman" panose="02020603050405020304" pitchFamily="18" charset="0"/>
+                  <a:cs typeface="Times New Roman" panose="02020603050405020304" pitchFamily="18" charset="0"/>
+                </a:endParaRPr>
+              </a:p>
+            </p:txBody>
+          </p:sp>
+          <p:pic>
+            <p:nvPicPr>
+              <p:cNvPr id="54" name="Picture 53"/>
+              <p:cNvPicPr>
+                <a:picLocks noChangeAspect="1"/>
+              </p:cNvPicPr>
+              <p:nvPr>
+                <p:custDataLst>
+                  <p:tags r:id="rId4"/>
+                </p:custDataLst>
+              </p:nvPr>
+            </p:nvPicPr>
+            <p:blipFill>
+              <a:blip r:embed="rId8" cstate="print">
+                <a:extLst>
+                  <a:ext uri="{28A0092B-C50C-407E-A947-70E740481C1C}">
+                    <a14:useLocalDpi xmlns:a14="http://schemas.microsoft.com/office/drawing/2010/main" val="0"/>
+                  </a:ext>
+                </a:extLst>
+              </a:blip>
+              <a:stretch>
+                <a:fillRect/>
+              </a:stretch>
+            </p:blipFill>
+            <p:spPr>
+              <a:xfrm>
+                <a:off x="1398601" y="2618242"/>
+                <a:ext cx="146286" cy="173715"/>
+              </a:xfrm>
+              <a:prstGeom prst="rect">
+                <a:avLst/>
+              </a:prstGeom>
+            </p:spPr>
+          </p:pic>
+          <p:pic>
+            <p:nvPicPr>
+              <p:cNvPr id="72" name="Picture 71"/>
+              <p:cNvPicPr>
+                <a:picLocks noChangeAspect="1"/>
+              </p:cNvPicPr>
+              <p:nvPr>
+                <p:custDataLst>
+                  <p:tags r:id="rId5"/>
+                </p:custDataLst>
+              </p:nvPr>
+            </p:nvPicPr>
+            <p:blipFill>
+              <a:blip r:embed="rId9" cstate="print">
+                <a:extLst>
+                  <a:ext uri="{28A0092B-C50C-407E-A947-70E740481C1C}">
+                    <a14:useLocalDpi xmlns:a14="http://schemas.microsoft.com/office/drawing/2010/main" val="0"/>
+                  </a:ext>
+                </a:extLst>
+              </a:blip>
+              <a:stretch>
+                <a:fillRect/>
+              </a:stretch>
+            </p:blipFill>
+            <p:spPr>
+              <a:xfrm>
+                <a:off x="1398601" y="208795"/>
+                <a:ext cx="144762" cy="111238"/>
+              </a:xfrm>
+              <a:prstGeom prst="rect">
+                <a:avLst/>
+              </a:prstGeom>
+            </p:spPr>
+          </p:pic>
+          <p:cxnSp>
+            <p:nvCxnSpPr>
+              <p:cNvPr id="74" name="Straight Arrow Connector 73"/>
+              <p:cNvCxnSpPr/>
+              <p:nvPr/>
+            </p:nvCxnSpPr>
+            <p:spPr>
+              <a:xfrm>
+                <a:off x="1639207" y="266700"/>
+                <a:ext cx="684323" cy="0"/>
+              </a:xfrm>
+              <a:prstGeom prst="straightConnector1">
+                <a:avLst/>
+              </a:prstGeom>
+              <a:ln w="12700">
+                <a:solidFill>
+                  <a:schemeClr val="tx1"/>
+                </a:solidFill>
+                <a:tailEnd type="triangle"/>
+              </a:ln>
+            </p:spPr>
+            <p:style>
+              <a:lnRef idx="1">
+                <a:schemeClr val="accent1"/>
+              </a:lnRef>
+              <a:fillRef idx="0">
+                <a:schemeClr val="accent1"/>
+              </a:fillRef>
+              <a:effectRef idx="0">
+                <a:schemeClr val="accent1"/>
+              </a:effectRef>
+              <a:fontRef idx="minor">
+                <a:schemeClr val="tx1"/>
+              </a:fontRef>
+            </p:style>
+          </p:cxnSp>
+          <p:cxnSp>
+            <p:nvCxnSpPr>
+              <p:cNvPr id="79" name="Straight Arrow Connector 78"/>
+              <p:cNvCxnSpPr/>
+              <p:nvPr/>
+            </p:nvCxnSpPr>
+            <p:spPr>
+              <a:xfrm>
+                <a:off x="1639207" y="2705100"/>
+                <a:ext cx="684323" cy="0"/>
+              </a:xfrm>
+              <a:prstGeom prst="straightConnector1">
+                <a:avLst/>
+              </a:prstGeom>
+              <a:ln w="12700">
+                <a:solidFill>
+                  <a:schemeClr val="tx1"/>
+                </a:solidFill>
+                <a:tailEnd type="triangle"/>
+              </a:ln>
+            </p:spPr>
+            <p:style>
+              <a:lnRef idx="1">
+                <a:schemeClr val="accent1"/>
+              </a:lnRef>
+              <a:fillRef idx="0">
+                <a:schemeClr val="accent1"/>
+              </a:fillRef>
+              <a:effectRef idx="0">
+                <a:schemeClr val="accent1"/>
+              </a:effectRef>
+              <a:fontRef idx="minor">
+                <a:schemeClr val="tx1"/>
+              </a:fontRef>
+            </p:style>
+          </p:cxnSp>
+          <p:cxnSp>
+            <p:nvCxnSpPr>
+              <p:cNvPr id="80" name="Elbow Connector 79"/>
+              <p:cNvCxnSpPr>
+                <a:stCxn id="69" idx="3"/>
+                <a:endCxn id="82" idx="0"/>
+              </p:cNvCxnSpPr>
+              <p:nvPr/>
+            </p:nvCxnSpPr>
+            <p:spPr>
+              <a:xfrm>
+                <a:off x="3468007" y="266700"/>
+                <a:ext cx="1485898" cy="650301"/>
+              </a:xfrm>
+              <a:prstGeom prst="bentConnector2">
+                <a:avLst/>
+              </a:prstGeom>
+              <a:ln w="12700">
+                <a:solidFill>
+                  <a:schemeClr val="tx1"/>
+                </a:solidFill>
+                <a:tailEnd type="triangle"/>
+              </a:ln>
+            </p:spPr>
+            <p:style>
+              <a:lnRef idx="1">
+                <a:schemeClr val="accent1"/>
+              </a:lnRef>
+              <a:fillRef idx="0">
+                <a:schemeClr val="accent1"/>
+              </a:fillRef>
+              <a:effectRef idx="0">
+                <a:schemeClr val="accent1"/>
+              </a:effectRef>
+              <a:fontRef idx="minor">
+                <a:schemeClr val="tx1"/>
+              </a:fontRef>
+            </p:style>
+          </p:cxnSp>
+          <p:cxnSp>
+            <p:nvCxnSpPr>
+              <p:cNvPr id="81" name="Elbow Connector 80"/>
+              <p:cNvCxnSpPr>
+                <a:stCxn id="70" idx="3"/>
+                <a:endCxn id="82" idx="2"/>
+              </p:cNvCxnSpPr>
+              <p:nvPr/>
+            </p:nvCxnSpPr>
+            <p:spPr>
+              <a:xfrm flipV="1">
+                <a:off x="3468007" y="2060001"/>
+                <a:ext cx="1485898" cy="645099"/>
+              </a:xfrm>
+              <a:prstGeom prst="bentConnector2">
+                <a:avLst/>
+              </a:prstGeom>
+              <a:ln w="12700">
+                <a:solidFill>
+                  <a:schemeClr val="tx1"/>
+                </a:solidFill>
+                <a:tailEnd type="triangle"/>
+              </a:ln>
+            </p:spPr>
+            <p:style>
+              <a:lnRef idx="1">
+                <a:schemeClr val="accent1"/>
+              </a:lnRef>
+              <a:fillRef idx="0">
+                <a:schemeClr val="accent1"/>
+              </a:fillRef>
+              <a:effectRef idx="0">
+                <a:schemeClr val="accent1"/>
+              </a:effectRef>
+              <a:fontRef idx="minor">
+                <a:schemeClr val="tx1"/>
+              </a:fontRef>
+            </p:style>
+          </p:cxnSp>
+          <p:sp>
+            <p:nvSpPr>
+              <p:cNvPr id="82" name="Rectangle 81"/>
+              <p:cNvSpPr/>
+              <p:nvPr/>
+            </p:nvSpPr>
+            <p:spPr>
+              <a:xfrm>
+                <a:off x="4153805" y="917001"/>
+                <a:ext cx="1600200" cy="1143000"/>
+              </a:xfrm>
+              <a:prstGeom prst="rect">
+                <a:avLst/>
+              </a:prstGeom>
+              <a:solidFill>
+                <a:schemeClr val="bg1">
+                  <a:lumMod val="95000"/>
+                </a:schemeClr>
+              </a:solidFill>
+              <a:ln w="12700">
+                <a:solidFill>
+                  <a:schemeClr val="tx1"/>
+                </a:solidFill>
+              </a:ln>
+            </p:spPr>
+            <p:style>
+              <a:lnRef idx="2">
+                <a:schemeClr val="accent1">
+                  <a:shade val="50000"/>
+                </a:schemeClr>
+              </a:lnRef>
+              <a:fillRef idx="1">
+                <a:schemeClr val="accent1"/>
+              </a:fillRef>
+              <a:effectRef idx="0">
+                <a:schemeClr val="accent1"/>
+              </a:effectRef>
+              <a:fontRef idx="minor">
+                <a:schemeClr val="lt1"/>
+              </a:fontRef>
+            </p:style>
+            <p:txBody>
+              <a:bodyPr rtlCol="0" anchor="ctr"/>
+              <a:lstStyle/>
+              <a:p>
+                <a:pPr algn="ctr"/>
+                <a:r>
+                  <a:rPr lang="en-US" dirty="0">
+                    <a:ln w="0"/>
+                    <a:solidFill>
+                      <a:schemeClr val="tx1"/>
+                    </a:solidFill>
+                    <a:effectLst>
+                      <a:outerShdw blurRad="38100" dist="19050" dir="2700000" algn="tl" rotWithShape="0">
+                        <a:schemeClr val="dk1">
+                          <a:alpha val="40000"/>
+                        </a:schemeClr>
+                      </a:outerShdw>
+                    </a:effectLst>
+                    <a:latin typeface="Times New Roman" panose="02020603050405020304" pitchFamily="18" charset="0"/>
+                    <a:cs typeface="Times New Roman" panose="02020603050405020304" pitchFamily="18" charset="0"/>
+                  </a:rPr>
+                  <a:t>Complex</a:t>
+                </a:r>
+              </a:p>
+              <a:p>
+                <a:pPr algn="ctr"/>
+                <a:r>
+                  <a:rPr lang="en-US" dirty="0">
+                    <a:ln w="0"/>
+                    <a:solidFill>
+                      <a:schemeClr val="tx1"/>
+                    </a:solidFill>
+                    <a:effectLst>
+                      <a:outerShdw blurRad="38100" dist="19050" dir="2700000" algn="tl" rotWithShape="0">
+                        <a:schemeClr val="dk1">
+                          <a:alpha val="40000"/>
+                        </a:schemeClr>
+                      </a:outerShdw>
+                    </a:effectLst>
+                    <a:latin typeface="Times New Roman" panose="02020603050405020304" pitchFamily="18" charset="0"/>
+                    <a:cs typeface="Times New Roman" panose="02020603050405020304" pitchFamily="18" charset="0"/>
+                  </a:rPr>
+                  <a:t>Multiplication</a:t>
+                </a:r>
+                <a:endParaRPr lang="en-US" dirty="0">
+                  <a:latin typeface="Times New Roman" panose="02020603050405020304" pitchFamily="18" charset="0"/>
+                  <a:cs typeface="Times New Roman" panose="02020603050405020304" pitchFamily="18" charset="0"/>
+                </a:endParaRPr>
+              </a:p>
+            </p:txBody>
+          </p:sp>
+          <p:sp>
+            <p:nvSpPr>
+              <p:cNvPr id="89" name="Rectangle 88"/>
+              <p:cNvSpPr/>
+              <p:nvPr/>
+            </p:nvSpPr>
+            <p:spPr>
+              <a:xfrm>
+                <a:off x="6442184" y="917001"/>
+                <a:ext cx="1143000" cy="1143000"/>
+              </a:xfrm>
+              <a:prstGeom prst="rect">
+                <a:avLst/>
+              </a:prstGeom>
+              <a:solidFill>
+                <a:schemeClr val="bg1">
+                  <a:lumMod val="95000"/>
+                </a:schemeClr>
+              </a:solidFill>
+              <a:ln w="12700">
+                <a:solidFill>
+                  <a:schemeClr val="tx1"/>
+                </a:solidFill>
+              </a:ln>
+            </p:spPr>
+            <p:style>
+              <a:lnRef idx="2">
+                <a:schemeClr val="accent1">
+                  <a:shade val="50000"/>
+                </a:schemeClr>
+              </a:lnRef>
+              <a:fillRef idx="1">
+                <a:schemeClr val="accent1"/>
+              </a:fillRef>
+              <a:effectRef idx="0">
+                <a:schemeClr val="accent1"/>
+              </a:effectRef>
+              <a:fontRef idx="minor">
+                <a:schemeClr val="lt1"/>
+              </a:fontRef>
+            </p:style>
+            <p:txBody>
+              <a:bodyPr rtlCol="0" anchor="ctr"/>
+              <a:lstStyle/>
+              <a:p>
+                <a:pPr algn="ctr"/>
+                <a:r>
+                  <a:rPr lang="en-US" dirty="0" smtClean="0">
+                    <a:ln w="0"/>
+                    <a:solidFill>
+                      <a:schemeClr val="tx1"/>
+                    </a:solidFill>
+                    <a:effectLst>
+                      <a:outerShdw blurRad="38100" dist="19050" dir="2700000" algn="tl" rotWithShape="0">
+                        <a:schemeClr val="dk1">
+                          <a:alpha val="40000"/>
+                        </a:schemeClr>
+                      </a:outerShdw>
+                    </a:effectLst>
+                    <a:latin typeface="Times New Roman" panose="02020603050405020304" pitchFamily="18" charset="0"/>
+                    <a:cs typeface="Times New Roman" panose="02020603050405020304" pitchFamily="18" charset="0"/>
+                  </a:rPr>
+                  <a:t>IFFT</a:t>
+                </a:r>
+                <a:endParaRPr lang="en-US" dirty="0">
+                  <a:latin typeface="Times New Roman" panose="02020603050405020304" pitchFamily="18" charset="0"/>
+                  <a:cs typeface="Times New Roman" panose="02020603050405020304" pitchFamily="18" charset="0"/>
+                </a:endParaRPr>
+              </a:p>
+            </p:txBody>
+          </p:sp>
+          <p:cxnSp>
+            <p:nvCxnSpPr>
+              <p:cNvPr id="90" name="Straight Arrow Connector 89"/>
+              <p:cNvCxnSpPr>
+                <a:stCxn id="82" idx="3"/>
+                <a:endCxn id="89" idx="1"/>
+              </p:cNvCxnSpPr>
+              <p:nvPr/>
+            </p:nvCxnSpPr>
+            <p:spPr>
+              <a:xfrm>
+                <a:off x="5754005" y="1488501"/>
+                <a:ext cx="688179" cy="0"/>
+              </a:xfrm>
+              <a:prstGeom prst="straightConnector1">
+                <a:avLst/>
+              </a:prstGeom>
+              <a:ln w="12700">
+                <a:solidFill>
+                  <a:schemeClr val="tx1"/>
+                </a:solidFill>
+                <a:tailEnd type="triangle"/>
+              </a:ln>
+            </p:spPr>
+            <p:style>
+              <a:lnRef idx="1">
+                <a:schemeClr val="accent1"/>
+              </a:lnRef>
+              <a:fillRef idx="0">
+                <a:schemeClr val="accent1"/>
+              </a:fillRef>
+              <a:effectRef idx="0">
+                <a:schemeClr val="accent1"/>
+              </a:effectRef>
+              <a:fontRef idx="minor">
+                <a:schemeClr val="tx1"/>
+              </a:fontRef>
+            </p:style>
+          </p:cxnSp>
+          <p:sp>
+            <p:nvSpPr>
+              <p:cNvPr id="94" name="Rectangle 93"/>
+              <p:cNvSpPr/>
+              <p:nvPr/>
+            </p:nvSpPr>
+            <p:spPr>
+              <a:xfrm>
+                <a:off x="8273363" y="916134"/>
+                <a:ext cx="1600200" cy="1143000"/>
+              </a:xfrm>
+              <a:prstGeom prst="rect">
+                <a:avLst/>
+              </a:prstGeom>
+              <a:solidFill>
+                <a:schemeClr val="bg1">
+                  <a:lumMod val="95000"/>
+                </a:schemeClr>
+              </a:solidFill>
+              <a:ln w="12700">
+                <a:solidFill>
+                  <a:schemeClr val="tx1"/>
+                </a:solidFill>
+              </a:ln>
+            </p:spPr>
+            <p:style>
+              <a:lnRef idx="2">
+                <a:schemeClr val="accent1">
+                  <a:shade val="50000"/>
+                </a:schemeClr>
+              </a:lnRef>
+              <a:fillRef idx="1">
+                <a:schemeClr val="accent1"/>
+              </a:fillRef>
+              <a:effectRef idx="0">
+                <a:schemeClr val="accent1"/>
+              </a:effectRef>
+              <a:fontRef idx="minor">
+                <a:schemeClr val="lt1"/>
+              </a:fontRef>
+            </p:style>
+            <p:txBody>
+              <a:bodyPr rtlCol="0" anchor="ctr"/>
+              <a:lstStyle/>
+              <a:p>
+                <a:pPr algn="ctr"/>
+                <a:r>
+                  <a:rPr lang="en-US" dirty="0">
+                    <a:ln w="0"/>
+                    <a:solidFill>
+                      <a:schemeClr val="tx1"/>
+                    </a:solidFill>
+                    <a:effectLst>
+                      <a:outerShdw blurRad="38100" dist="19050" dir="2700000" algn="tl" rotWithShape="0">
+                        <a:schemeClr val="dk1">
+                          <a:alpha val="40000"/>
+                        </a:schemeClr>
+                      </a:outerShdw>
+                    </a:effectLst>
+                    <a:latin typeface="Times New Roman" panose="02020603050405020304" pitchFamily="18" charset="0"/>
+                    <a:cs typeface="Times New Roman" panose="02020603050405020304" pitchFamily="18" charset="0"/>
+                  </a:rPr>
+                  <a:t>Scalar Multiplication</a:t>
+                </a:r>
+                <a:endParaRPr lang="en-US" dirty="0">
+                  <a:latin typeface="Times New Roman" panose="02020603050405020304" pitchFamily="18" charset="0"/>
+                  <a:cs typeface="Times New Roman" panose="02020603050405020304" pitchFamily="18" charset="0"/>
+                </a:endParaRPr>
+              </a:p>
+            </p:txBody>
+          </p:sp>
+          <p:cxnSp>
+            <p:nvCxnSpPr>
+              <p:cNvPr id="96" name="Straight Arrow Connector 95"/>
+              <p:cNvCxnSpPr>
+                <a:stCxn id="89" idx="3"/>
+                <a:endCxn id="94" idx="1"/>
+              </p:cNvCxnSpPr>
+              <p:nvPr/>
+            </p:nvCxnSpPr>
+            <p:spPr>
+              <a:xfrm flipV="1">
+                <a:off x="7585184" y="1487634"/>
+                <a:ext cx="688179" cy="867"/>
+              </a:xfrm>
+              <a:prstGeom prst="straightConnector1">
+                <a:avLst/>
+              </a:prstGeom>
+              <a:ln w="12700">
+                <a:solidFill>
+                  <a:schemeClr val="tx1"/>
+                </a:solidFill>
+                <a:tailEnd type="triangle"/>
+              </a:ln>
+            </p:spPr>
+            <p:style>
+              <a:lnRef idx="1">
+                <a:schemeClr val="accent1"/>
+              </a:lnRef>
+              <a:fillRef idx="0">
+                <a:schemeClr val="accent1"/>
+              </a:fillRef>
+              <a:effectRef idx="0">
+                <a:schemeClr val="accent1"/>
+              </a:effectRef>
+              <a:fontRef idx="minor">
+                <a:schemeClr val="tx1"/>
+              </a:fontRef>
+            </p:style>
+          </p:cxnSp>
+          <p:cxnSp>
+            <p:nvCxnSpPr>
+              <p:cNvPr id="97" name="Straight Arrow Connector 96"/>
+              <p:cNvCxnSpPr/>
+              <p:nvPr/>
+            </p:nvCxnSpPr>
+            <p:spPr>
+              <a:xfrm flipV="1">
+                <a:off x="9873563" y="1487634"/>
+                <a:ext cx="688179" cy="867"/>
+              </a:xfrm>
+              <a:prstGeom prst="straightConnector1">
+                <a:avLst/>
+              </a:prstGeom>
+              <a:ln w="12700">
+                <a:solidFill>
+                  <a:schemeClr val="tx1"/>
+                </a:solidFill>
+                <a:tailEnd type="triangle"/>
+              </a:ln>
+            </p:spPr>
+            <p:style>
+              <a:lnRef idx="1">
+                <a:schemeClr val="accent1"/>
+              </a:lnRef>
+              <a:fillRef idx="0">
+                <a:schemeClr val="accent1"/>
+              </a:fillRef>
+              <a:effectRef idx="0">
+                <a:schemeClr val="accent1"/>
+              </a:effectRef>
+              <a:fontRef idx="minor">
+                <a:schemeClr val="tx1"/>
+              </a:fontRef>
+            </p:style>
+          </p:cxnSp>
+          <p:pic>
+            <p:nvPicPr>
+              <p:cNvPr id="98" name="Picture 97"/>
               <p:cNvPicPr>
                 <a:picLocks noChangeAspect="1"/>
               </p:cNvPicPr>
@@ -6774,28 +7901,114 @@
             </p:blipFill>
             <p:spPr>
               <a:xfrm>
-                <a:off x="3934827" y="5284596"/>
-                <a:ext cx="103619" cy="114286"/>
+                <a:off x="10651685" y="1411425"/>
+                <a:ext cx="143238" cy="163048"/>
               </a:xfrm>
               <a:prstGeom prst="rect">
                 <a:avLst/>
               </a:prstGeom>
             </p:spPr>
           </p:pic>
+        </p:grpSp>
+        <p:grpSp>
+          <p:nvGrpSpPr>
+            <p:cNvPr id="59" name="Group 58"/>
+            <p:cNvGrpSpPr/>
+            <p:nvPr/>
+          </p:nvGrpSpPr>
+          <p:grpSpPr>
+            <a:xfrm>
+              <a:off x="4490699" y="685800"/>
+              <a:ext cx="3420000" cy="2565376"/>
+              <a:chOff x="4490699" y="3581400"/>
+              <a:chExt cx="3420000" cy="2565376"/>
+            </a:xfrm>
+          </p:grpSpPr>
+          <p:sp>
+            <p:nvSpPr>
+              <p:cNvPr id="76" name="Rectangle 75"/>
+              <p:cNvSpPr/>
+              <p:nvPr/>
+            </p:nvSpPr>
+            <p:spPr>
+              <a:xfrm>
+                <a:off x="5394551" y="4289605"/>
+                <a:ext cx="1600200" cy="1143000"/>
+              </a:xfrm>
+              <a:prstGeom prst="rect">
+                <a:avLst/>
+              </a:prstGeom>
+              <a:solidFill>
+                <a:schemeClr val="bg1">
+                  <a:lumMod val="95000"/>
+                </a:schemeClr>
+              </a:solidFill>
+              <a:ln w="12700">
+                <a:solidFill>
+                  <a:schemeClr val="tx1"/>
+                </a:solidFill>
+              </a:ln>
+            </p:spPr>
+            <p:style>
+              <a:lnRef idx="2">
+                <a:schemeClr val="accent1">
+                  <a:shade val="50000"/>
+                </a:schemeClr>
+              </a:lnRef>
+              <a:fillRef idx="1">
+                <a:schemeClr val="accent1"/>
+              </a:fillRef>
+              <a:effectRef idx="0">
+                <a:schemeClr val="accent1"/>
+              </a:effectRef>
+              <a:fontRef idx="minor">
+                <a:schemeClr val="lt1"/>
+              </a:fontRef>
+            </p:style>
+            <p:txBody>
+              <a:bodyPr rtlCol="0" anchor="ctr"/>
+              <a:lstStyle/>
+              <a:p>
+                <a:pPr algn="ctr"/>
+                <a:r>
+                  <a:rPr lang="en-US" dirty="0">
+                    <a:ln w="0"/>
+                    <a:solidFill>
+                      <a:schemeClr val="tx1"/>
+                    </a:solidFill>
+                    <a:effectLst>
+                      <a:outerShdw blurRad="38100" dist="19050" dir="2700000" algn="tl" rotWithShape="0">
+                        <a:schemeClr val="dk1">
+                          <a:alpha val="40000"/>
+                        </a:schemeClr>
+                      </a:outerShdw>
+                    </a:effectLst>
+                    <a:latin typeface="Times New Roman" panose="02020603050405020304" pitchFamily="18" charset="0"/>
+                    <a:cs typeface="Times New Roman" panose="02020603050405020304" pitchFamily="18" charset="0"/>
+                  </a:rPr>
+                  <a:t>Time-domain Convolution</a:t>
+                </a:r>
+                <a:endParaRPr lang="en-US" dirty="0">
+                  <a:latin typeface="Times New Roman" panose="02020603050405020304" pitchFamily="18" charset="0"/>
+                  <a:cs typeface="Times New Roman" panose="02020603050405020304" pitchFamily="18" charset="0"/>
+                </a:endParaRPr>
+              </a:p>
+            </p:txBody>
+          </p:sp>
           <p:pic>
             <p:nvPicPr>
-              <p:cNvPr id="54" name="Picture 53"/>
+              <p:cNvPr id="7" name="Picture 6"/>
               <p:cNvPicPr>
                 <a:picLocks noChangeAspect="1"/>
               </p:cNvPicPr>
               <p:nvPr>
                 <p:custDataLst>
-                  <p:tags r:id="rId7"/>
+                  <p:tags r:id="rId1"/>
                 </p:custDataLst>
               </p:nvPr>
             </p:nvPicPr>
             <p:blipFill>
-              <a:blip r:embed="rId12" cstate="print">
+              <a:blip r:embed="rId9" cstate="print">
                 <a:extLst>
                   <a:ext uri="{28A0092B-C50C-407E-A947-70E740481C1C}">
                     <a14:useLocalDpi xmlns:a14="http://schemas.microsoft.com/office/drawing/2010/main" val="0"/>
@@ -6808,28 +8021,140 @@
             </p:blipFill>
             <p:spPr>
               <a:xfrm>
-                <a:off x="3527970" y="4954967"/>
-                <a:ext cx="510476" cy="214857"/>
+                <a:off x="4495800" y="3581400"/>
+                <a:ext cx="144762" cy="111238"/>
               </a:xfrm>
               <a:prstGeom prst="rect">
                 <a:avLst/>
               </a:prstGeom>
             </p:spPr>
           </p:pic>
+          <p:cxnSp>
+            <p:nvCxnSpPr>
+              <p:cNvPr id="83" name="Elbow Connector 82"/>
+              <p:cNvCxnSpPr>
+                <a:endCxn id="76" idx="0"/>
+              </p:cNvCxnSpPr>
+              <p:nvPr/>
+            </p:nvCxnSpPr>
+            <p:spPr>
+              <a:xfrm>
+                <a:off x="4708721" y="3644530"/>
+                <a:ext cx="1485930" cy="645075"/>
+              </a:xfrm>
+              <a:prstGeom prst="bentConnector2">
+                <a:avLst/>
+              </a:prstGeom>
+              <a:ln w="12700">
+                <a:solidFill>
+                  <a:schemeClr val="tx1"/>
+                </a:solidFill>
+                <a:tailEnd type="triangle"/>
+              </a:ln>
+            </p:spPr>
+            <p:style>
+              <a:lnRef idx="1">
+                <a:schemeClr val="accent1"/>
+              </a:lnRef>
+              <a:fillRef idx="0">
+                <a:schemeClr val="accent1"/>
+              </a:fillRef>
+              <a:effectRef idx="0">
+                <a:schemeClr val="accent1"/>
+              </a:effectRef>
+              <a:fontRef idx="minor">
+                <a:schemeClr val="tx1"/>
+              </a:fontRef>
+            </p:style>
+          </p:cxnSp>
+          <p:cxnSp>
+            <p:nvCxnSpPr>
+              <p:cNvPr id="84" name="Elbow Connector 83"/>
+              <p:cNvCxnSpPr>
+                <a:endCxn id="76" idx="2"/>
+              </p:cNvCxnSpPr>
+              <p:nvPr/>
+            </p:nvCxnSpPr>
+            <p:spPr>
+              <a:xfrm flipV="1">
+                <a:off x="4708721" y="5432605"/>
+                <a:ext cx="1485930" cy="648753"/>
+              </a:xfrm>
+              <a:prstGeom prst="bentConnector2">
+                <a:avLst/>
+              </a:prstGeom>
+              <a:ln w="12700">
+                <a:solidFill>
+                  <a:schemeClr val="tx1"/>
+                </a:solidFill>
+                <a:tailEnd type="triangle"/>
+              </a:ln>
+            </p:spPr>
+            <p:style>
+              <a:lnRef idx="1">
+                <a:schemeClr val="accent1"/>
+              </a:lnRef>
+              <a:fillRef idx="0">
+                <a:schemeClr val="accent1"/>
+              </a:fillRef>
+              <a:effectRef idx="0">
+                <a:schemeClr val="accent1"/>
+              </a:effectRef>
+              <a:fontRef idx="minor">
+                <a:schemeClr val="tx1"/>
+              </a:fontRef>
+            </p:style>
+          </p:cxnSp>
+          <p:cxnSp>
+            <p:nvCxnSpPr>
+              <p:cNvPr id="38" name="Straight Arrow Connector 37"/>
+              <p:cNvCxnSpPr/>
+              <p:nvPr/>
+            </p:nvCxnSpPr>
+            <p:spPr>
+              <a:xfrm flipV="1">
+                <a:off x="6994751" y="4860238"/>
+                <a:ext cx="688179" cy="867"/>
+              </a:xfrm>
+              <a:prstGeom prst="straightConnector1">
+                <a:avLst/>
+              </a:prstGeom>
+              <a:ln w="12700">
+                <a:solidFill>
+                  <a:schemeClr val="tx1"/>
+                </a:solidFill>
+                <a:tailEnd type="triangle"/>
+              </a:ln>
+            </p:spPr>
+            <p:style>
+              <a:lnRef idx="1">
+                <a:schemeClr val="accent1"/>
+              </a:lnRef>
+              <a:fillRef idx="0">
+                <a:schemeClr val="accent1"/>
+              </a:fillRef>
+              <a:effectRef idx="0">
+                <a:schemeClr val="accent1"/>
+              </a:effectRef>
+              <a:fontRef idx="minor">
+                <a:schemeClr val="tx1"/>
+              </a:fontRef>
+            </p:style>
+          </p:cxnSp>
           <p:pic>
             <p:nvPicPr>
-              <p:cNvPr id="66" name="Picture 65"/>
+              <p:cNvPr id="15" name="Picture 14"/>
               <p:cNvPicPr>
                 <a:picLocks noChangeAspect="1"/>
               </p:cNvPicPr>
               <p:nvPr>
                 <p:custDataLst>
-                  <p:tags r:id="rId8"/>
+                  <p:tags r:id="rId2"/>
                 </p:custDataLst>
               </p:nvPr>
             </p:nvPicPr>
             <p:blipFill>
-              <a:blip r:embed="rId11" cstate="print">
+              <a:blip r:embed="rId10" cstate="print">
                 <a:extLst>
                   <a:ext uri="{28A0092B-C50C-407E-A947-70E740481C1C}">
                     <a14:useLocalDpi xmlns:a14="http://schemas.microsoft.com/office/drawing/2010/main" val="0"/>
@@ -6842,8 +8167,113 @@
             </p:blipFill>
             <p:spPr>
               <a:xfrm>
-                <a:off x="3925684" y="4726404"/>
-                <a:ext cx="112762" cy="115810"/>
+                <a:off x="7767461" y="4784047"/>
+                <a:ext cx="143238" cy="163048"/>
+              </a:xfrm>
+              <a:prstGeom prst="rect">
+                <a:avLst/>
+              </a:prstGeom>
+            </p:spPr>
+          </p:pic>
+          <p:sp>
+            <p:nvSpPr>
+              <p:cNvPr id="99" name="Rectangle 98"/>
+              <p:cNvSpPr/>
+              <p:nvPr/>
+            </p:nvSpPr>
+            <p:spPr>
+              <a:xfrm>
+                <a:off x="5394551" y="4288738"/>
+                <a:ext cx="1600200" cy="1143000"/>
+              </a:xfrm>
+              <a:prstGeom prst="rect">
+                <a:avLst/>
+              </a:prstGeom>
+              <a:solidFill>
+                <a:schemeClr val="bg1">
+                  <a:lumMod val="95000"/>
+                </a:schemeClr>
+              </a:solidFill>
+              <a:ln w="12700">
+                <a:solidFill>
+                  <a:schemeClr val="tx1"/>
+                </a:solidFill>
+              </a:ln>
+            </p:spPr>
+            <p:style>
+              <a:lnRef idx="2">
+                <a:schemeClr val="accent1">
+                  <a:shade val="50000"/>
+                </a:schemeClr>
+              </a:lnRef>
+              <a:fillRef idx="1">
+                <a:schemeClr val="accent1"/>
+              </a:fillRef>
+              <a:effectRef idx="0">
+                <a:schemeClr val="accent1"/>
+              </a:effectRef>
+              <a:fontRef idx="minor">
+                <a:schemeClr val="lt1"/>
+              </a:fontRef>
+            </p:style>
+            <p:txBody>
+              <a:bodyPr rtlCol="0" anchor="ctr"/>
+              <a:lstStyle/>
+              <a:p>
+                <a:pPr algn="ctr"/>
+                <a:r>
+                  <a:rPr lang="en-US" dirty="0">
+                    <a:ln w="0"/>
+                    <a:solidFill>
+                      <a:schemeClr val="tx1"/>
+                    </a:solidFill>
+                    <a:effectLst>
+                      <a:outerShdw blurRad="38100" dist="19050" dir="2700000" algn="tl" rotWithShape="0">
+                        <a:schemeClr val="dk1">
+                          <a:alpha val="40000"/>
+                        </a:schemeClr>
+                      </a:outerShdw>
+                    </a:effectLst>
+                    <a:latin typeface="Times New Roman" panose="02020603050405020304" pitchFamily="18" charset="0"/>
+                    <a:cs typeface="Times New Roman" panose="02020603050405020304" pitchFamily="18" charset="0"/>
+                  </a:rPr>
+                  <a:t>Time-domain Convolution</a:t>
+                </a:r>
+                <a:endParaRPr lang="en-US" dirty="0">
+                  <a:latin typeface="Times New Roman" panose="02020603050405020304" pitchFamily="18" charset="0"/>
+                  <a:cs typeface="Times New Roman" panose="02020603050405020304" pitchFamily="18" charset="0"/>
+                </a:endParaRPr>
+              </a:p>
+            </p:txBody>
+          </p:sp>
+          <p:pic>
+            <p:nvPicPr>
+              <p:cNvPr id="102" name="Picture 101"/>
+              <p:cNvPicPr>
+                <a:picLocks noChangeAspect="1"/>
+              </p:cNvPicPr>
+              <p:nvPr>
+                <p:custDataLst>
+                  <p:tags r:id="rId3"/>
+                </p:custDataLst>
+              </p:nvPr>
+            </p:nvPicPr>
+            <p:blipFill>
+              <a:blip r:embed="rId8" cstate="print">
+                <a:extLst>
+                  <a:ext uri="{28A0092B-C50C-407E-A947-70E740481C1C}">
+                    <a14:useLocalDpi xmlns:a14="http://schemas.microsoft.com/office/drawing/2010/main" val="0"/>
+                  </a:ext>
+                </a:extLst>
+              </a:blip>
+              <a:stretch>
+                <a:fillRect/>
+              </a:stretch>
+            </p:blipFill>
+            <p:spPr>
+              <a:xfrm>
+                <a:off x="4490699" y="5973062"/>
+                <a:ext cx="146286" cy="173714"/>
               </a:xfrm>
               <a:prstGeom prst="rect">
                 <a:avLst/>
@@ -6851,447 +8281,11 @@
             </p:spPr>
           </p:pic>
         </p:grpSp>
-        <p:pic>
-          <p:nvPicPr>
-            <p:cNvPr id="70" name="Picture 69"/>
-            <p:cNvPicPr>
-              <a:picLocks noChangeAspect="1"/>
-            </p:cNvPicPr>
-            <p:nvPr>
-              <p:custDataLst>
-                <p:tags r:id="rId5"/>
-              </p:custDataLst>
-            </p:nvPr>
-          </p:nvPicPr>
-          <p:blipFill>
-            <a:blip r:embed="rId13" cstate="print">
-              <a:extLst>
-                <a:ext uri="{28A0092B-C50C-407E-A947-70E740481C1C}">
-                  <a14:useLocalDpi xmlns:a14="http://schemas.microsoft.com/office/drawing/2010/main" val="0"/>
-                </a:ext>
-              </a:extLst>
-            </a:blip>
-            <a:stretch>
-              <a:fillRect/>
-            </a:stretch>
-          </p:blipFill>
-          <p:spPr>
-            <a:xfrm>
-              <a:off x="6701279" y="4985443"/>
-              <a:ext cx="214857" cy="152381"/>
-            </a:xfrm>
-            <a:prstGeom prst="rect">
-              <a:avLst/>
-            </a:prstGeom>
-          </p:spPr>
-        </p:pic>
-        <p:cxnSp>
-          <p:nvCxnSpPr>
-            <p:cNvPr id="71" name="Straight Arrow Connector 70"/>
-            <p:cNvCxnSpPr/>
-            <p:nvPr/>
-          </p:nvCxnSpPr>
-          <p:spPr>
-            <a:xfrm>
-              <a:off x="5921317" y="5061633"/>
-              <a:ext cx="684323" cy="0"/>
-            </a:xfrm>
-            <a:prstGeom prst="straightConnector1">
-              <a:avLst/>
-            </a:prstGeom>
-            <a:ln w="12700">
-              <a:solidFill>
-                <a:schemeClr val="tx1"/>
-              </a:solidFill>
-              <a:tailEnd type="triangle"/>
-            </a:ln>
-          </p:spPr>
-          <p:style>
-            <a:lnRef idx="1">
-              <a:schemeClr val="accent1"/>
-            </a:lnRef>
-            <a:fillRef idx="0">
-              <a:schemeClr val="accent1"/>
-            </a:fillRef>
-            <a:effectRef idx="0">
-              <a:schemeClr val="accent1"/>
-            </a:effectRef>
-            <a:fontRef idx="minor">
-              <a:schemeClr val="tx1"/>
-            </a:fontRef>
-          </p:style>
-        </p:cxnSp>
       </p:grpSp>
-      <p:sp>
-        <p:nvSpPr>
-          <p:cNvPr id="49" name="Rectangle 48"/>
-          <p:cNvSpPr/>
-          <p:nvPr/>
-        </p:nvSpPr>
-        <p:spPr>
-          <a:xfrm>
-            <a:off x="2949517" y="1298001"/>
-            <a:ext cx="1143000" cy="1143000"/>
-          </a:xfrm>
-          <a:prstGeom prst="rect">
-            <a:avLst/>
-          </a:prstGeom>
-          <a:solidFill>
-            <a:schemeClr val="bg1">
-              <a:lumMod val="95000"/>
-            </a:schemeClr>
-          </a:solidFill>
-          <a:ln w="12700">
-            <a:solidFill>
-              <a:schemeClr val="tx1"/>
-            </a:solidFill>
-          </a:ln>
-        </p:spPr>
-        <p:style>
-          <a:lnRef idx="2">
-            <a:schemeClr val="accent1">
-              <a:shade val="50000"/>
-            </a:schemeClr>
-          </a:lnRef>
-          <a:fillRef idx="1">
-            <a:schemeClr val="accent1"/>
-          </a:fillRef>
-          <a:effectRef idx="0">
-            <a:schemeClr val="accent1"/>
-          </a:effectRef>
-          <a:fontRef idx="minor">
-            <a:schemeClr val="lt1"/>
-          </a:fontRef>
-        </p:style>
-        <p:txBody>
-          <a:bodyPr rtlCol="0" anchor="ctr"/>
-          <a:lstStyle/>
-          <a:p>
-            <a:pPr algn="ctr"/>
-            <a:r>
-              <a:rPr lang="en-US" dirty="0" smtClean="0">
-                <a:ln w="0"/>
-                <a:solidFill>
-                  <a:schemeClr val="tx1"/>
-                </a:solidFill>
-                <a:effectLst>
-                  <a:outerShdw blurRad="38100" dist="19050" dir="2700000" algn="tl" rotWithShape="0">
-                    <a:schemeClr val="dk1">
-                      <a:alpha val="40000"/>
-                    </a:schemeClr>
-                  </a:outerShdw>
-                </a:effectLst>
-                <a:latin typeface="Times New Roman" panose="02020603050405020304" pitchFamily="18" charset="0"/>
-                <a:cs typeface="Times New Roman" panose="02020603050405020304" pitchFamily="18" charset="0"/>
-              </a:rPr>
-              <a:t>FFT</a:t>
-            </a:r>
-            <a:endParaRPr lang="en-US" dirty="0">
-              <a:latin typeface="Times New Roman" panose="02020603050405020304" pitchFamily="18" charset="0"/>
-              <a:cs typeface="Times New Roman" panose="02020603050405020304" pitchFamily="18" charset="0"/>
-            </a:endParaRPr>
-          </a:p>
-        </p:txBody>
-      </p:sp>
-      <p:cxnSp>
-        <p:nvCxnSpPr>
-          <p:cNvPr id="50" name="Straight Arrow Connector 49"/>
-          <p:cNvCxnSpPr/>
-          <p:nvPr/>
-        </p:nvCxnSpPr>
-        <p:spPr>
-          <a:xfrm>
-            <a:off x="2263717" y="1868634"/>
-            <a:ext cx="684323" cy="0"/>
-          </a:xfrm>
-          <a:prstGeom prst="straightConnector1">
-            <a:avLst/>
-          </a:prstGeom>
-          <a:ln w="12700">
-            <a:solidFill>
-              <a:schemeClr val="tx1"/>
-            </a:solidFill>
-            <a:tailEnd type="triangle"/>
-          </a:ln>
-        </p:spPr>
-        <p:style>
-          <a:lnRef idx="1">
-            <a:schemeClr val="accent1"/>
-          </a:lnRef>
-          <a:fillRef idx="0">
-            <a:schemeClr val="accent1"/>
-          </a:fillRef>
-          <a:effectRef idx="0">
-            <a:schemeClr val="accent1"/>
-          </a:effectRef>
-          <a:fontRef idx="minor">
-            <a:schemeClr val="tx1"/>
-          </a:fontRef>
-        </p:style>
-      </p:cxnSp>
-      <p:cxnSp>
-        <p:nvCxnSpPr>
-          <p:cNvPr id="51" name="Straight Arrow Connector 50"/>
-          <p:cNvCxnSpPr>
-            <a:stCxn id="49" idx="3"/>
-            <a:endCxn id="37" idx="1"/>
-          </p:cNvCxnSpPr>
-          <p:nvPr/>
-        </p:nvCxnSpPr>
-        <p:spPr>
-          <a:xfrm>
-            <a:off x="4092517" y="1869501"/>
-            <a:ext cx="685798" cy="0"/>
-          </a:xfrm>
-          <a:prstGeom prst="straightConnector1">
-            <a:avLst/>
-          </a:prstGeom>
-          <a:ln w="12700">
-            <a:solidFill>
-              <a:schemeClr val="tx1"/>
-            </a:solidFill>
-            <a:tailEnd type="triangle"/>
-          </a:ln>
-        </p:spPr>
-        <p:style>
-          <a:lnRef idx="1">
-            <a:schemeClr val="accent1"/>
-          </a:lnRef>
-          <a:fillRef idx="0">
-            <a:schemeClr val="accent1"/>
-          </a:fillRef>
-          <a:effectRef idx="0">
-            <a:schemeClr val="accent1"/>
-          </a:effectRef>
-          <a:fontRef idx="minor">
-            <a:schemeClr val="tx1"/>
-          </a:fontRef>
-        </p:style>
-      </p:cxnSp>
-      <p:sp>
-        <p:nvSpPr>
-          <p:cNvPr id="53" name="Rectangle 52"/>
-          <p:cNvSpPr/>
-          <p:nvPr/>
-        </p:nvSpPr>
-        <p:spPr>
-          <a:xfrm>
-            <a:off x="7066694" y="1298001"/>
-            <a:ext cx="1143000" cy="1143000"/>
-          </a:xfrm>
-          <a:prstGeom prst="rect">
-            <a:avLst/>
-          </a:prstGeom>
-          <a:solidFill>
-            <a:schemeClr val="bg1">
-              <a:lumMod val="95000"/>
-            </a:schemeClr>
-          </a:solidFill>
-          <a:ln w="12700">
-            <a:solidFill>
-              <a:schemeClr val="tx1"/>
-            </a:solidFill>
-          </a:ln>
-        </p:spPr>
-        <p:style>
-          <a:lnRef idx="2">
-            <a:schemeClr val="accent1">
-              <a:shade val="50000"/>
-            </a:schemeClr>
-          </a:lnRef>
-          <a:fillRef idx="1">
-            <a:schemeClr val="accent1"/>
-          </a:fillRef>
-          <a:effectRef idx="0">
-            <a:schemeClr val="accent1"/>
-          </a:effectRef>
-          <a:fontRef idx="minor">
-            <a:schemeClr val="lt1"/>
-          </a:fontRef>
-        </p:style>
-        <p:txBody>
-          <a:bodyPr rtlCol="0" anchor="ctr"/>
-          <a:lstStyle/>
-          <a:p>
-            <a:pPr algn="ctr"/>
-            <a:r>
-              <a:rPr lang="en-US" dirty="0" smtClean="0">
-                <a:ln w="0"/>
-                <a:solidFill>
-                  <a:schemeClr val="tx1"/>
-                </a:solidFill>
-                <a:effectLst>
-                  <a:outerShdw blurRad="38100" dist="19050" dir="2700000" algn="tl" rotWithShape="0">
-                    <a:schemeClr val="dk1">
-                      <a:alpha val="40000"/>
-                    </a:schemeClr>
-                  </a:outerShdw>
-                </a:effectLst>
-                <a:latin typeface="Times New Roman" panose="02020603050405020304" pitchFamily="18" charset="0"/>
-                <a:cs typeface="Times New Roman" panose="02020603050405020304" pitchFamily="18" charset="0"/>
-              </a:rPr>
-              <a:t>IFFT</a:t>
-            </a:r>
-            <a:endParaRPr lang="en-US" dirty="0">
-              <a:latin typeface="Times New Roman" panose="02020603050405020304" pitchFamily="18" charset="0"/>
-              <a:cs typeface="Times New Roman" panose="02020603050405020304" pitchFamily="18" charset="0"/>
-            </a:endParaRPr>
-          </a:p>
-        </p:txBody>
-      </p:sp>
-      <p:cxnSp>
-        <p:nvCxnSpPr>
-          <p:cNvPr id="56" name="Straight Arrow Connector 55"/>
-          <p:cNvCxnSpPr>
-            <a:stCxn id="37" idx="3"/>
-            <a:endCxn id="53" idx="1"/>
-          </p:cNvCxnSpPr>
-          <p:nvPr/>
-        </p:nvCxnSpPr>
-        <p:spPr>
-          <a:xfrm>
-            <a:off x="6378515" y="1869501"/>
-            <a:ext cx="688179" cy="0"/>
-          </a:xfrm>
-          <a:prstGeom prst="straightConnector1">
-            <a:avLst/>
-          </a:prstGeom>
-          <a:ln w="12700">
-            <a:solidFill>
-              <a:schemeClr val="tx1"/>
-            </a:solidFill>
-            <a:tailEnd type="triangle"/>
-          </a:ln>
-        </p:spPr>
-        <p:style>
-          <a:lnRef idx="1">
-            <a:schemeClr val="accent1"/>
-          </a:lnRef>
-          <a:fillRef idx="0">
-            <a:schemeClr val="accent1"/>
-          </a:fillRef>
-          <a:effectRef idx="0">
-            <a:schemeClr val="accent1"/>
-          </a:effectRef>
-          <a:fontRef idx="minor">
-            <a:schemeClr val="tx1"/>
-          </a:fontRef>
-        </p:style>
-      </p:cxnSp>
-      <p:sp>
-        <p:nvSpPr>
-          <p:cNvPr id="58" name="Rectangle 57"/>
-          <p:cNvSpPr/>
-          <p:nvPr/>
-        </p:nvSpPr>
-        <p:spPr>
-          <a:xfrm>
-            <a:off x="8897873" y="1297134"/>
-            <a:ext cx="1600200" cy="1143000"/>
-          </a:xfrm>
-          <a:prstGeom prst="rect">
-            <a:avLst/>
-          </a:prstGeom>
-          <a:solidFill>
-            <a:schemeClr val="bg1">
-              <a:lumMod val="95000"/>
-            </a:schemeClr>
-          </a:solidFill>
-          <a:ln w="12700">
-            <a:solidFill>
-              <a:schemeClr val="tx1"/>
-            </a:solidFill>
-          </a:ln>
-        </p:spPr>
-        <p:style>
-          <a:lnRef idx="2">
-            <a:schemeClr val="accent1">
-              <a:shade val="50000"/>
-            </a:schemeClr>
-          </a:lnRef>
-          <a:fillRef idx="1">
-            <a:schemeClr val="accent1"/>
-          </a:fillRef>
-          <a:effectRef idx="0">
-            <a:schemeClr val="accent1"/>
-          </a:effectRef>
-          <a:fontRef idx="minor">
-            <a:schemeClr val="lt1"/>
-          </a:fontRef>
-        </p:style>
-        <p:txBody>
-          <a:bodyPr rtlCol="0" anchor="ctr"/>
-          <a:lstStyle/>
-          <a:p>
-            <a:pPr algn="ctr"/>
-            <a:r>
-              <a:rPr lang="en-US" dirty="0" smtClean="0">
-                <a:ln w="0"/>
-                <a:solidFill>
-                  <a:schemeClr val="tx1"/>
-                </a:solidFill>
-                <a:effectLst>
-                  <a:outerShdw blurRad="38100" dist="19050" dir="2700000" algn="tl" rotWithShape="0">
-                    <a:schemeClr val="dk1">
-                      <a:alpha val="40000"/>
-                    </a:schemeClr>
-                  </a:outerShdw>
-                </a:effectLst>
-                <a:latin typeface="Times New Roman" panose="02020603050405020304" pitchFamily="18" charset="0"/>
-                <a:cs typeface="Times New Roman" panose="02020603050405020304" pitchFamily="18" charset="0"/>
-              </a:rPr>
-              <a:t>Complex Multiplication</a:t>
-            </a:r>
-            <a:endParaRPr lang="en-US" dirty="0">
-              <a:latin typeface="Times New Roman" panose="02020603050405020304" pitchFamily="18" charset="0"/>
-              <a:cs typeface="Times New Roman" panose="02020603050405020304" pitchFamily="18" charset="0"/>
-            </a:endParaRPr>
-          </a:p>
-        </p:txBody>
-      </p:sp>
-      <p:cxnSp>
-        <p:nvCxnSpPr>
-          <p:cNvPr id="62" name="Straight Arrow Connector 61"/>
-          <p:cNvCxnSpPr>
-            <a:stCxn id="53" idx="3"/>
-            <a:endCxn id="58" idx="1"/>
-          </p:cNvCxnSpPr>
-          <p:nvPr/>
-        </p:nvCxnSpPr>
-        <p:spPr>
-          <a:xfrm flipV="1">
-            <a:off x="8209694" y="1868634"/>
-            <a:ext cx="688179" cy="867"/>
-          </a:xfrm>
-          <a:prstGeom prst="straightConnector1">
-            <a:avLst/>
-          </a:prstGeom>
-          <a:ln w="12700">
-            <a:solidFill>
-              <a:schemeClr val="tx1"/>
-            </a:solidFill>
-            <a:tailEnd type="triangle"/>
-          </a:ln>
-        </p:spPr>
-        <p:style>
-          <a:lnRef idx="1">
-            <a:schemeClr val="accent1"/>
-          </a:lnRef>
-          <a:fillRef idx="0">
-            <a:schemeClr val="accent1"/>
-          </a:fillRef>
-          <a:effectRef idx="0">
-            <a:schemeClr val="accent1"/>
-          </a:effectRef>
-          <a:fontRef idx="minor">
-            <a:schemeClr val="tx1"/>
-          </a:fontRef>
-        </p:style>
-      </p:cxnSp>
     </p:spTree>
     <p:extLst>
       <p:ext uri="{BB962C8B-B14F-4D97-AF65-F5344CB8AC3E}">
-        <p14:creationId xmlns:p14="http://schemas.microsoft.com/office/powerpoint/2010/main" val="123942918"/>
+        <p14:creationId xmlns:p14="http://schemas.microsoft.com/office/powerpoint/2010/main" val="276682402"/>
       </p:ext>
     </p:extLst>
   </p:cSld>
@@ -7406,12 +8400,12 @@
 
 <file path=ppt/tags/tag15.xml><?xml version="1.0" encoding="utf-8"?>
 <p:tagLst xmlns:a="http://schemas.openxmlformats.org/drawingml/2006/main" xmlns:r="http://schemas.openxmlformats.org/officeDocument/2006/relationships" xmlns:p="http://schemas.openxmlformats.org/presentationml/2006/main">
-  <p:tag name="ORIGINALHEIGHT" val="56.24299"/>
-  <p:tag name="ORIGINALWIDTH" val="50.99362"/>
+  <p:tag name="ORIGINALHEIGHT" val="54.74315"/>
+  <p:tag name="ORIGINALWIDTH" val="71.2411"/>
   <p:tag name="OUTPUTDPI" val="1200"/>
-  <p:tag name="LATEXADDIN" val="\documentclass{article}&#10;\usepackage{amsmath}&#10;\pagestyle{empty}&#10;\begin{document}&#10;&#10;$\mathbf{r}$&#10;&#10;&#10;\end{document}"/>
+  <p:tag name="LATEXADDIN" val="\documentclass{article}&#10;\usepackage{amsmath}&#10;\pagestyle{empty}&#10;\begin{document}&#10;&#10;$\mathbf{x}$&#10;&#10;&#10;\end{document}"/>
   <p:tag name="IGUANATEXSIZE" val="20"/>
-  <p:tag name="IGUANATEXCURSOR" val="93"/>
+  <p:tag name="IGUANATEXCURSOR" val="91"/>
   <p:tag name="TRANSPARENCY" val="True"/>
   <p:tag name="FILENAME" val=""/>
   <p:tag name="INPUTTYPE" val="0"/>
@@ -7427,7 +8421,7 @@
   <p:tag name="OUTPUTDPI" val="1200"/>
   <p:tag name="LATEXADDIN" val="\documentclass{article}&#10;\usepackage{amsmath}&#10;\pagestyle{empty}&#10;\begin{document}&#10;&#10;$\mathbf{c}$&#10;&#10;&#10;\end{document}"/>
   <p:tag name="IGUANATEXSIZE" val="20"/>
-  <p:tag name="IGUANATEXCURSOR" val="92"/>
+  <p:tag name="IGUANATEXCURSOR" val="91"/>
   <p:tag name="TRANSPARENCY" val="True"/>
   <p:tag name="FILENAME" val=""/>
   <p:tag name="INPUTTYPE" val="0"/>
@@ -7438,12 +8432,12 @@
 
 <file path=ppt/tags/tag17.xml><?xml version="1.0" encoding="utf-8"?>
 <p:tagLst xmlns:a="http://schemas.openxmlformats.org/drawingml/2006/main" xmlns:r="http://schemas.openxmlformats.org/officeDocument/2006/relationships" xmlns:p="http://schemas.openxmlformats.org/presentationml/2006/main">
-  <p:tag name="ORIGINALHEIGHT" val="105.7368"/>
-  <p:tag name="ORIGINALWIDTH" val="251.2186"/>
+  <p:tag name="ORIGINALHEIGHT" val="80.24"/>
+  <p:tag name="ORIGINALWIDTH" val="70.49118"/>
   <p:tag name="OUTPUTDPI" val="1200"/>
-  <p:tag name="LATEXADDIN" val="\documentclass{article}&#10;\usepackage{amsmath}&#10;\pagestyle{empty}&#10;\begin{document}&#10;&#10;$\mathbf{H}_\text{NO}$&#10;&#10;&#10;\end{document}"/>
+  <p:tag name="LATEXADDIN" val="\documentclass{article}&#10;\usepackage{amsmath}&#10;\pagestyle{empty}&#10;\begin{document}&#10;&#10;$\mathbf{y}$&#10;&#10;&#10;\end{document}"/>
   <p:tag name="IGUANATEXSIZE" val="20"/>
-  <p:tag name="IGUANATEXCURSOR" val="103"/>
+  <p:tag name="IGUANATEXCURSOR" val="91"/>
   <p:tag name="TRANSPARENCY" val="True"/>
   <p:tag name="FILENAME" val=""/>
   <p:tag name="INPUTTYPE" val="0"/>
@@ -7454,12 +8448,12 @@
 
 <file path=ppt/tags/tag18.xml><?xml version="1.0" encoding="utf-8"?>
 <p:tagLst xmlns:a="http://schemas.openxmlformats.org/drawingml/2006/main" xmlns:r="http://schemas.openxmlformats.org/officeDocument/2006/relationships" xmlns:p="http://schemas.openxmlformats.org/presentationml/2006/main">
-  <p:tag name="ORIGINALHEIGHT" val="74.99063"/>
-  <p:tag name="ORIGINALWIDTH" val="105.7368"/>
+  <p:tag name="ORIGINALHEIGHT" val="85.48929"/>
+  <p:tag name="ORIGINALWIDTH" val="71.99102"/>
   <p:tag name="OUTPUTDPI" val="1200"/>
-  <p:tag name="LATEXADDIN" val="\documentclass{article}&#10;\usepackage{amsmath}&#10;\pagestyle{empty}&#10;\begin{document}&#10;&#10;$\mathbf{r}_\text{d}$&#10;&#10;&#10;\end{document}"/>
+  <p:tag name="LATEXADDIN" val="\documentclass{article}&#10;\usepackage{amsmath}&#10;\pagestyle{empty}&#10;\begin{document}&#10;&#10;$\mathbf{h}$&#10;&#10;&#10;\end{document}"/>
   <p:tag name="IGUANATEXSIZE" val="20"/>
-  <p:tag name="IGUANATEXCURSOR" val="100"/>
+  <p:tag name="IGUANATEXCURSOR" val="91"/>
   <p:tag name="TRANSPARENCY" val="True"/>
   <p:tag name="FILENAME" val=""/>
   <p:tag name="INPUTTYPE" val="0"/>
@@ -7470,12 +8464,12 @@
 
 <file path=ppt/tags/tag19.xml><?xml version="1.0" encoding="utf-8"?>
 <p:tagLst xmlns:a="http://schemas.openxmlformats.org/drawingml/2006/main" xmlns:r="http://schemas.openxmlformats.org/officeDocument/2006/relationships" xmlns:p="http://schemas.openxmlformats.org/presentationml/2006/main">
-  <p:tag name="ORIGINALHEIGHT" val="74.99063"/>
-  <p:tag name="ORIGINALWIDTH" val="105.7368"/>
+  <p:tag name="ORIGINALHEIGHT" val="56.99291"/>
+  <p:tag name="ORIGINALWIDTH" val="55.49307"/>
   <p:tag name="OUTPUTDPI" val="1200"/>
-  <p:tag name="LATEXADDIN" val="\documentclass{article}&#10;\usepackage{amsmath}&#10;\pagestyle{empty}&#10;\begin{document}&#10;&#10;$\mathbf{r}_\text{d}$&#10;&#10;&#10;\end{document}"/>
+  <p:tag name="LATEXADDIN" val="\documentclass{article}&#10;\usepackage{amsmath}&#10;\pagestyle{empty}&#10;\begin{document}&#10;&#10;$\mathbf{c}$&#10;&#10;&#10;\end{document}"/>
   <p:tag name="IGUANATEXSIZE" val="20"/>
-  <p:tag name="IGUANATEXCURSOR" val="100"/>
+  <p:tag name="IGUANATEXCURSOR" val="91"/>
   <p:tag name="TRANSPARENCY" val="True"/>
   <p:tag name="FILENAME" val=""/>
   <p:tag name="INPUTTYPE" val="0"/>
@@ -7502,10 +8496,42 @@
 
 <file path=ppt/tags/tag20.xml><?xml version="1.0" encoding="utf-8"?>
 <p:tagLst xmlns:a="http://schemas.openxmlformats.org/drawingml/2006/main" xmlns:r="http://schemas.openxmlformats.org/officeDocument/2006/relationships" xmlns:p="http://schemas.openxmlformats.org/presentationml/2006/main">
-  <p:tag name="ORIGINALHEIGHT" val="56.24299"/>
-  <p:tag name="ORIGINALWIDTH" val="50.99362"/>
+  <p:tag name="ORIGINALHEIGHT" val="54.74315"/>
+  <p:tag name="ORIGINALWIDTH" val="71.2411"/>
   <p:tag name="OUTPUTDPI" val="1200"/>
-  <p:tag name="LATEXADDIN" val="\documentclass{article}&#10;\usepackage{amsmath}&#10;\pagestyle{empty}&#10;\begin{document}&#10;&#10;$\mathbf{r}$&#10;&#10;&#10;\end{document}"/>
+  <p:tag name="LATEXADDIN" val="\documentclass{article}&#10;\usepackage{amsmath}&#10;\pagestyle{empty}&#10;\begin{document}&#10;&#10;$\mathbf{x}$&#10;&#10;&#10;\end{document}"/>
+  <p:tag name="IGUANATEXSIZE" val="20"/>
+  <p:tag name="IGUANATEXCURSOR" val="91"/>
+  <p:tag name="TRANSPARENCY" val="True"/>
+  <p:tag name="FILENAME" val=""/>
+  <p:tag name="INPUTTYPE" val="0"/>
+  <p:tag name="LATEXENGINEID" val="0"/>
+  <p:tag name="TEMPFOLDER" val="C:\Users\ecestudent\Documents\IguanaTexTemp\"/>
+</p:tagLst>
+</file>
+
+<file path=ppt/tags/tag21.xml><?xml version="1.0" encoding="utf-8"?>
+<p:tagLst xmlns:a="http://schemas.openxmlformats.org/drawingml/2006/main" xmlns:r="http://schemas.openxmlformats.org/officeDocument/2006/relationships" xmlns:p="http://schemas.openxmlformats.org/presentationml/2006/main">
+  <p:tag name="ORIGINALHEIGHT" val="85.48929"/>
+  <p:tag name="ORIGINALWIDTH" val="71.99102"/>
+  <p:tag name="OUTPUTDPI" val="1200"/>
+  <p:tag name="LATEXADDIN" val="\documentclass{article}&#10;\usepackage{amsmath}&#10;\pagestyle{empty}&#10;\begin{document}&#10;&#10;$\mathbf{h}$&#10;&#10;&#10;\end{document}"/>
+  <p:tag name="IGUANATEXSIZE" val="20"/>
+  <p:tag name="IGUANATEXCURSOR" val="92"/>
+  <p:tag name="TRANSPARENCY" val="True"/>
+  <p:tag name="FILENAME" val=""/>
+  <p:tag name="INPUTTYPE" val="0"/>
+  <p:tag name="LATEXENGINEID" val="0"/>
+  <p:tag name="TEMPFOLDER" val="C:\Users\ecestudent\Documents\IguanaTexTemp\"/>
+</p:tagLst>
+</file>
+
+<file path=ppt/tags/tag22.xml><?xml version="1.0" encoding="utf-8"?>
+<p:tagLst xmlns:a="http://schemas.openxmlformats.org/drawingml/2006/main" xmlns:r="http://schemas.openxmlformats.org/officeDocument/2006/relationships" xmlns:p="http://schemas.openxmlformats.org/presentationml/2006/main">
+  <p:tag name="ORIGINALHEIGHT" val="80.24"/>
+  <p:tag name="ORIGINALWIDTH" val="70.49118"/>
+  <p:tag name="OUTPUTDPI" val="1200"/>
+  <p:tag name="LATEXADDIN" val="\documentclass{article}&#10;\usepackage{amsmath}&#10;\pagestyle{empty}&#10;\begin{document}&#10;&#10;$\mathbf{y}$&#10;&#10;&#10;\end{document}"/>
   <p:tag name="IGUANATEXSIZE" val="20"/>
   <p:tag name="IGUANATEXCURSOR" val="93"/>
   <p:tag name="TRANSPARENCY" val="True"/>
@@ -7516,14 +8542,14 @@
 </p:tagLst>
 </file>
 
-<file path=ppt/tags/tag21.xml><?xml version="1.0" encoding="utf-8"?>
+<file path=ppt/tags/tag23.xml><?xml version="1.0" encoding="utf-8"?>
 <p:tagLst xmlns:a="http://schemas.openxmlformats.org/drawingml/2006/main" xmlns:r="http://schemas.openxmlformats.org/officeDocument/2006/relationships" xmlns:p="http://schemas.openxmlformats.org/presentationml/2006/main">
-  <p:tag name="ORIGINALHEIGHT" val="105.7368"/>
-  <p:tag name="ORIGINALWIDTH" val="251.2186"/>
+  <p:tag name="ORIGINALHEIGHT" val="54.74315"/>
+  <p:tag name="ORIGINALWIDTH" val="71.2411"/>
   <p:tag name="OUTPUTDPI" val="1200"/>
-  <p:tag name="LATEXADDIN" val="\documentclass{article}&#10;\usepackage{amsmath}&#10;\pagestyle{empty}&#10;\begin{document}&#10;&#10;$\mathbf{H}_\text{NO}$&#10;&#10;&#10;\end{document}"/>
+  <p:tag name="LATEXADDIN" val="\documentclass{article}&#10;\usepackage{amsmath}&#10;\pagestyle{empty}&#10;\begin{document}&#10;&#10;$\mathbf{x}$&#10;&#10;&#10;\end{document}"/>
   <p:tag name="IGUANATEXSIZE" val="20"/>
-  <p:tag name="IGUANATEXCURSOR" val="103"/>
+  <p:tag name="IGUANATEXCURSOR" val="91"/>
   <p:tag name="TRANSPARENCY" val="True"/>
   <p:tag name="FILENAME" val=""/>
   <p:tag name="INPUTTYPE" val="0"/>
@@ -7532,14 +8558,78 @@
 </p:tagLst>
 </file>
 
-<file path=ppt/tags/tag22.xml><?xml version="1.0" encoding="utf-8"?>
+<file path=ppt/tags/tag24.xml><?xml version="1.0" encoding="utf-8"?>
 <p:tagLst xmlns:a="http://schemas.openxmlformats.org/drawingml/2006/main" xmlns:r="http://schemas.openxmlformats.org/officeDocument/2006/relationships" xmlns:p="http://schemas.openxmlformats.org/presentationml/2006/main">
-  <p:tag name="ORIGINALHEIGHT" val="56.99291"/>
-  <p:tag name="ORIGINALWIDTH" val="55.49307"/>
+  <p:tag name="ORIGINALHEIGHT" val="80.24"/>
+  <p:tag name="ORIGINALWIDTH" val="70.49118"/>
   <p:tag name="OUTPUTDPI" val="1200"/>
-  <p:tag name="LATEXADDIN" val="\documentclass{article}&#10;\usepackage{amsmath}&#10;\pagestyle{empty}&#10;\begin{document}&#10;&#10;$\mathbf{c}$&#10;&#10;&#10;\end{document}"/>
+  <p:tag name="LATEXADDIN" val="\documentclass{article}&#10;\usepackage{amsmath}&#10;\pagestyle{empty}&#10;\begin{document}&#10;&#10;$\mathbf{y}$&#10;&#10;&#10;\end{document}"/>
   <p:tag name="IGUANATEXSIZE" val="20"/>
-  <p:tag name="IGUANATEXCURSOR" val="92"/>
+  <p:tag name="IGUANATEXCURSOR" val="91"/>
+  <p:tag name="TRANSPARENCY" val="True"/>
+  <p:tag name="FILENAME" val=""/>
+  <p:tag name="INPUTTYPE" val="0"/>
+  <p:tag name="LATEXENGINEID" val="0"/>
+  <p:tag name="TEMPFOLDER" val="C:\Users\ecestudent\Documents\IguanaTexTemp\"/>
+</p:tagLst>
+</file>
+
+<file path=ppt/tags/tag25.xml><?xml version="1.0" encoding="utf-8"?>
+<p:tagLst xmlns:a="http://schemas.openxmlformats.org/drawingml/2006/main" xmlns:r="http://schemas.openxmlformats.org/officeDocument/2006/relationships" xmlns:p="http://schemas.openxmlformats.org/presentationml/2006/main">
+  <p:tag name="ORIGINALHEIGHT" val="85.48929"/>
+  <p:tag name="ORIGINALWIDTH" val="71.99102"/>
+  <p:tag name="OUTPUTDPI" val="1200"/>
+  <p:tag name="LATEXADDIN" val="\documentclass{article}&#10;\usepackage{amsmath}&#10;\pagestyle{empty}&#10;\begin{document}&#10;&#10;$\mathbf{h}$&#10;&#10;&#10;\end{document}"/>
+  <p:tag name="IGUANATEXSIZE" val="20"/>
+  <p:tag name="IGUANATEXCURSOR" val="91"/>
+  <p:tag name="TRANSPARENCY" val="True"/>
+  <p:tag name="FILENAME" val=""/>
+  <p:tag name="INPUTTYPE" val="0"/>
+  <p:tag name="LATEXENGINEID" val="0"/>
+  <p:tag name="TEMPFOLDER" val="C:\Users\ecestudent\Documents\IguanaTexTemp\"/>
+</p:tagLst>
+</file>
+
+<file path=ppt/tags/tag26.xml><?xml version="1.0" encoding="utf-8"?>
+<p:tagLst xmlns:a="http://schemas.openxmlformats.org/drawingml/2006/main" xmlns:r="http://schemas.openxmlformats.org/officeDocument/2006/relationships" xmlns:p="http://schemas.openxmlformats.org/presentationml/2006/main">
+  <p:tag name="ORIGINALHEIGHT" val="85.48929"/>
+  <p:tag name="ORIGINALWIDTH" val="71.99102"/>
+  <p:tag name="OUTPUTDPI" val="1200"/>
+  <p:tag name="LATEXADDIN" val="\documentclass{article}&#10;\usepackage{amsmath}&#10;\pagestyle{empty}&#10;\begin{document}&#10;&#10;$\mathbf{h}$&#10;&#10;&#10;\end{document}"/>
+  <p:tag name="IGUANATEXSIZE" val="20"/>
+  <p:tag name="IGUANATEXCURSOR" val="91"/>
+  <p:tag name="TRANSPARENCY" val="True"/>
+  <p:tag name="FILENAME" val=""/>
+  <p:tag name="INPUTTYPE" val="0"/>
+  <p:tag name="LATEXENGINEID" val="0"/>
+  <p:tag name="TEMPFOLDER" val="C:\Users\ecestudent\Documents\IguanaTexTemp\"/>
+</p:tagLst>
+</file>
+
+<file path=ppt/tags/tag27.xml><?xml version="1.0" encoding="utf-8"?>
+<p:tagLst xmlns:a="http://schemas.openxmlformats.org/drawingml/2006/main" xmlns:r="http://schemas.openxmlformats.org/officeDocument/2006/relationships" xmlns:p="http://schemas.openxmlformats.org/presentationml/2006/main">
+  <p:tag name="ORIGINALHEIGHT" val="54.74315"/>
+  <p:tag name="ORIGINALWIDTH" val="71.2411"/>
+  <p:tag name="OUTPUTDPI" val="1200"/>
+  <p:tag name="LATEXADDIN" val="\documentclass{article}&#10;\usepackage{amsmath}&#10;\pagestyle{empty}&#10;\begin{document}&#10;&#10;$\mathbf{x}$&#10;&#10;&#10;\end{document}"/>
+  <p:tag name="IGUANATEXSIZE" val="20"/>
+  <p:tag name="IGUANATEXCURSOR" val="91"/>
+  <p:tag name="TRANSPARENCY" val="True"/>
+  <p:tag name="FILENAME" val=""/>
+  <p:tag name="INPUTTYPE" val="0"/>
+  <p:tag name="LATEXENGINEID" val="0"/>
+  <p:tag name="TEMPFOLDER" val="C:\Users\ecestudent\Documents\IguanaTexTemp\"/>
+</p:tagLst>
+</file>
+
+<file path=ppt/tags/tag28.xml><?xml version="1.0" encoding="utf-8"?>
+<p:tagLst xmlns:a="http://schemas.openxmlformats.org/drawingml/2006/main" xmlns:r="http://schemas.openxmlformats.org/officeDocument/2006/relationships" xmlns:p="http://schemas.openxmlformats.org/presentationml/2006/main">
+  <p:tag name="ORIGINALHEIGHT" val="80.24"/>
+  <p:tag name="ORIGINALWIDTH" val="70.49118"/>
+  <p:tag name="OUTPUTDPI" val="1200"/>
+  <p:tag name="LATEXADDIN" val="\documentclass{article}&#10;\usepackage{amsmath}&#10;\pagestyle{empty}&#10;\begin{document}&#10;&#10;$\mathbf{y}$&#10;&#10;&#10;\end{document}"/>
+  <p:tag name="IGUANATEXSIZE" val="20"/>
+  <p:tag name="IGUANATEXCURSOR" val="93"/>
   <p:tag name="TRANSPARENCY" val="True"/>
   <p:tag name="FILENAME" val=""/>
   <p:tag name="INPUTTYPE" val="0"/>

</xml_diff>

<commit_message>
ported my thesis to College template, Kris hasnt seen it yet.
</commit_message>
<xml_diff>
--- a/figures/gpu_convolution/gpuConv.pptx
+++ b/figures/gpu_convolution/gpuConv.pptx
@@ -244,7 +244,7 @@
           <a:p>
             <a:fld id="{77B67276-88E4-41AA-A7DB-BE4599955492}" type="datetimeFigureOut">
               <a:rPr lang="en-US" smtClean="0"/>
-              <a:t>4/11/2017</a:t>
+              <a:t>5/7/2017</a:t>
             </a:fld>
             <a:endParaRPr lang="en-US"/>
           </a:p>
@@ -414,7 +414,7 @@
           <a:p>
             <a:fld id="{77B67276-88E4-41AA-A7DB-BE4599955492}" type="datetimeFigureOut">
               <a:rPr lang="en-US" smtClean="0"/>
-              <a:t>4/11/2017</a:t>
+              <a:t>5/7/2017</a:t>
             </a:fld>
             <a:endParaRPr lang="en-US"/>
           </a:p>
@@ -594,7 +594,7 @@
           <a:p>
             <a:fld id="{77B67276-88E4-41AA-A7DB-BE4599955492}" type="datetimeFigureOut">
               <a:rPr lang="en-US" smtClean="0"/>
-              <a:t>4/11/2017</a:t>
+              <a:t>5/7/2017</a:t>
             </a:fld>
             <a:endParaRPr lang="en-US"/>
           </a:p>
@@ -764,7 +764,7 @@
           <a:p>
             <a:fld id="{77B67276-88E4-41AA-A7DB-BE4599955492}" type="datetimeFigureOut">
               <a:rPr lang="en-US" smtClean="0"/>
-              <a:t>4/11/2017</a:t>
+              <a:t>5/7/2017</a:t>
             </a:fld>
             <a:endParaRPr lang="en-US"/>
           </a:p>
@@ -1010,7 +1010,7 @@
           <a:p>
             <a:fld id="{77B67276-88E4-41AA-A7DB-BE4599955492}" type="datetimeFigureOut">
               <a:rPr lang="en-US" smtClean="0"/>
-              <a:t>4/11/2017</a:t>
+              <a:t>5/7/2017</a:t>
             </a:fld>
             <a:endParaRPr lang="en-US"/>
           </a:p>
@@ -1242,7 +1242,7 @@
           <a:p>
             <a:fld id="{77B67276-88E4-41AA-A7DB-BE4599955492}" type="datetimeFigureOut">
               <a:rPr lang="en-US" smtClean="0"/>
-              <a:t>4/11/2017</a:t>
+              <a:t>5/7/2017</a:t>
             </a:fld>
             <a:endParaRPr lang="en-US"/>
           </a:p>
@@ -1609,7 +1609,7 @@
           <a:p>
             <a:fld id="{77B67276-88E4-41AA-A7DB-BE4599955492}" type="datetimeFigureOut">
               <a:rPr lang="en-US" smtClean="0"/>
-              <a:t>4/11/2017</a:t>
+              <a:t>5/7/2017</a:t>
             </a:fld>
             <a:endParaRPr lang="en-US"/>
           </a:p>
@@ -1727,7 +1727,7 @@
           <a:p>
             <a:fld id="{77B67276-88E4-41AA-A7DB-BE4599955492}" type="datetimeFigureOut">
               <a:rPr lang="en-US" smtClean="0"/>
-              <a:t>4/11/2017</a:t>
+              <a:t>5/7/2017</a:t>
             </a:fld>
             <a:endParaRPr lang="en-US"/>
           </a:p>
@@ -1822,7 +1822,7 @@
           <a:p>
             <a:fld id="{77B67276-88E4-41AA-A7DB-BE4599955492}" type="datetimeFigureOut">
               <a:rPr lang="en-US" smtClean="0"/>
-              <a:t>4/11/2017</a:t>
+              <a:t>5/7/2017</a:t>
             </a:fld>
             <a:endParaRPr lang="en-US"/>
           </a:p>
@@ -2099,7 +2099,7 @@
           <a:p>
             <a:fld id="{77B67276-88E4-41AA-A7DB-BE4599955492}" type="datetimeFigureOut">
               <a:rPr lang="en-US" smtClean="0"/>
-              <a:t>4/11/2017</a:t>
+              <a:t>5/7/2017</a:t>
             </a:fld>
             <a:endParaRPr lang="en-US"/>
           </a:p>
@@ -2352,7 +2352,7 @@
           <a:p>
             <a:fld id="{77B67276-88E4-41AA-A7DB-BE4599955492}" type="datetimeFigureOut">
               <a:rPr lang="en-US" smtClean="0"/>
-              <a:t>4/11/2017</a:t>
+              <a:t>5/7/2017</a:t>
             </a:fld>
             <a:endParaRPr lang="en-US"/>
           </a:p>
@@ -2565,7 +2565,7 @@
           <a:p>
             <a:fld id="{77B67276-88E4-41AA-A7DB-BE4599955492}" type="datetimeFigureOut">
               <a:rPr lang="en-US" smtClean="0"/>
-              <a:t>4/11/2017</a:t>
+              <a:t>5/7/2017</a:t>
             </a:fld>
             <a:endParaRPr lang="en-US"/>
           </a:p>
@@ -4442,1146 +4442,1131 @@
       </p:grpSpPr>
       <p:grpSp>
         <p:nvGrpSpPr>
-          <p:cNvPr id="60" name="Group 59"/>
+          <p:cNvPr id="57" name="Group 56"/>
           <p:cNvGrpSpPr/>
           <p:nvPr/>
         </p:nvGrpSpPr>
         <p:grpSpPr>
           <a:xfrm>
-            <a:off x="1398601" y="685800"/>
-            <a:ext cx="9396322" cy="6477000"/>
-            <a:chOff x="1398601" y="685800"/>
-            <a:chExt cx="9396322" cy="6477000"/>
+            <a:off x="1398601" y="3581400"/>
+            <a:ext cx="9396322" cy="3581400"/>
+            <a:chOff x="1398601" y="-304800"/>
+            <a:chExt cx="9396322" cy="3581400"/>
           </a:xfrm>
         </p:grpSpPr>
-        <p:grpSp>
-          <p:nvGrpSpPr>
-            <p:cNvPr id="57" name="Group 56"/>
-            <p:cNvGrpSpPr/>
+        <p:sp>
+          <p:nvSpPr>
+            <p:cNvPr id="69" name="Rectangle 68"/>
+            <p:cNvSpPr/>
             <p:nvPr/>
-          </p:nvGrpSpPr>
-          <p:grpSpPr>
+          </p:nvSpPr>
+          <p:spPr>
             <a:xfrm>
-              <a:off x="1398601" y="3581400"/>
-              <a:ext cx="9396322" cy="3581400"/>
-              <a:chOff x="1398601" y="-304800"/>
-              <a:chExt cx="9396322" cy="3581400"/>
+              <a:off x="2325007" y="-304800"/>
+              <a:ext cx="1143000" cy="1143000"/>
             </a:xfrm>
-          </p:grpSpPr>
-          <p:sp>
-            <p:nvSpPr>
-              <p:cNvPr id="69" name="Rectangle 68"/>
-              <p:cNvSpPr/>
-              <p:nvPr/>
-            </p:nvSpPr>
-            <p:spPr>
-              <a:xfrm>
-                <a:off x="2325007" y="-304800"/>
-                <a:ext cx="1143000" cy="1143000"/>
-              </a:xfrm>
-              <a:prstGeom prst="rect">
-                <a:avLst/>
-              </a:prstGeom>
+            <a:prstGeom prst="rect">
+              <a:avLst/>
+            </a:prstGeom>
+            <a:solidFill>
+              <a:schemeClr val="bg1">
+                <a:lumMod val="95000"/>
+              </a:schemeClr>
+            </a:solidFill>
+            <a:ln w="12700">
               <a:solidFill>
-                <a:schemeClr val="bg1">
-                  <a:lumMod val="95000"/>
-                </a:schemeClr>
+                <a:schemeClr val="tx1"/>
               </a:solidFill>
-              <a:ln w="12700">
-                <a:solidFill>
-                  <a:schemeClr val="tx1"/>
-                </a:solidFill>
-              </a:ln>
-            </p:spPr>
-            <p:style>
-              <a:lnRef idx="2">
-                <a:schemeClr val="accent1">
-                  <a:shade val="50000"/>
-                </a:schemeClr>
-              </a:lnRef>
-              <a:fillRef idx="1">
-                <a:schemeClr val="accent1"/>
-              </a:fillRef>
-              <a:effectRef idx="0">
-                <a:schemeClr val="accent1"/>
-              </a:effectRef>
-              <a:fontRef idx="minor">
-                <a:schemeClr val="lt1"/>
-              </a:fontRef>
-            </p:style>
-            <p:txBody>
-              <a:bodyPr rtlCol="0" anchor="ctr"/>
-              <a:lstStyle/>
-              <a:p>
-                <a:pPr algn="ctr"/>
-                <a:r>
-                  <a:rPr lang="en-US" dirty="0" smtClean="0">
-                    <a:ln w="0"/>
-                    <a:solidFill>
-                      <a:schemeClr val="tx1"/>
-                    </a:solidFill>
-                    <a:effectLst>
-                      <a:outerShdw blurRad="38100" dist="19050" dir="2700000" algn="tl" rotWithShape="0">
-                        <a:schemeClr val="dk1">
-                          <a:alpha val="40000"/>
-                        </a:schemeClr>
-                      </a:outerShdw>
-                    </a:effectLst>
-                    <a:latin typeface="Times New Roman" panose="02020603050405020304" pitchFamily="18" charset="0"/>
-                    <a:cs typeface="Times New Roman" panose="02020603050405020304" pitchFamily="18" charset="0"/>
-                  </a:rPr>
-                  <a:t>FFT</a:t>
-                </a:r>
-                <a:endParaRPr lang="en-US" dirty="0">
+            </a:ln>
+          </p:spPr>
+          <p:style>
+            <a:lnRef idx="2">
+              <a:schemeClr val="accent1">
+                <a:shade val="50000"/>
+              </a:schemeClr>
+            </a:lnRef>
+            <a:fillRef idx="1">
+              <a:schemeClr val="accent1"/>
+            </a:fillRef>
+            <a:effectRef idx="0">
+              <a:schemeClr val="accent1"/>
+            </a:effectRef>
+            <a:fontRef idx="minor">
+              <a:schemeClr val="lt1"/>
+            </a:fontRef>
+          </p:style>
+          <p:txBody>
+            <a:bodyPr rtlCol="0" anchor="ctr"/>
+            <a:lstStyle/>
+            <a:p>
+              <a:pPr algn="ctr"/>
+              <a:r>
+                <a:rPr lang="en-US" dirty="0" smtClean="0">
+                  <a:ln w="0"/>
+                  <a:solidFill>
+                    <a:schemeClr val="tx1"/>
+                  </a:solidFill>
+                  <a:effectLst>
+                    <a:outerShdw blurRad="38100" dist="19050" dir="2700000" algn="tl" rotWithShape="0">
+                      <a:schemeClr val="dk1">
+                        <a:alpha val="40000"/>
+                      </a:schemeClr>
+                    </a:outerShdw>
+                  </a:effectLst>
                   <a:latin typeface="Times New Roman" panose="02020603050405020304" pitchFamily="18" charset="0"/>
                   <a:cs typeface="Times New Roman" panose="02020603050405020304" pitchFamily="18" charset="0"/>
-                </a:endParaRPr>
-              </a:p>
-            </p:txBody>
-          </p:sp>
-          <p:sp>
-            <p:nvSpPr>
-              <p:cNvPr id="70" name="Rectangle 69"/>
-              <p:cNvSpPr/>
-              <p:nvPr/>
-            </p:nvSpPr>
-            <p:spPr>
-              <a:xfrm>
-                <a:off x="2325007" y="2133600"/>
-                <a:ext cx="1143000" cy="1143000"/>
-              </a:xfrm>
-              <a:prstGeom prst="rect">
-                <a:avLst/>
-              </a:prstGeom>
+                </a:rPr>
+                <a:t>FFT</a:t>
+              </a:r>
+              <a:endParaRPr lang="en-US" dirty="0">
+                <a:latin typeface="Times New Roman" panose="02020603050405020304" pitchFamily="18" charset="0"/>
+                <a:cs typeface="Times New Roman" panose="02020603050405020304" pitchFamily="18" charset="0"/>
+              </a:endParaRPr>
+            </a:p>
+          </p:txBody>
+        </p:sp>
+        <p:sp>
+          <p:nvSpPr>
+            <p:cNvPr id="70" name="Rectangle 69"/>
+            <p:cNvSpPr/>
+            <p:nvPr/>
+          </p:nvSpPr>
+          <p:spPr>
+            <a:xfrm>
+              <a:off x="2325007" y="2133600"/>
+              <a:ext cx="1143000" cy="1143000"/>
+            </a:xfrm>
+            <a:prstGeom prst="rect">
+              <a:avLst/>
+            </a:prstGeom>
+            <a:solidFill>
+              <a:schemeClr val="bg1">
+                <a:lumMod val="95000"/>
+              </a:schemeClr>
+            </a:solidFill>
+            <a:ln w="12700">
               <a:solidFill>
-                <a:schemeClr val="bg1">
-                  <a:lumMod val="95000"/>
-                </a:schemeClr>
+                <a:schemeClr val="tx1"/>
               </a:solidFill>
-              <a:ln w="12700">
-                <a:solidFill>
-                  <a:schemeClr val="tx1"/>
-                </a:solidFill>
-              </a:ln>
-            </p:spPr>
-            <p:style>
-              <a:lnRef idx="2">
-                <a:schemeClr val="accent1">
-                  <a:shade val="50000"/>
-                </a:schemeClr>
-              </a:lnRef>
-              <a:fillRef idx="1">
-                <a:schemeClr val="accent1"/>
-              </a:fillRef>
-              <a:effectRef idx="0">
-                <a:schemeClr val="accent1"/>
-              </a:effectRef>
-              <a:fontRef idx="minor">
-                <a:schemeClr val="lt1"/>
-              </a:fontRef>
-            </p:style>
-            <p:txBody>
-              <a:bodyPr rtlCol="0" anchor="ctr"/>
-              <a:lstStyle/>
-              <a:p>
-                <a:pPr algn="ctr"/>
-                <a:r>
-                  <a:rPr lang="en-US" dirty="0" smtClean="0">
-                    <a:ln w="0"/>
-                    <a:solidFill>
-                      <a:schemeClr val="tx1"/>
-                    </a:solidFill>
-                    <a:effectLst>
-                      <a:outerShdw blurRad="38100" dist="19050" dir="2700000" algn="tl" rotWithShape="0">
-                        <a:schemeClr val="dk1">
-                          <a:alpha val="40000"/>
-                        </a:schemeClr>
-                      </a:outerShdw>
-                    </a:effectLst>
-                    <a:latin typeface="Times New Roman" panose="02020603050405020304" pitchFamily="18" charset="0"/>
-                    <a:cs typeface="Times New Roman" panose="02020603050405020304" pitchFamily="18" charset="0"/>
-                  </a:rPr>
-                  <a:t>FFT</a:t>
-                </a:r>
-                <a:endParaRPr lang="en-US" dirty="0">
+            </a:ln>
+          </p:spPr>
+          <p:style>
+            <a:lnRef idx="2">
+              <a:schemeClr val="accent1">
+                <a:shade val="50000"/>
+              </a:schemeClr>
+            </a:lnRef>
+            <a:fillRef idx="1">
+              <a:schemeClr val="accent1"/>
+            </a:fillRef>
+            <a:effectRef idx="0">
+              <a:schemeClr val="accent1"/>
+            </a:effectRef>
+            <a:fontRef idx="minor">
+              <a:schemeClr val="lt1"/>
+            </a:fontRef>
+          </p:style>
+          <p:txBody>
+            <a:bodyPr rtlCol="0" anchor="ctr"/>
+            <a:lstStyle/>
+            <a:p>
+              <a:pPr algn="ctr"/>
+              <a:r>
+                <a:rPr lang="en-US" dirty="0" smtClean="0">
+                  <a:ln w="0"/>
+                  <a:solidFill>
+                    <a:schemeClr val="tx1"/>
+                  </a:solidFill>
+                  <a:effectLst>
+                    <a:outerShdw blurRad="38100" dist="19050" dir="2700000" algn="tl" rotWithShape="0">
+                      <a:schemeClr val="dk1">
+                        <a:alpha val="40000"/>
+                      </a:schemeClr>
+                    </a:outerShdw>
+                  </a:effectLst>
                   <a:latin typeface="Times New Roman" panose="02020603050405020304" pitchFamily="18" charset="0"/>
                   <a:cs typeface="Times New Roman" panose="02020603050405020304" pitchFamily="18" charset="0"/>
-                </a:endParaRPr>
-              </a:p>
-            </p:txBody>
-          </p:sp>
-          <p:pic>
-            <p:nvPicPr>
-              <p:cNvPr id="54" name="Picture 53"/>
-              <p:cNvPicPr>
-                <a:picLocks noChangeAspect="1"/>
-              </p:cNvPicPr>
-              <p:nvPr>
-                <p:custDataLst>
-                  <p:tags r:id="rId4"/>
-                </p:custDataLst>
-              </p:nvPr>
-            </p:nvPicPr>
-            <p:blipFill>
-              <a:blip r:embed="rId8" cstate="print">
-                <a:extLst>
-                  <a:ext uri="{28A0092B-C50C-407E-A947-70E740481C1C}">
-                    <a14:useLocalDpi xmlns:a14="http://schemas.microsoft.com/office/drawing/2010/main" val="0"/>
-                  </a:ext>
-                </a:extLst>
-              </a:blip>
-              <a:stretch>
-                <a:fillRect/>
-              </a:stretch>
-            </p:blipFill>
-            <p:spPr>
-              <a:xfrm>
-                <a:off x="1398601" y="2618242"/>
-                <a:ext cx="146286" cy="173715"/>
-              </a:xfrm>
-              <a:prstGeom prst="rect">
-                <a:avLst/>
-              </a:prstGeom>
-            </p:spPr>
-          </p:pic>
-          <p:pic>
-            <p:nvPicPr>
-              <p:cNvPr id="72" name="Picture 71"/>
-              <p:cNvPicPr>
-                <a:picLocks noChangeAspect="1"/>
-              </p:cNvPicPr>
-              <p:nvPr>
-                <p:custDataLst>
-                  <p:tags r:id="rId5"/>
-                </p:custDataLst>
-              </p:nvPr>
-            </p:nvPicPr>
-            <p:blipFill>
-              <a:blip r:embed="rId9" cstate="print">
-                <a:extLst>
-                  <a:ext uri="{28A0092B-C50C-407E-A947-70E740481C1C}">
-                    <a14:useLocalDpi xmlns:a14="http://schemas.microsoft.com/office/drawing/2010/main" val="0"/>
-                  </a:ext>
-                </a:extLst>
-              </a:blip>
-              <a:stretch>
-                <a:fillRect/>
-              </a:stretch>
-            </p:blipFill>
-            <p:spPr>
-              <a:xfrm>
-                <a:off x="1398601" y="208795"/>
-                <a:ext cx="144762" cy="111238"/>
-              </a:xfrm>
-              <a:prstGeom prst="rect">
-                <a:avLst/>
-              </a:prstGeom>
-            </p:spPr>
-          </p:pic>
-          <p:cxnSp>
-            <p:nvCxnSpPr>
-              <p:cNvPr id="74" name="Straight Arrow Connector 73"/>
-              <p:cNvCxnSpPr/>
-              <p:nvPr/>
-            </p:nvCxnSpPr>
-            <p:spPr>
-              <a:xfrm>
-                <a:off x="1639207" y="266700"/>
-                <a:ext cx="684323" cy="0"/>
-              </a:xfrm>
-              <a:prstGeom prst="straightConnector1">
-                <a:avLst/>
-              </a:prstGeom>
-              <a:ln w="12700">
-                <a:solidFill>
-                  <a:schemeClr val="tx1"/>
-                </a:solidFill>
-                <a:tailEnd type="triangle"/>
-              </a:ln>
-            </p:spPr>
-            <p:style>
-              <a:lnRef idx="1">
-                <a:schemeClr val="accent1"/>
-              </a:lnRef>
-              <a:fillRef idx="0">
-                <a:schemeClr val="accent1"/>
-              </a:fillRef>
-              <a:effectRef idx="0">
-                <a:schemeClr val="accent1"/>
-              </a:effectRef>
-              <a:fontRef idx="minor">
+                </a:rPr>
+                <a:t>FFT</a:t>
+              </a:r>
+              <a:endParaRPr lang="en-US" dirty="0">
+                <a:latin typeface="Times New Roman" panose="02020603050405020304" pitchFamily="18" charset="0"/>
+                <a:cs typeface="Times New Roman" panose="02020603050405020304" pitchFamily="18" charset="0"/>
+              </a:endParaRPr>
+            </a:p>
+          </p:txBody>
+        </p:sp>
+        <p:pic>
+          <p:nvPicPr>
+            <p:cNvPr id="54" name="Picture 53"/>
+            <p:cNvPicPr>
+              <a:picLocks noChangeAspect="1"/>
+            </p:cNvPicPr>
+            <p:nvPr>
+              <p:custDataLst>
+                <p:tags r:id="rId4"/>
+              </p:custDataLst>
+            </p:nvPr>
+          </p:nvPicPr>
+          <p:blipFill>
+            <a:blip r:embed="rId8" cstate="print">
+              <a:extLst>
+                <a:ext uri="{28A0092B-C50C-407E-A947-70E740481C1C}">
+                  <a14:useLocalDpi xmlns:a14="http://schemas.microsoft.com/office/drawing/2010/main" val="0"/>
+                </a:ext>
+              </a:extLst>
+            </a:blip>
+            <a:stretch>
+              <a:fillRect/>
+            </a:stretch>
+          </p:blipFill>
+          <p:spPr>
+            <a:xfrm>
+              <a:off x="1398601" y="2618242"/>
+              <a:ext cx="146286" cy="173715"/>
+            </a:xfrm>
+            <a:prstGeom prst="rect">
+              <a:avLst/>
+            </a:prstGeom>
+          </p:spPr>
+        </p:pic>
+        <p:pic>
+          <p:nvPicPr>
+            <p:cNvPr id="72" name="Picture 71"/>
+            <p:cNvPicPr>
+              <a:picLocks noChangeAspect="1"/>
+            </p:cNvPicPr>
+            <p:nvPr>
+              <p:custDataLst>
+                <p:tags r:id="rId5"/>
+              </p:custDataLst>
+            </p:nvPr>
+          </p:nvPicPr>
+          <p:blipFill>
+            <a:blip r:embed="rId9" cstate="print">
+              <a:extLst>
+                <a:ext uri="{28A0092B-C50C-407E-A947-70E740481C1C}">
+                  <a14:useLocalDpi xmlns:a14="http://schemas.microsoft.com/office/drawing/2010/main" val="0"/>
+                </a:ext>
+              </a:extLst>
+            </a:blip>
+            <a:stretch>
+              <a:fillRect/>
+            </a:stretch>
+          </p:blipFill>
+          <p:spPr>
+            <a:xfrm>
+              <a:off x="1398601" y="208795"/>
+              <a:ext cx="144762" cy="111238"/>
+            </a:xfrm>
+            <a:prstGeom prst="rect">
+              <a:avLst/>
+            </a:prstGeom>
+          </p:spPr>
+        </p:pic>
+        <p:cxnSp>
+          <p:nvCxnSpPr>
+            <p:cNvPr id="74" name="Straight Arrow Connector 73"/>
+            <p:cNvCxnSpPr/>
+            <p:nvPr/>
+          </p:nvCxnSpPr>
+          <p:spPr>
+            <a:xfrm>
+              <a:off x="1639207" y="266700"/>
+              <a:ext cx="684323" cy="0"/>
+            </a:xfrm>
+            <a:prstGeom prst="straightConnector1">
+              <a:avLst/>
+            </a:prstGeom>
+            <a:ln w="12700">
+              <a:solidFill>
                 <a:schemeClr val="tx1"/>
-              </a:fontRef>
-            </p:style>
-          </p:cxnSp>
-          <p:cxnSp>
-            <p:nvCxnSpPr>
-              <p:cNvPr id="79" name="Straight Arrow Connector 78"/>
-              <p:cNvCxnSpPr/>
-              <p:nvPr/>
-            </p:nvCxnSpPr>
-            <p:spPr>
-              <a:xfrm>
-                <a:off x="1639207" y="2705100"/>
-                <a:ext cx="684323" cy="0"/>
-              </a:xfrm>
-              <a:prstGeom prst="straightConnector1">
-                <a:avLst/>
-              </a:prstGeom>
-              <a:ln w="12700">
-                <a:solidFill>
-                  <a:schemeClr val="tx1"/>
-                </a:solidFill>
-                <a:tailEnd type="triangle"/>
-              </a:ln>
-            </p:spPr>
-            <p:style>
-              <a:lnRef idx="1">
-                <a:schemeClr val="accent1"/>
-              </a:lnRef>
-              <a:fillRef idx="0">
-                <a:schemeClr val="accent1"/>
-              </a:fillRef>
-              <a:effectRef idx="0">
-                <a:schemeClr val="accent1"/>
-              </a:effectRef>
-              <a:fontRef idx="minor">
+              </a:solidFill>
+              <a:tailEnd type="triangle"/>
+            </a:ln>
+          </p:spPr>
+          <p:style>
+            <a:lnRef idx="1">
+              <a:schemeClr val="accent1"/>
+            </a:lnRef>
+            <a:fillRef idx="0">
+              <a:schemeClr val="accent1"/>
+            </a:fillRef>
+            <a:effectRef idx="0">
+              <a:schemeClr val="accent1"/>
+            </a:effectRef>
+            <a:fontRef idx="minor">
+              <a:schemeClr val="tx1"/>
+            </a:fontRef>
+          </p:style>
+        </p:cxnSp>
+        <p:cxnSp>
+          <p:nvCxnSpPr>
+            <p:cNvPr id="79" name="Straight Arrow Connector 78"/>
+            <p:cNvCxnSpPr/>
+            <p:nvPr/>
+          </p:nvCxnSpPr>
+          <p:spPr>
+            <a:xfrm>
+              <a:off x="1639207" y="2705100"/>
+              <a:ext cx="684323" cy="0"/>
+            </a:xfrm>
+            <a:prstGeom prst="straightConnector1">
+              <a:avLst/>
+            </a:prstGeom>
+            <a:ln w="12700">
+              <a:solidFill>
                 <a:schemeClr val="tx1"/>
-              </a:fontRef>
-            </p:style>
-          </p:cxnSp>
-          <p:cxnSp>
-            <p:nvCxnSpPr>
-              <p:cNvPr id="80" name="Elbow Connector 79"/>
-              <p:cNvCxnSpPr>
-                <a:stCxn id="69" idx="3"/>
-                <a:endCxn id="82" idx="0"/>
-              </p:cNvCxnSpPr>
-              <p:nvPr/>
-            </p:nvCxnSpPr>
-            <p:spPr>
-              <a:xfrm>
-                <a:off x="3468007" y="266700"/>
-                <a:ext cx="1485898" cy="650301"/>
-              </a:xfrm>
-              <a:prstGeom prst="bentConnector2">
-                <a:avLst/>
-              </a:prstGeom>
-              <a:ln w="12700">
-                <a:solidFill>
-                  <a:schemeClr val="tx1"/>
-                </a:solidFill>
-                <a:tailEnd type="triangle"/>
-              </a:ln>
-            </p:spPr>
-            <p:style>
-              <a:lnRef idx="1">
-                <a:schemeClr val="accent1"/>
-              </a:lnRef>
-              <a:fillRef idx="0">
-                <a:schemeClr val="accent1"/>
-              </a:fillRef>
-              <a:effectRef idx="0">
-                <a:schemeClr val="accent1"/>
-              </a:effectRef>
-              <a:fontRef idx="minor">
+              </a:solidFill>
+              <a:tailEnd type="triangle"/>
+            </a:ln>
+          </p:spPr>
+          <p:style>
+            <a:lnRef idx="1">
+              <a:schemeClr val="accent1"/>
+            </a:lnRef>
+            <a:fillRef idx="0">
+              <a:schemeClr val="accent1"/>
+            </a:fillRef>
+            <a:effectRef idx="0">
+              <a:schemeClr val="accent1"/>
+            </a:effectRef>
+            <a:fontRef idx="minor">
+              <a:schemeClr val="tx1"/>
+            </a:fontRef>
+          </p:style>
+        </p:cxnSp>
+        <p:cxnSp>
+          <p:nvCxnSpPr>
+            <p:cNvPr id="80" name="Elbow Connector 79"/>
+            <p:cNvCxnSpPr>
+              <a:stCxn id="69" idx="3"/>
+              <a:endCxn id="82" idx="0"/>
+            </p:cNvCxnSpPr>
+            <p:nvPr/>
+          </p:nvCxnSpPr>
+          <p:spPr>
+            <a:xfrm>
+              <a:off x="3468007" y="266700"/>
+              <a:ext cx="1485898" cy="650301"/>
+            </a:xfrm>
+            <a:prstGeom prst="bentConnector2">
+              <a:avLst/>
+            </a:prstGeom>
+            <a:ln w="12700">
+              <a:solidFill>
                 <a:schemeClr val="tx1"/>
-              </a:fontRef>
-            </p:style>
-          </p:cxnSp>
-          <p:cxnSp>
-            <p:nvCxnSpPr>
-              <p:cNvPr id="81" name="Elbow Connector 80"/>
-              <p:cNvCxnSpPr>
-                <a:stCxn id="70" idx="3"/>
-                <a:endCxn id="82" idx="2"/>
-              </p:cNvCxnSpPr>
-              <p:nvPr/>
-            </p:nvCxnSpPr>
-            <p:spPr>
-              <a:xfrm flipV="1">
-                <a:off x="3468007" y="2060001"/>
-                <a:ext cx="1485898" cy="645099"/>
-              </a:xfrm>
-              <a:prstGeom prst="bentConnector2">
-                <a:avLst/>
-              </a:prstGeom>
-              <a:ln w="12700">
-                <a:solidFill>
-                  <a:schemeClr val="tx1"/>
-                </a:solidFill>
-                <a:tailEnd type="triangle"/>
-              </a:ln>
-            </p:spPr>
-            <p:style>
-              <a:lnRef idx="1">
-                <a:schemeClr val="accent1"/>
-              </a:lnRef>
-              <a:fillRef idx="0">
-                <a:schemeClr val="accent1"/>
-              </a:fillRef>
-              <a:effectRef idx="0">
-                <a:schemeClr val="accent1"/>
-              </a:effectRef>
-              <a:fontRef idx="minor">
+              </a:solidFill>
+              <a:tailEnd type="triangle"/>
+            </a:ln>
+          </p:spPr>
+          <p:style>
+            <a:lnRef idx="1">
+              <a:schemeClr val="accent1"/>
+            </a:lnRef>
+            <a:fillRef idx="0">
+              <a:schemeClr val="accent1"/>
+            </a:fillRef>
+            <a:effectRef idx="0">
+              <a:schemeClr val="accent1"/>
+            </a:effectRef>
+            <a:fontRef idx="minor">
+              <a:schemeClr val="tx1"/>
+            </a:fontRef>
+          </p:style>
+        </p:cxnSp>
+        <p:cxnSp>
+          <p:nvCxnSpPr>
+            <p:cNvPr id="81" name="Elbow Connector 80"/>
+            <p:cNvCxnSpPr>
+              <a:stCxn id="70" idx="3"/>
+              <a:endCxn id="82" idx="2"/>
+            </p:cNvCxnSpPr>
+            <p:nvPr/>
+          </p:nvCxnSpPr>
+          <p:spPr>
+            <a:xfrm flipV="1">
+              <a:off x="3468007" y="2060001"/>
+              <a:ext cx="1485898" cy="645099"/>
+            </a:xfrm>
+            <a:prstGeom prst="bentConnector2">
+              <a:avLst/>
+            </a:prstGeom>
+            <a:ln w="12700">
+              <a:solidFill>
                 <a:schemeClr val="tx1"/>
-              </a:fontRef>
-            </p:style>
-          </p:cxnSp>
-          <p:sp>
-            <p:nvSpPr>
-              <p:cNvPr id="82" name="Rectangle 81"/>
-              <p:cNvSpPr/>
-              <p:nvPr/>
-            </p:nvSpPr>
-            <p:spPr>
-              <a:xfrm>
-                <a:off x="4153805" y="917001"/>
-                <a:ext cx="1600200" cy="1143000"/>
-              </a:xfrm>
-              <a:prstGeom prst="rect">
-                <a:avLst/>
-              </a:prstGeom>
+              </a:solidFill>
+              <a:tailEnd type="triangle"/>
+            </a:ln>
+          </p:spPr>
+          <p:style>
+            <a:lnRef idx="1">
+              <a:schemeClr val="accent1"/>
+            </a:lnRef>
+            <a:fillRef idx="0">
+              <a:schemeClr val="accent1"/>
+            </a:fillRef>
+            <a:effectRef idx="0">
+              <a:schemeClr val="accent1"/>
+            </a:effectRef>
+            <a:fontRef idx="minor">
+              <a:schemeClr val="tx1"/>
+            </a:fontRef>
+          </p:style>
+        </p:cxnSp>
+        <p:sp>
+          <p:nvSpPr>
+            <p:cNvPr id="82" name="Rectangle 81"/>
+            <p:cNvSpPr/>
+            <p:nvPr/>
+          </p:nvSpPr>
+          <p:spPr>
+            <a:xfrm>
+              <a:off x="4153805" y="917001"/>
+              <a:ext cx="1600200" cy="1143000"/>
+            </a:xfrm>
+            <a:prstGeom prst="rect">
+              <a:avLst/>
+            </a:prstGeom>
+            <a:solidFill>
+              <a:schemeClr val="bg1">
+                <a:lumMod val="95000"/>
+              </a:schemeClr>
+            </a:solidFill>
+            <a:ln w="12700">
               <a:solidFill>
-                <a:schemeClr val="bg1">
-                  <a:lumMod val="95000"/>
-                </a:schemeClr>
+                <a:schemeClr val="tx1"/>
               </a:solidFill>
-              <a:ln w="12700">
-                <a:solidFill>
-                  <a:schemeClr val="tx1"/>
-                </a:solidFill>
-              </a:ln>
-            </p:spPr>
-            <p:style>
-              <a:lnRef idx="2">
-                <a:schemeClr val="accent1">
-                  <a:shade val="50000"/>
-                </a:schemeClr>
-              </a:lnRef>
-              <a:fillRef idx="1">
-                <a:schemeClr val="accent1"/>
-              </a:fillRef>
-              <a:effectRef idx="0">
-                <a:schemeClr val="accent1"/>
-              </a:effectRef>
-              <a:fontRef idx="minor">
-                <a:schemeClr val="lt1"/>
-              </a:fontRef>
-            </p:style>
-            <p:txBody>
-              <a:bodyPr rtlCol="0" anchor="ctr"/>
-              <a:lstStyle/>
-              <a:p>
-                <a:pPr algn="ctr"/>
-                <a:r>
-                  <a:rPr lang="en-US" dirty="0">
-                    <a:ln w="0"/>
-                    <a:solidFill>
-                      <a:schemeClr val="tx1"/>
-                    </a:solidFill>
-                    <a:effectLst>
-                      <a:outerShdw blurRad="38100" dist="19050" dir="2700000" algn="tl" rotWithShape="0">
-                        <a:schemeClr val="dk1">
-                          <a:alpha val="40000"/>
-                        </a:schemeClr>
-                      </a:outerShdw>
-                    </a:effectLst>
-                    <a:latin typeface="Times New Roman" panose="02020603050405020304" pitchFamily="18" charset="0"/>
-                    <a:cs typeface="Times New Roman" panose="02020603050405020304" pitchFamily="18" charset="0"/>
-                  </a:rPr>
-                  <a:t>Complex</a:t>
-                </a:r>
-              </a:p>
-              <a:p>
-                <a:pPr algn="ctr"/>
-                <a:r>
-                  <a:rPr lang="en-US" dirty="0">
-                    <a:ln w="0"/>
-                    <a:solidFill>
-                      <a:schemeClr val="tx1"/>
-                    </a:solidFill>
-                    <a:effectLst>
-                      <a:outerShdw blurRad="38100" dist="19050" dir="2700000" algn="tl" rotWithShape="0">
-                        <a:schemeClr val="dk1">
-                          <a:alpha val="40000"/>
-                        </a:schemeClr>
-                      </a:outerShdw>
-                    </a:effectLst>
-                    <a:latin typeface="Times New Roman" panose="02020603050405020304" pitchFamily="18" charset="0"/>
-                    <a:cs typeface="Times New Roman" panose="02020603050405020304" pitchFamily="18" charset="0"/>
-                  </a:rPr>
-                  <a:t>Multiplication</a:t>
-                </a:r>
-                <a:endParaRPr lang="en-US" dirty="0">
+            </a:ln>
+          </p:spPr>
+          <p:style>
+            <a:lnRef idx="2">
+              <a:schemeClr val="accent1">
+                <a:shade val="50000"/>
+              </a:schemeClr>
+            </a:lnRef>
+            <a:fillRef idx="1">
+              <a:schemeClr val="accent1"/>
+            </a:fillRef>
+            <a:effectRef idx="0">
+              <a:schemeClr val="accent1"/>
+            </a:effectRef>
+            <a:fontRef idx="minor">
+              <a:schemeClr val="lt1"/>
+            </a:fontRef>
+          </p:style>
+          <p:txBody>
+            <a:bodyPr rtlCol="0" anchor="ctr"/>
+            <a:lstStyle/>
+            <a:p>
+              <a:pPr algn="ctr"/>
+              <a:r>
+                <a:rPr lang="en-US" dirty="0">
+                  <a:ln w="0"/>
+                  <a:solidFill>
+                    <a:schemeClr val="tx1"/>
+                  </a:solidFill>
+                  <a:effectLst>
+                    <a:outerShdw blurRad="38100" dist="19050" dir="2700000" algn="tl" rotWithShape="0">
+                      <a:schemeClr val="dk1">
+                        <a:alpha val="40000"/>
+                      </a:schemeClr>
+                    </a:outerShdw>
+                  </a:effectLst>
                   <a:latin typeface="Times New Roman" panose="02020603050405020304" pitchFamily="18" charset="0"/>
                   <a:cs typeface="Times New Roman" panose="02020603050405020304" pitchFamily="18" charset="0"/>
-                </a:endParaRPr>
-              </a:p>
-            </p:txBody>
-          </p:sp>
-          <p:sp>
-            <p:nvSpPr>
-              <p:cNvPr id="89" name="Rectangle 88"/>
-              <p:cNvSpPr/>
-              <p:nvPr/>
-            </p:nvSpPr>
-            <p:spPr>
-              <a:xfrm>
-                <a:off x="6442184" y="917001"/>
-                <a:ext cx="1143000" cy="1143000"/>
-              </a:xfrm>
-              <a:prstGeom prst="rect">
-                <a:avLst/>
-              </a:prstGeom>
-              <a:solidFill>
-                <a:schemeClr val="bg1">
-                  <a:lumMod val="95000"/>
-                </a:schemeClr>
-              </a:solidFill>
-              <a:ln w="12700">
-                <a:solidFill>
-                  <a:schemeClr val="tx1"/>
-                </a:solidFill>
-              </a:ln>
-            </p:spPr>
-            <p:style>
-              <a:lnRef idx="2">
-                <a:schemeClr val="accent1">
-                  <a:shade val="50000"/>
-                </a:schemeClr>
-              </a:lnRef>
-              <a:fillRef idx="1">
-                <a:schemeClr val="accent1"/>
-              </a:fillRef>
-              <a:effectRef idx="0">
-                <a:schemeClr val="accent1"/>
-              </a:effectRef>
-              <a:fontRef idx="minor">
-                <a:schemeClr val="lt1"/>
-              </a:fontRef>
-            </p:style>
-            <p:txBody>
-              <a:bodyPr rtlCol="0" anchor="ctr"/>
-              <a:lstStyle/>
-              <a:p>
-                <a:pPr algn="ctr"/>
-                <a:r>
-                  <a:rPr lang="en-US" dirty="0" smtClean="0">
-                    <a:ln w="0"/>
-                    <a:solidFill>
-                      <a:schemeClr val="tx1"/>
-                    </a:solidFill>
-                    <a:effectLst>
-                      <a:outerShdw blurRad="38100" dist="19050" dir="2700000" algn="tl" rotWithShape="0">
-                        <a:schemeClr val="dk1">
-                          <a:alpha val="40000"/>
-                        </a:schemeClr>
-                      </a:outerShdw>
-                    </a:effectLst>
-                    <a:latin typeface="Times New Roman" panose="02020603050405020304" pitchFamily="18" charset="0"/>
-                    <a:cs typeface="Times New Roman" panose="02020603050405020304" pitchFamily="18" charset="0"/>
-                  </a:rPr>
-                  <a:t>IFFT</a:t>
-                </a:r>
-                <a:endParaRPr lang="en-US" dirty="0">
+                </a:rPr>
+                <a:t>Complex</a:t>
+              </a:r>
+            </a:p>
+            <a:p>
+              <a:pPr algn="ctr"/>
+              <a:r>
+                <a:rPr lang="en-US" dirty="0">
+                  <a:ln w="0"/>
+                  <a:solidFill>
+                    <a:schemeClr val="tx1"/>
+                  </a:solidFill>
+                  <a:effectLst>
+                    <a:outerShdw blurRad="38100" dist="19050" dir="2700000" algn="tl" rotWithShape="0">
+                      <a:schemeClr val="dk1">
+                        <a:alpha val="40000"/>
+                      </a:schemeClr>
+                    </a:outerShdw>
+                  </a:effectLst>
                   <a:latin typeface="Times New Roman" panose="02020603050405020304" pitchFamily="18" charset="0"/>
                   <a:cs typeface="Times New Roman" panose="02020603050405020304" pitchFamily="18" charset="0"/>
-                </a:endParaRPr>
-              </a:p>
-            </p:txBody>
-          </p:sp>
-          <p:cxnSp>
-            <p:nvCxnSpPr>
-              <p:cNvPr id="90" name="Straight Arrow Connector 89"/>
-              <p:cNvCxnSpPr>
-                <a:stCxn id="82" idx="3"/>
-                <a:endCxn id="89" idx="1"/>
-              </p:cNvCxnSpPr>
-              <p:nvPr/>
-            </p:nvCxnSpPr>
-            <p:spPr>
-              <a:xfrm>
-                <a:off x="5754005" y="1488501"/>
-                <a:ext cx="688179" cy="0"/>
-              </a:xfrm>
-              <a:prstGeom prst="straightConnector1">
-                <a:avLst/>
-              </a:prstGeom>
-              <a:ln w="12700">
-                <a:solidFill>
-                  <a:schemeClr val="tx1"/>
-                </a:solidFill>
-                <a:tailEnd type="triangle"/>
-              </a:ln>
-            </p:spPr>
-            <p:style>
-              <a:lnRef idx="1">
-                <a:schemeClr val="accent1"/>
-              </a:lnRef>
-              <a:fillRef idx="0">
-                <a:schemeClr val="accent1"/>
-              </a:fillRef>
-              <a:effectRef idx="0">
-                <a:schemeClr val="accent1"/>
-              </a:effectRef>
-              <a:fontRef idx="minor">
+                </a:rPr>
+                <a:t>Multiplication</a:t>
+              </a:r>
+              <a:endParaRPr lang="en-US" dirty="0">
+                <a:latin typeface="Times New Roman" panose="02020603050405020304" pitchFamily="18" charset="0"/>
+                <a:cs typeface="Times New Roman" panose="02020603050405020304" pitchFamily="18" charset="0"/>
+              </a:endParaRPr>
+            </a:p>
+          </p:txBody>
+        </p:sp>
+        <p:sp>
+          <p:nvSpPr>
+            <p:cNvPr id="89" name="Rectangle 88"/>
+            <p:cNvSpPr/>
+            <p:nvPr/>
+          </p:nvSpPr>
+          <p:spPr>
+            <a:xfrm>
+              <a:off x="6442184" y="917001"/>
+              <a:ext cx="1143000" cy="1143000"/>
+            </a:xfrm>
+            <a:prstGeom prst="rect">
+              <a:avLst/>
+            </a:prstGeom>
+            <a:solidFill>
+              <a:schemeClr val="bg1">
+                <a:lumMod val="95000"/>
+              </a:schemeClr>
+            </a:solidFill>
+            <a:ln w="12700">
+              <a:solidFill>
                 <a:schemeClr val="tx1"/>
-              </a:fontRef>
-            </p:style>
-          </p:cxnSp>
-          <p:sp>
-            <p:nvSpPr>
-              <p:cNvPr id="94" name="Rectangle 93"/>
-              <p:cNvSpPr/>
-              <p:nvPr/>
-            </p:nvSpPr>
-            <p:spPr>
-              <a:xfrm>
-                <a:off x="8273363" y="916134"/>
-                <a:ext cx="1600200" cy="1143000"/>
-              </a:xfrm>
-              <a:prstGeom prst="rect">
-                <a:avLst/>
-              </a:prstGeom>
-              <a:solidFill>
-                <a:schemeClr val="bg1">
-                  <a:lumMod val="95000"/>
-                </a:schemeClr>
               </a:solidFill>
-              <a:ln w="12700">
-                <a:solidFill>
-                  <a:schemeClr val="tx1"/>
-                </a:solidFill>
-              </a:ln>
-            </p:spPr>
-            <p:style>
-              <a:lnRef idx="2">
-                <a:schemeClr val="accent1">
-                  <a:shade val="50000"/>
-                </a:schemeClr>
-              </a:lnRef>
-              <a:fillRef idx="1">
-                <a:schemeClr val="accent1"/>
-              </a:fillRef>
-              <a:effectRef idx="0">
-                <a:schemeClr val="accent1"/>
-              </a:effectRef>
-              <a:fontRef idx="minor">
-                <a:schemeClr val="lt1"/>
-              </a:fontRef>
-            </p:style>
-            <p:txBody>
-              <a:bodyPr rtlCol="0" anchor="ctr"/>
-              <a:lstStyle/>
-              <a:p>
-                <a:pPr algn="ctr"/>
-                <a:r>
-                  <a:rPr lang="en-US" dirty="0">
-                    <a:ln w="0"/>
-                    <a:solidFill>
-                      <a:schemeClr val="tx1"/>
-                    </a:solidFill>
-                    <a:effectLst>
-                      <a:outerShdw blurRad="38100" dist="19050" dir="2700000" algn="tl" rotWithShape="0">
-                        <a:schemeClr val="dk1">
-                          <a:alpha val="40000"/>
-                        </a:schemeClr>
-                      </a:outerShdw>
-                    </a:effectLst>
-                    <a:latin typeface="Times New Roman" panose="02020603050405020304" pitchFamily="18" charset="0"/>
-                    <a:cs typeface="Times New Roman" panose="02020603050405020304" pitchFamily="18" charset="0"/>
-                  </a:rPr>
-                  <a:t>Scalar Multiplication</a:t>
-                </a:r>
-                <a:endParaRPr lang="en-US" dirty="0">
+            </a:ln>
+          </p:spPr>
+          <p:style>
+            <a:lnRef idx="2">
+              <a:schemeClr val="accent1">
+                <a:shade val="50000"/>
+              </a:schemeClr>
+            </a:lnRef>
+            <a:fillRef idx="1">
+              <a:schemeClr val="accent1"/>
+            </a:fillRef>
+            <a:effectRef idx="0">
+              <a:schemeClr val="accent1"/>
+            </a:effectRef>
+            <a:fontRef idx="minor">
+              <a:schemeClr val="lt1"/>
+            </a:fontRef>
+          </p:style>
+          <p:txBody>
+            <a:bodyPr rtlCol="0" anchor="ctr"/>
+            <a:lstStyle/>
+            <a:p>
+              <a:pPr algn="ctr"/>
+              <a:r>
+                <a:rPr lang="en-US" dirty="0" smtClean="0">
+                  <a:ln w="0"/>
+                  <a:solidFill>
+                    <a:schemeClr val="tx1"/>
+                  </a:solidFill>
+                  <a:effectLst>
+                    <a:outerShdw blurRad="38100" dist="19050" dir="2700000" algn="tl" rotWithShape="0">
+                      <a:schemeClr val="dk1">
+                        <a:alpha val="40000"/>
+                      </a:schemeClr>
+                    </a:outerShdw>
+                  </a:effectLst>
                   <a:latin typeface="Times New Roman" panose="02020603050405020304" pitchFamily="18" charset="0"/>
                   <a:cs typeface="Times New Roman" panose="02020603050405020304" pitchFamily="18" charset="0"/>
-                </a:endParaRPr>
-              </a:p>
-            </p:txBody>
-          </p:sp>
-          <p:cxnSp>
-            <p:nvCxnSpPr>
-              <p:cNvPr id="96" name="Straight Arrow Connector 95"/>
-              <p:cNvCxnSpPr>
-                <a:stCxn id="89" idx="3"/>
-                <a:endCxn id="94" idx="1"/>
-              </p:cNvCxnSpPr>
-              <p:nvPr/>
-            </p:nvCxnSpPr>
-            <p:spPr>
-              <a:xfrm flipV="1">
-                <a:off x="7585184" y="1487634"/>
-                <a:ext cx="688179" cy="867"/>
-              </a:xfrm>
-              <a:prstGeom prst="straightConnector1">
-                <a:avLst/>
-              </a:prstGeom>
-              <a:ln w="12700">
-                <a:solidFill>
-                  <a:schemeClr val="tx1"/>
-                </a:solidFill>
-                <a:tailEnd type="triangle"/>
-              </a:ln>
-            </p:spPr>
-            <p:style>
-              <a:lnRef idx="1">
-                <a:schemeClr val="accent1"/>
-              </a:lnRef>
-              <a:fillRef idx="0">
-                <a:schemeClr val="accent1"/>
-              </a:fillRef>
-              <a:effectRef idx="0">
-                <a:schemeClr val="accent1"/>
-              </a:effectRef>
-              <a:fontRef idx="minor">
+                </a:rPr>
+                <a:t>IFFT</a:t>
+              </a:r>
+              <a:endParaRPr lang="en-US" dirty="0">
+                <a:latin typeface="Times New Roman" panose="02020603050405020304" pitchFamily="18" charset="0"/>
+                <a:cs typeface="Times New Roman" panose="02020603050405020304" pitchFamily="18" charset="0"/>
+              </a:endParaRPr>
+            </a:p>
+          </p:txBody>
+        </p:sp>
+        <p:cxnSp>
+          <p:nvCxnSpPr>
+            <p:cNvPr id="90" name="Straight Arrow Connector 89"/>
+            <p:cNvCxnSpPr>
+              <a:stCxn id="82" idx="3"/>
+              <a:endCxn id="89" idx="1"/>
+            </p:cNvCxnSpPr>
+            <p:nvPr/>
+          </p:nvCxnSpPr>
+          <p:spPr>
+            <a:xfrm>
+              <a:off x="5754005" y="1488501"/>
+              <a:ext cx="688179" cy="0"/>
+            </a:xfrm>
+            <a:prstGeom prst="straightConnector1">
+              <a:avLst/>
+            </a:prstGeom>
+            <a:ln w="12700">
+              <a:solidFill>
                 <a:schemeClr val="tx1"/>
-              </a:fontRef>
-            </p:style>
-          </p:cxnSp>
-          <p:cxnSp>
-            <p:nvCxnSpPr>
-              <p:cNvPr id="97" name="Straight Arrow Connector 96"/>
-              <p:cNvCxnSpPr/>
-              <p:nvPr/>
-            </p:nvCxnSpPr>
-            <p:spPr>
-              <a:xfrm flipV="1">
-                <a:off x="9873563" y="1487634"/>
-                <a:ext cx="688179" cy="867"/>
-              </a:xfrm>
-              <a:prstGeom prst="straightConnector1">
-                <a:avLst/>
-              </a:prstGeom>
-              <a:ln w="12700">
-                <a:solidFill>
-                  <a:schemeClr val="tx1"/>
-                </a:solidFill>
-                <a:tailEnd type="triangle"/>
-              </a:ln>
-            </p:spPr>
-            <p:style>
-              <a:lnRef idx="1">
-                <a:schemeClr val="accent1"/>
-              </a:lnRef>
-              <a:fillRef idx="0">
-                <a:schemeClr val="accent1"/>
-              </a:fillRef>
-              <a:effectRef idx="0">
-                <a:schemeClr val="accent1"/>
-              </a:effectRef>
-              <a:fontRef idx="minor">
+              </a:solidFill>
+              <a:tailEnd type="triangle"/>
+            </a:ln>
+          </p:spPr>
+          <p:style>
+            <a:lnRef idx="1">
+              <a:schemeClr val="accent1"/>
+            </a:lnRef>
+            <a:fillRef idx="0">
+              <a:schemeClr val="accent1"/>
+            </a:fillRef>
+            <a:effectRef idx="0">
+              <a:schemeClr val="accent1"/>
+            </a:effectRef>
+            <a:fontRef idx="minor">
+              <a:schemeClr val="tx1"/>
+            </a:fontRef>
+          </p:style>
+        </p:cxnSp>
+        <p:sp>
+          <p:nvSpPr>
+            <p:cNvPr id="94" name="Rectangle 93"/>
+            <p:cNvSpPr/>
+            <p:nvPr/>
+          </p:nvSpPr>
+          <p:spPr>
+            <a:xfrm>
+              <a:off x="8273363" y="916134"/>
+              <a:ext cx="1600200" cy="1143000"/>
+            </a:xfrm>
+            <a:prstGeom prst="rect">
+              <a:avLst/>
+            </a:prstGeom>
+            <a:solidFill>
+              <a:schemeClr val="bg1">
+                <a:lumMod val="95000"/>
+              </a:schemeClr>
+            </a:solidFill>
+            <a:ln w="12700">
+              <a:solidFill>
                 <a:schemeClr val="tx1"/>
-              </a:fontRef>
-            </p:style>
-          </p:cxnSp>
-          <p:pic>
-            <p:nvPicPr>
-              <p:cNvPr id="98" name="Picture 97"/>
-              <p:cNvPicPr>
-                <a:picLocks noChangeAspect="1"/>
-              </p:cNvPicPr>
-              <p:nvPr>
-                <p:custDataLst>
-                  <p:tags r:id="rId6"/>
-                </p:custDataLst>
-              </p:nvPr>
-            </p:nvPicPr>
-            <p:blipFill>
-              <a:blip r:embed="rId10" cstate="print">
-                <a:extLst>
-                  <a:ext uri="{28A0092B-C50C-407E-A947-70E740481C1C}">
-                    <a14:useLocalDpi xmlns:a14="http://schemas.microsoft.com/office/drawing/2010/main" val="0"/>
-                  </a:ext>
-                </a:extLst>
-              </a:blip>
-              <a:stretch>
-                <a:fillRect/>
-              </a:stretch>
-            </p:blipFill>
-            <p:spPr>
-              <a:xfrm>
-                <a:off x="10651685" y="1411425"/>
-                <a:ext cx="143238" cy="163048"/>
-              </a:xfrm>
-              <a:prstGeom prst="rect">
-                <a:avLst/>
-              </a:prstGeom>
-            </p:spPr>
-          </p:pic>
-        </p:grpSp>
-        <p:grpSp>
-          <p:nvGrpSpPr>
-            <p:cNvPr id="59" name="Group 58"/>
-            <p:cNvGrpSpPr/>
-            <p:nvPr/>
-          </p:nvGrpSpPr>
-          <p:grpSpPr>
-            <a:xfrm>
-              <a:off x="4490699" y="685800"/>
-              <a:ext cx="3420000" cy="2565376"/>
-              <a:chOff x="4490699" y="3581400"/>
-              <a:chExt cx="3420000" cy="2565376"/>
-            </a:xfrm>
-          </p:grpSpPr>
-          <p:sp>
-            <p:nvSpPr>
-              <p:cNvPr id="76" name="Rectangle 75"/>
-              <p:cNvSpPr/>
-              <p:nvPr/>
-            </p:nvSpPr>
-            <p:spPr>
-              <a:xfrm>
-                <a:off x="5394551" y="4289605"/>
-                <a:ext cx="1600200" cy="1143000"/>
-              </a:xfrm>
-              <a:prstGeom prst="rect">
-                <a:avLst/>
-              </a:prstGeom>
-              <a:solidFill>
-                <a:schemeClr val="bg1">
-                  <a:lumMod val="95000"/>
-                </a:schemeClr>
               </a:solidFill>
-              <a:ln w="12700">
-                <a:solidFill>
-                  <a:schemeClr val="tx1"/>
-                </a:solidFill>
-              </a:ln>
-            </p:spPr>
-            <p:style>
-              <a:lnRef idx="2">
-                <a:schemeClr val="accent1">
-                  <a:shade val="50000"/>
-                </a:schemeClr>
-              </a:lnRef>
-              <a:fillRef idx="1">
-                <a:schemeClr val="accent1"/>
-              </a:fillRef>
-              <a:effectRef idx="0">
-                <a:schemeClr val="accent1"/>
-              </a:effectRef>
-              <a:fontRef idx="minor">
-                <a:schemeClr val="lt1"/>
-              </a:fontRef>
-            </p:style>
-            <p:txBody>
-              <a:bodyPr rtlCol="0" anchor="ctr"/>
-              <a:lstStyle/>
-              <a:p>
-                <a:pPr algn="ctr"/>
-                <a:r>
-                  <a:rPr lang="en-US" dirty="0">
-                    <a:ln w="0"/>
-                    <a:solidFill>
-                      <a:schemeClr val="tx1"/>
-                    </a:solidFill>
-                    <a:effectLst>
-                      <a:outerShdw blurRad="38100" dist="19050" dir="2700000" algn="tl" rotWithShape="0">
-                        <a:schemeClr val="dk1">
-                          <a:alpha val="40000"/>
-                        </a:schemeClr>
-                      </a:outerShdw>
-                    </a:effectLst>
-                    <a:latin typeface="Times New Roman" panose="02020603050405020304" pitchFamily="18" charset="0"/>
-                    <a:cs typeface="Times New Roman" panose="02020603050405020304" pitchFamily="18" charset="0"/>
-                  </a:rPr>
-                  <a:t>Time-domain Convolution</a:t>
-                </a:r>
-                <a:endParaRPr lang="en-US" dirty="0">
+            </a:ln>
+          </p:spPr>
+          <p:style>
+            <a:lnRef idx="2">
+              <a:schemeClr val="accent1">
+                <a:shade val="50000"/>
+              </a:schemeClr>
+            </a:lnRef>
+            <a:fillRef idx="1">
+              <a:schemeClr val="accent1"/>
+            </a:fillRef>
+            <a:effectRef idx="0">
+              <a:schemeClr val="accent1"/>
+            </a:effectRef>
+            <a:fontRef idx="minor">
+              <a:schemeClr val="lt1"/>
+            </a:fontRef>
+          </p:style>
+          <p:txBody>
+            <a:bodyPr rtlCol="0" anchor="ctr"/>
+            <a:lstStyle/>
+            <a:p>
+              <a:pPr algn="ctr"/>
+              <a:r>
+                <a:rPr lang="en-US" dirty="0">
+                  <a:ln w="0"/>
+                  <a:solidFill>
+                    <a:schemeClr val="tx1"/>
+                  </a:solidFill>
+                  <a:effectLst>
+                    <a:outerShdw blurRad="38100" dist="19050" dir="2700000" algn="tl" rotWithShape="0">
+                      <a:schemeClr val="dk1">
+                        <a:alpha val="40000"/>
+                      </a:schemeClr>
+                    </a:outerShdw>
+                  </a:effectLst>
                   <a:latin typeface="Times New Roman" panose="02020603050405020304" pitchFamily="18" charset="0"/>
                   <a:cs typeface="Times New Roman" panose="02020603050405020304" pitchFamily="18" charset="0"/>
-                </a:endParaRPr>
-              </a:p>
-            </p:txBody>
-          </p:sp>
-          <p:pic>
-            <p:nvPicPr>
-              <p:cNvPr id="7" name="Picture 6"/>
-              <p:cNvPicPr>
-                <a:picLocks noChangeAspect="1"/>
-              </p:cNvPicPr>
-              <p:nvPr>
-                <p:custDataLst>
-                  <p:tags r:id="rId1"/>
-                </p:custDataLst>
-              </p:nvPr>
-            </p:nvPicPr>
-            <p:blipFill>
-              <a:blip r:embed="rId9" cstate="print">
-                <a:extLst>
-                  <a:ext uri="{28A0092B-C50C-407E-A947-70E740481C1C}">
-                    <a14:useLocalDpi xmlns:a14="http://schemas.microsoft.com/office/drawing/2010/main" val="0"/>
-                  </a:ext>
-                </a:extLst>
-              </a:blip>
-              <a:stretch>
-                <a:fillRect/>
-              </a:stretch>
-            </p:blipFill>
-            <p:spPr>
-              <a:xfrm>
-                <a:off x="4495800" y="3581400"/>
-                <a:ext cx="144762" cy="111238"/>
-              </a:xfrm>
-              <a:prstGeom prst="rect">
-                <a:avLst/>
-              </a:prstGeom>
-            </p:spPr>
-          </p:pic>
-          <p:cxnSp>
-            <p:nvCxnSpPr>
-              <p:cNvPr id="83" name="Elbow Connector 82"/>
-              <p:cNvCxnSpPr>
-                <a:endCxn id="76" idx="0"/>
-              </p:cNvCxnSpPr>
-              <p:nvPr/>
-            </p:nvCxnSpPr>
-            <p:spPr>
-              <a:xfrm>
-                <a:off x="4708721" y="3644530"/>
-                <a:ext cx="1485930" cy="645075"/>
-              </a:xfrm>
-              <a:prstGeom prst="bentConnector2">
-                <a:avLst/>
-              </a:prstGeom>
-              <a:ln w="12700">
-                <a:solidFill>
-                  <a:schemeClr val="tx1"/>
-                </a:solidFill>
-                <a:tailEnd type="triangle"/>
-              </a:ln>
-            </p:spPr>
-            <p:style>
-              <a:lnRef idx="1">
-                <a:schemeClr val="accent1"/>
-              </a:lnRef>
-              <a:fillRef idx="0">
-                <a:schemeClr val="accent1"/>
-              </a:fillRef>
-              <a:effectRef idx="0">
-                <a:schemeClr val="accent1"/>
-              </a:effectRef>
-              <a:fontRef idx="minor">
+                </a:rPr>
+                <a:t>Scalar Multiplication</a:t>
+              </a:r>
+              <a:endParaRPr lang="en-US" dirty="0">
+                <a:latin typeface="Times New Roman" panose="02020603050405020304" pitchFamily="18" charset="0"/>
+                <a:cs typeface="Times New Roman" panose="02020603050405020304" pitchFamily="18" charset="0"/>
+              </a:endParaRPr>
+            </a:p>
+          </p:txBody>
+        </p:sp>
+        <p:cxnSp>
+          <p:nvCxnSpPr>
+            <p:cNvPr id="96" name="Straight Arrow Connector 95"/>
+            <p:cNvCxnSpPr>
+              <a:stCxn id="89" idx="3"/>
+              <a:endCxn id="94" idx="1"/>
+            </p:cNvCxnSpPr>
+            <p:nvPr/>
+          </p:nvCxnSpPr>
+          <p:spPr>
+            <a:xfrm flipV="1">
+              <a:off x="7585184" y="1487634"/>
+              <a:ext cx="688179" cy="867"/>
+            </a:xfrm>
+            <a:prstGeom prst="straightConnector1">
+              <a:avLst/>
+            </a:prstGeom>
+            <a:ln w="12700">
+              <a:solidFill>
                 <a:schemeClr val="tx1"/>
-              </a:fontRef>
-            </p:style>
-          </p:cxnSp>
-          <p:cxnSp>
-            <p:nvCxnSpPr>
-              <p:cNvPr id="84" name="Elbow Connector 83"/>
-              <p:cNvCxnSpPr>
-                <a:endCxn id="76" idx="2"/>
-              </p:cNvCxnSpPr>
-              <p:nvPr/>
-            </p:nvCxnSpPr>
-            <p:spPr>
-              <a:xfrm flipV="1">
-                <a:off x="4708721" y="5432605"/>
-                <a:ext cx="1485930" cy="648753"/>
-              </a:xfrm>
-              <a:prstGeom prst="bentConnector2">
-                <a:avLst/>
-              </a:prstGeom>
-              <a:ln w="12700">
-                <a:solidFill>
-                  <a:schemeClr val="tx1"/>
-                </a:solidFill>
-                <a:tailEnd type="triangle"/>
-              </a:ln>
-            </p:spPr>
-            <p:style>
-              <a:lnRef idx="1">
-                <a:schemeClr val="accent1"/>
-              </a:lnRef>
-              <a:fillRef idx="0">
-                <a:schemeClr val="accent1"/>
-              </a:fillRef>
-              <a:effectRef idx="0">
-                <a:schemeClr val="accent1"/>
-              </a:effectRef>
-              <a:fontRef idx="minor">
+              </a:solidFill>
+              <a:tailEnd type="triangle"/>
+            </a:ln>
+          </p:spPr>
+          <p:style>
+            <a:lnRef idx="1">
+              <a:schemeClr val="accent1"/>
+            </a:lnRef>
+            <a:fillRef idx="0">
+              <a:schemeClr val="accent1"/>
+            </a:fillRef>
+            <a:effectRef idx="0">
+              <a:schemeClr val="accent1"/>
+            </a:effectRef>
+            <a:fontRef idx="minor">
+              <a:schemeClr val="tx1"/>
+            </a:fontRef>
+          </p:style>
+        </p:cxnSp>
+        <p:cxnSp>
+          <p:nvCxnSpPr>
+            <p:cNvPr id="97" name="Straight Arrow Connector 96"/>
+            <p:cNvCxnSpPr/>
+            <p:nvPr/>
+          </p:nvCxnSpPr>
+          <p:spPr>
+            <a:xfrm flipV="1">
+              <a:off x="9873563" y="1487634"/>
+              <a:ext cx="688179" cy="867"/>
+            </a:xfrm>
+            <a:prstGeom prst="straightConnector1">
+              <a:avLst/>
+            </a:prstGeom>
+            <a:ln w="12700">
+              <a:solidFill>
                 <a:schemeClr val="tx1"/>
-              </a:fontRef>
-            </p:style>
-          </p:cxnSp>
-          <p:cxnSp>
-            <p:nvCxnSpPr>
-              <p:cNvPr id="38" name="Straight Arrow Connector 37"/>
-              <p:cNvCxnSpPr/>
-              <p:nvPr/>
-            </p:nvCxnSpPr>
-            <p:spPr>
-              <a:xfrm flipV="1">
-                <a:off x="6994751" y="4860238"/>
-                <a:ext cx="688179" cy="867"/>
-              </a:xfrm>
-              <a:prstGeom prst="straightConnector1">
-                <a:avLst/>
-              </a:prstGeom>
-              <a:ln w="12700">
-                <a:solidFill>
-                  <a:schemeClr val="tx1"/>
-                </a:solidFill>
-                <a:tailEnd type="triangle"/>
-              </a:ln>
-            </p:spPr>
-            <p:style>
-              <a:lnRef idx="1">
-                <a:schemeClr val="accent1"/>
-              </a:lnRef>
-              <a:fillRef idx="0">
-                <a:schemeClr val="accent1"/>
-              </a:fillRef>
-              <a:effectRef idx="0">
-                <a:schemeClr val="accent1"/>
-              </a:effectRef>
-              <a:fontRef idx="minor">
+              </a:solidFill>
+              <a:tailEnd type="triangle"/>
+            </a:ln>
+          </p:spPr>
+          <p:style>
+            <a:lnRef idx="1">
+              <a:schemeClr val="accent1"/>
+            </a:lnRef>
+            <a:fillRef idx="0">
+              <a:schemeClr val="accent1"/>
+            </a:fillRef>
+            <a:effectRef idx="0">
+              <a:schemeClr val="accent1"/>
+            </a:effectRef>
+            <a:fontRef idx="minor">
+              <a:schemeClr val="tx1"/>
+            </a:fontRef>
+          </p:style>
+        </p:cxnSp>
+        <p:pic>
+          <p:nvPicPr>
+            <p:cNvPr id="98" name="Picture 97"/>
+            <p:cNvPicPr>
+              <a:picLocks noChangeAspect="1"/>
+            </p:cNvPicPr>
+            <p:nvPr>
+              <p:custDataLst>
+                <p:tags r:id="rId6"/>
+              </p:custDataLst>
+            </p:nvPr>
+          </p:nvPicPr>
+          <p:blipFill>
+            <a:blip r:embed="rId10" cstate="print">
+              <a:extLst>
+                <a:ext uri="{28A0092B-C50C-407E-A947-70E740481C1C}">
+                  <a14:useLocalDpi xmlns:a14="http://schemas.microsoft.com/office/drawing/2010/main" val="0"/>
+                </a:ext>
+              </a:extLst>
+            </a:blip>
+            <a:stretch>
+              <a:fillRect/>
+            </a:stretch>
+          </p:blipFill>
+          <p:spPr>
+            <a:xfrm>
+              <a:off x="10651685" y="1411425"/>
+              <a:ext cx="143238" cy="163048"/>
+            </a:xfrm>
+            <a:prstGeom prst="rect">
+              <a:avLst/>
+            </a:prstGeom>
+          </p:spPr>
+        </p:pic>
+      </p:grpSp>
+      <p:grpSp>
+        <p:nvGrpSpPr>
+          <p:cNvPr id="59" name="Group 58"/>
+          <p:cNvGrpSpPr/>
+          <p:nvPr/>
+        </p:nvGrpSpPr>
+        <p:grpSpPr>
+          <a:xfrm>
+            <a:off x="4490699" y="685800"/>
+            <a:ext cx="3420000" cy="2565376"/>
+            <a:chOff x="4490699" y="3581400"/>
+            <a:chExt cx="3420000" cy="2565376"/>
+          </a:xfrm>
+        </p:grpSpPr>
+        <p:sp>
+          <p:nvSpPr>
+            <p:cNvPr id="76" name="Rectangle 75"/>
+            <p:cNvSpPr/>
+            <p:nvPr/>
+          </p:nvSpPr>
+          <p:spPr>
+            <a:xfrm>
+              <a:off x="5394551" y="4289605"/>
+              <a:ext cx="1600200" cy="1143000"/>
+            </a:xfrm>
+            <a:prstGeom prst="rect">
+              <a:avLst/>
+            </a:prstGeom>
+            <a:solidFill>
+              <a:schemeClr val="bg1">
+                <a:lumMod val="95000"/>
+              </a:schemeClr>
+            </a:solidFill>
+            <a:ln w="12700">
+              <a:solidFill>
                 <a:schemeClr val="tx1"/>
-              </a:fontRef>
-            </p:style>
-          </p:cxnSp>
-          <p:pic>
-            <p:nvPicPr>
-              <p:cNvPr id="15" name="Picture 14"/>
-              <p:cNvPicPr>
-                <a:picLocks noChangeAspect="1"/>
-              </p:cNvPicPr>
-              <p:nvPr>
-                <p:custDataLst>
-                  <p:tags r:id="rId2"/>
-                </p:custDataLst>
-              </p:nvPr>
-            </p:nvPicPr>
-            <p:blipFill>
-              <a:blip r:embed="rId10" cstate="print">
-                <a:extLst>
-                  <a:ext uri="{28A0092B-C50C-407E-A947-70E740481C1C}">
-                    <a14:useLocalDpi xmlns:a14="http://schemas.microsoft.com/office/drawing/2010/main" val="0"/>
-                  </a:ext>
-                </a:extLst>
-              </a:blip>
-              <a:stretch>
-                <a:fillRect/>
-              </a:stretch>
-            </p:blipFill>
-            <p:spPr>
-              <a:xfrm>
-                <a:off x="7767461" y="4784047"/>
-                <a:ext cx="143238" cy="163048"/>
-              </a:xfrm>
-              <a:prstGeom prst="rect">
-                <a:avLst/>
-              </a:prstGeom>
-            </p:spPr>
-          </p:pic>
-          <p:sp>
-            <p:nvSpPr>
-              <p:cNvPr id="99" name="Rectangle 98"/>
-              <p:cNvSpPr/>
-              <p:nvPr/>
-            </p:nvSpPr>
-            <p:spPr>
-              <a:xfrm>
-                <a:off x="5394551" y="4288738"/>
-                <a:ext cx="1600200" cy="1143000"/>
-              </a:xfrm>
-              <a:prstGeom prst="rect">
-                <a:avLst/>
-              </a:prstGeom>
-              <a:solidFill>
-                <a:schemeClr val="bg1">
-                  <a:lumMod val="95000"/>
-                </a:schemeClr>
               </a:solidFill>
-              <a:ln w="12700">
-                <a:solidFill>
-                  <a:schemeClr val="tx1"/>
-                </a:solidFill>
-              </a:ln>
-            </p:spPr>
-            <p:style>
-              <a:lnRef idx="2">
-                <a:schemeClr val="accent1">
-                  <a:shade val="50000"/>
-                </a:schemeClr>
-              </a:lnRef>
-              <a:fillRef idx="1">
-                <a:schemeClr val="accent1"/>
-              </a:fillRef>
-              <a:effectRef idx="0">
-                <a:schemeClr val="accent1"/>
-              </a:effectRef>
-              <a:fontRef idx="minor">
-                <a:schemeClr val="lt1"/>
-              </a:fontRef>
-            </p:style>
-            <p:txBody>
-              <a:bodyPr rtlCol="0" anchor="ctr"/>
-              <a:lstStyle/>
-              <a:p>
-                <a:pPr algn="ctr"/>
-                <a:r>
-                  <a:rPr lang="en-US" dirty="0">
-                    <a:ln w="0"/>
-                    <a:solidFill>
-                      <a:schemeClr val="tx1"/>
-                    </a:solidFill>
-                    <a:effectLst>
-                      <a:outerShdw blurRad="38100" dist="19050" dir="2700000" algn="tl" rotWithShape="0">
-                        <a:schemeClr val="dk1">
-                          <a:alpha val="40000"/>
-                        </a:schemeClr>
-                      </a:outerShdw>
-                    </a:effectLst>
-                    <a:latin typeface="Times New Roman" panose="02020603050405020304" pitchFamily="18" charset="0"/>
-                    <a:cs typeface="Times New Roman" panose="02020603050405020304" pitchFamily="18" charset="0"/>
-                  </a:rPr>
-                  <a:t>Time-domain Convolution</a:t>
-                </a:r>
-                <a:endParaRPr lang="en-US" dirty="0">
+            </a:ln>
+          </p:spPr>
+          <p:style>
+            <a:lnRef idx="2">
+              <a:schemeClr val="accent1">
+                <a:shade val="50000"/>
+              </a:schemeClr>
+            </a:lnRef>
+            <a:fillRef idx="1">
+              <a:schemeClr val="accent1"/>
+            </a:fillRef>
+            <a:effectRef idx="0">
+              <a:schemeClr val="accent1"/>
+            </a:effectRef>
+            <a:fontRef idx="minor">
+              <a:schemeClr val="lt1"/>
+            </a:fontRef>
+          </p:style>
+          <p:txBody>
+            <a:bodyPr rtlCol="0" anchor="ctr"/>
+            <a:lstStyle/>
+            <a:p>
+              <a:pPr algn="ctr"/>
+              <a:r>
+                <a:rPr lang="en-US" dirty="0">
+                  <a:ln w="0"/>
+                  <a:solidFill>
+                    <a:schemeClr val="tx1"/>
+                  </a:solidFill>
+                  <a:effectLst>
+                    <a:outerShdw blurRad="38100" dist="19050" dir="2700000" algn="tl" rotWithShape="0">
+                      <a:schemeClr val="dk1">
+                        <a:alpha val="40000"/>
+                      </a:schemeClr>
+                    </a:outerShdw>
+                  </a:effectLst>
                   <a:latin typeface="Times New Roman" panose="02020603050405020304" pitchFamily="18" charset="0"/>
                   <a:cs typeface="Times New Roman" panose="02020603050405020304" pitchFamily="18" charset="0"/>
-                </a:endParaRPr>
-              </a:p>
-            </p:txBody>
-          </p:sp>
-          <p:pic>
-            <p:nvPicPr>
-              <p:cNvPr id="102" name="Picture 101"/>
-              <p:cNvPicPr>
-                <a:picLocks noChangeAspect="1"/>
-              </p:cNvPicPr>
-              <p:nvPr>
-                <p:custDataLst>
-                  <p:tags r:id="rId3"/>
-                </p:custDataLst>
-              </p:nvPr>
-            </p:nvPicPr>
-            <p:blipFill>
-              <a:blip r:embed="rId8" cstate="print">
-                <a:extLst>
-                  <a:ext uri="{28A0092B-C50C-407E-A947-70E740481C1C}">
-                    <a14:useLocalDpi xmlns:a14="http://schemas.microsoft.com/office/drawing/2010/main" val="0"/>
-                  </a:ext>
-                </a:extLst>
-              </a:blip>
-              <a:stretch>
-                <a:fillRect/>
-              </a:stretch>
-            </p:blipFill>
-            <p:spPr>
-              <a:xfrm>
-                <a:off x="4490699" y="5973062"/>
-                <a:ext cx="146286" cy="173714"/>
-              </a:xfrm>
-              <a:prstGeom prst="rect">
-                <a:avLst/>
-              </a:prstGeom>
-            </p:spPr>
-          </p:pic>
-        </p:grpSp>
+                </a:rPr>
+                <a:t>Time-domain Convolution</a:t>
+              </a:r>
+              <a:endParaRPr lang="en-US" dirty="0">
+                <a:latin typeface="Times New Roman" panose="02020603050405020304" pitchFamily="18" charset="0"/>
+                <a:cs typeface="Times New Roman" panose="02020603050405020304" pitchFamily="18" charset="0"/>
+              </a:endParaRPr>
+            </a:p>
+          </p:txBody>
+        </p:sp>
+        <p:pic>
+          <p:nvPicPr>
+            <p:cNvPr id="7" name="Picture 6"/>
+            <p:cNvPicPr>
+              <a:picLocks noChangeAspect="1"/>
+            </p:cNvPicPr>
+            <p:nvPr>
+              <p:custDataLst>
+                <p:tags r:id="rId1"/>
+              </p:custDataLst>
+            </p:nvPr>
+          </p:nvPicPr>
+          <p:blipFill>
+            <a:blip r:embed="rId9" cstate="print">
+              <a:extLst>
+                <a:ext uri="{28A0092B-C50C-407E-A947-70E740481C1C}">
+                  <a14:useLocalDpi xmlns:a14="http://schemas.microsoft.com/office/drawing/2010/main" val="0"/>
+                </a:ext>
+              </a:extLst>
+            </a:blip>
+            <a:stretch>
+              <a:fillRect/>
+            </a:stretch>
+          </p:blipFill>
+          <p:spPr>
+            <a:xfrm>
+              <a:off x="4495800" y="3581400"/>
+              <a:ext cx="144762" cy="111238"/>
+            </a:xfrm>
+            <a:prstGeom prst="rect">
+              <a:avLst/>
+            </a:prstGeom>
+          </p:spPr>
+        </p:pic>
+        <p:cxnSp>
+          <p:nvCxnSpPr>
+            <p:cNvPr id="83" name="Elbow Connector 82"/>
+            <p:cNvCxnSpPr>
+              <a:endCxn id="76" idx="0"/>
+            </p:cNvCxnSpPr>
+            <p:nvPr/>
+          </p:nvCxnSpPr>
+          <p:spPr>
+            <a:xfrm>
+              <a:off x="4708721" y="3644530"/>
+              <a:ext cx="1485930" cy="645075"/>
+            </a:xfrm>
+            <a:prstGeom prst="bentConnector2">
+              <a:avLst/>
+            </a:prstGeom>
+            <a:ln w="12700">
+              <a:solidFill>
+                <a:schemeClr val="tx1"/>
+              </a:solidFill>
+              <a:tailEnd type="triangle"/>
+            </a:ln>
+          </p:spPr>
+          <p:style>
+            <a:lnRef idx="1">
+              <a:schemeClr val="accent1"/>
+            </a:lnRef>
+            <a:fillRef idx="0">
+              <a:schemeClr val="accent1"/>
+            </a:fillRef>
+            <a:effectRef idx="0">
+              <a:schemeClr val="accent1"/>
+            </a:effectRef>
+            <a:fontRef idx="minor">
+              <a:schemeClr val="tx1"/>
+            </a:fontRef>
+          </p:style>
+        </p:cxnSp>
+        <p:cxnSp>
+          <p:nvCxnSpPr>
+            <p:cNvPr id="84" name="Elbow Connector 83"/>
+            <p:cNvCxnSpPr>
+              <a:endCxn id="76" idx="2"/>
+            </p:cNvCxnSpPr>
+            <p:nvPr/>
+          </p:nvCxnSpPr>
+          <p:spPr>
+            <a:xfrm flipV="1">
+              <a:off x="4708721" y="5432605"/>
+              <a:ext cx="1485930" cy="648753"/>
+            </a:xfrm>
+            <a:prstGeom prst="bentConnector2">
+              <a:avLst/>
+            </a:prstGeom>
+            <a:ln w="12700">
+              <a:solidFill>
+                <a:schemeClr val="tx1"/>
+              </a:solidFill>
+              <a:tailEnd type="triangle"/>
+            </a:ln>
+          </p:spPr>
+          <p:style>
+            <a:lnRef idx="1">
+              <a:schemeClr val="accent1"/>
+            </a:lnRef>
+            <a:fillRef idx="0">
+              <a:schemeClr val="accent1"/>
+            </a:fillRef>
+            <a:effectRef idx="0">
+              <a:schemeClr val="accent1"/>
+            </a:effectRef>
+            <a:fontRef idx="minor">
+              <a:schemeClr val="tx1"/>
+            </a:fontRef>
+          </p:style>
+        </p:cxnSp>
+        <p:cxnSp>
+          <p:nvCxnSpPr>
+            <p:cNvPr id="38" name="Straight Arrow Connector 37"/>
+            <p:cNvCxnSpPr/>
+            <p:nvPr/>
+          </p:nvCxnSpPr>
+          <p:spPr>
+            <a:xfrm flipV="1">
+              <a:off x="6994751" y="4860238"/>
+              <a:ext cx="688179" cy="867"/>
+            </a:xfrm>
+            <a:prstGeom prst="straightConnector1">
+              <a:avLst/>
+            </a:prstGeom>
+            <a:ln w="12700">
+              <a:solidFill>
+                <a:schemeClr val="tx1"/>
+              </a:solidFill>
+              <a:tailEnd type="triangle"/>
+            </a:ln>
+          </p:spPr>
+          <p:style>
+            <a:lnRef idx="1">
+              <a:schemeClr val="accent1"/>
+            </a:lnRef>
+            <a:fillRef idx="0">
+              <a:schemeClr val="accent1"/>
+            </a:fillRef>
+            <a:effectRef idx="0">
+              <a:schemeClr val="accent1"/>
+            </a:effectRef>
+            <a:fontRef idx="minor">
+              <a:schemeClr val="tx1"/>
+            </a:fontRef>
+          </p:style>
+        </p:cxnSp>
+        <p:pic>
+          <p:nvPicPr>
+            <p:cNvPr id="15" name="Picture 14"/>
+            <p:cNvPicPr>
+              <a:picLocks noChangeAspect="1"/>
+            </p:cNvPicPr>
+            <p:nvPr>
+              <p:custDataLst>
+                <p:tags r:id="rId2"/>
+              </p:custDataLst>
+            </p:nvPr>
+          </p:nvPicPr>
+          <p:blipFill>
+            <a:blip r:embed="rId10" cstate="print">
+              <a:extLst>
+                <a:ext uri="{28A0092B-C50C-407E-A947-70E740481C1C}">
+                  <a14:useLocalDpi xmlns:a14="http://schemas.microsoft.com/office/drawing/2010/main" val="0"/>
+                </a:ext>
+              </a:extLst>
+            </a:blip>
+            <a:stretch>
+              <a:fillRect/>
+            </a:stretch>
+          </p:blipFill>
+          <p:spPr>
+            <a:xfrm>
+              <a:off x="7767461" y="4784047"/>
+              <a:ext cx="143238" cy="163048"/>
+            </a:xfrm>
+            <a:prstGeom prst="rect">
+              <a:avLst/>
+            </a:prstGeom>
+          </p:spPr>
+        </p:pic>
+        <p:sp>
+          <p:nvSpPr>
+            <p:cNvPr id="99" name="Rectangle 98"/>
+            <p:cNvSpPr/>
+            <p:nvPr/>
+          </p:nvSpPr>
+          <p:spPr>
+            <a:xfrm>
+              <a:off x="5394551" y="4288738"/>
+              <a:ext cx="1600200" cy="1143000"/>
+            </a:xfrm>
+            <a:prstGeom prst="rect">
+              <a:avLst/>
+            </a:prstGeom>
+            <a:solidFill>
+              <a:schemeClr val="bg1">
+                <a:lumMod val="95000"/>
+              </a:schemeClr>
+            </a:solidFill>
+            <a:ln w="12700">
+              <a:solidFill>
+                <a:schemeClr val="tx1"/>
+              </a:solidFill>
+            </a:ln>
+          </p:spPr>
+          <p:style>
+            <a:lnRef idx="2">
+              <a:schemeClr val="accent1">
+                <a:shade val="50000"/>
+              </a:schemeClr>
+            </a:lnRef>
+            <a:fillRef idx="1">
+              <a:schemeClr val="accent1"/>
+            </a:fillRef>
+            <a:effectRef idx="0">
+              <a:schemeClr val="accent1"/>
+            </a:effectRef>
+            <a:fontRef idx="minor">
+              <a:schemeClr val="lt1"/>
+            </a:fontRef>
+          </p:style>
+          <p:txBody>
+            <a:bodyPr rtlCol="0" anchor="ctr"/>
+            <a:lstStyle/>
+            <a:p>
+              <a:pPr algn="ctr"/>
+              <a:r>
+                <a:rPr lang="en-US" dirty="0">
+                  <a:ln w="0"/>
+                  <a:solidFill>
+                    <a:schemeClr val="tx1"/>
+                  </a:solidFill>
+                  <a:effectLst>
+                    <a:outerShdw blurRad="38100" dist="19050" dir="2700000" algn="tl" rotWithShape="0">
+                      <a:schemeClr val="dk1">
+                        <a:alpha val="40000"/>
+                      </a:schemeClr>
+                    </a:outerShdw>
+                  </a:effectLst>
+                  <a:latin typeface="Times New Roman" panose="02020603050405020304" pitchFamily="18" charset="0"/>
+                  <a:cs typeface="Times New Roman" panose="02020603050405020304" pitchFamily="18" charset="0"/>
+                </a:rPr>
+                <a:t>Time-domain Convolution</a:t>
+              </a:r>
+              <a:endParaRPr lang="en-US" dirty="0">
+                <a:latin typeface="Times New Roman" panose="02020603050405020304" pitchFamily="18" charset="0"/>
+                <a:cs typeface="Times New Roman" panose="02020603050405020304" pitchFamily="18" charset="0"/>
+              </a:endParaRPr>
+            </a:p>
+          </p:txBody>
+        </p:sp>
+        <p:pic>
+          <p:nvPicPr>
+            <p:cNvPr id="102" name="Picture 101"/>
+            <p:cNvPicPr>
+              <a:picLocks noChangeAspect="1"/>
+            </p:cNvPicPr>
+            <p:nvPr>
+              <p:custDataLst>
+                <p:tags r:id="rId3"/>
+              </p:custDataLst>
+            </p:nvPr>
+          </p:nvPicPr>
+          <p:blipFill>
+            <a:blip r:embed="rId8" cstate="print">
+              <a:extLst>
+                <a:ext uri="{28A0092B-C50C-407E-A947-70E740481C1C}">
+                  <a14:useLocalDpi xmlns:a14="http://schemas.microsoft.com/office/drawing/2010/main" val="0"/>
+                </a:ext>
+              </a:extLst>
+            </a:blip>
+            <a:stretch>
+              <a:fillRect/>
+            </a:stretch>
+          </p:blipFill>
+          <p:spPr>
+            <a:xfrm>
+              <a:off x="4490699" y="5973062"/>
+              <a:ext cx="146286" cy="173714"/>
+            </a:xfrm>
+            <a:prstGeom prst="rect">
+              <a:avLst/>
+            </a:prstGeom>
+          </p:spPr>
+        </p:pic>
       </p:grpSp>
     </p:spTree>
     <p:extLst>

</xml_diff>